<commit_message>
Single 2x2 SCE firing rate encoding with connection strength
</commit_message>
<xml_diff>
--- a/encoding_paper/Firing Rate Encoding Analysis.pptx
+++ b/encoding_paper/Firing Rate Encoding Analysis.pptx
@@ -8,10 +8,12 @@
     <p:sldId id="256" r:id="rId2"/>
     <p:sldId id="270" r:id="rId3"/>
     <p:sldId id="276" r:id="rId4"/>
-    <p:sldId id="271" r:id="rId5"/>
-    <p:sldId id="279" r:id="rId6"/>
-    <p:sldId id="277" r:id="rId7"/>
-    <p:sldId id="278" r:id="rId8"/>
+    <p:sldId id="280" r:id="rId5"/>
+    <p:sldId id="281" r:id="rId6"/>
+    <p:sldId id="271" r:id="rId7"/>
+    <p:sldId id="279" r:id="rId8"/>
+    <p:sldId id="277" r:id="rId9"/>
+    <p:sldId id="278" r:id="rId10"/>
   </p:sldIdLst>
   <p:sldSz cx="12192000" cy="6858000"/>
   <p:notesSz cx="6858000" cy="9144000"/>
@@ -118,6 +120,18 @@
 </p:presentation>
 </file>
 
+<file path=ppt/commentAuthors.xml><?xml version="1.0" encoding="utf-8"?>
+<p:cmAuthorLst xmlns:a="http://schemas.openxmlformats.org/drawingml/2006/main" xmlns:r="http://schemas.openxmlformats.org/officeDocument/2006/relationships" xmlns:p="http://schemas.openxmlformats.org/presentationml/2006/main">
+  <p:cmAuthor id="1" name="vbaker" initials="v" lastIdx="1" clrIdx="0">
+    <p:extLst>
+      <p:ext uri="{19B8F6BF-5375-455C-9EA6-DF929625EA0E}">
+        <p15:presenceInfo xmlns:p15="http://schemas.microsoft.com/office/powerpoint/2012/main" userId="vbaker" providerId="None"/>
+      </p:ext>
+    </p:extLst>
+  </p:cmAuthor>
+</p:cmAuthorLst>
+</file>
+
 <file path=ppt/slideLayouts/slideLayout1.xml><?xml version="1.0" encoding="utf-8"?>
 <p:sldLayout xmlns:a="http://schemas.openxmlformats.org/drawingml/2006/main" xmlns:r="http://schemas.openxmlformats.org/officeDocument/2006/relationships" xmlns:p="http://schemas.openxmlformats.org/presentationml/2006/main" type="title" preserve="1">
   <p:cSld name="Title Slide">
@@ -442,7 +456,7 @@
           <a:p>
             <a:fld id="{0BC610E4-0AD4-4B2C-A1AF-CEC06808CA2D}" type="datetimeFigureOut">
               <a:rPr lang="en-US" smtClean="0"/>
-              <a:t>2/7/2021</a:t>
+              <a:t>2/26/2021</a:t>
             </a:fld>
             <a:endParaRPr lang="en-US"/>
           </a:p>
@@ -658,7 +672,7 @@
           <a:p>
             <a:fld id="{0BC610E4-0AD4-4B2C-A1AF-CEC06808CA2D}" type="datetimeFigureOut">
               <a:rPr lang="en-US" smtClean="0"/>
-              <a:t>2/7/2021</a:t>
+              <a:t>2/26/2021</a:t>
             </a:fld>
             <a:endParaRPr lang="en-US"/>
           </a:p>
@@ -864,7 +878,7 @@
           <a:p>
             <a:fld id="{0BC610E4-0AD4-4B2C-A1AF-CEC06808CA2D}" type="datetimeFigureOut">
               <a:rPr lang="en-US" smtClean="0"/>
-              <a:t>2/7/2021</a:t>
+              <a:t>2/26/2021</a:t>
             </a:fld>
             <a:endParaRPr lang="en-US"/>
           </a:p>
@@ -1137,7 +1151,7 @@
           <a:p>
             <a:fld id="{0BC610E4-0AD4-4B2C-A1AF-CEC06808CA2D}" type="datetimeFigureOut">
               <a:rPr lang="en-US" smtClean="0"/>
-              <a:t>2/7/2021</a:t>
+              <a:t>2/26/2021</a:t>
             </a:fld>
             <a:endParaRPr lang="en-US"/>
           </a:p>
@@ -1420,7 +1434,7 @@
           <a:p>
             <a:fld id="{0BC610E4-0AD4-4B2C-A1AF-CEC06808CA2D}" type="datetimeFigureOut">
               <a:rPr lang="en-US" smtClean="0"/>
-              <a:t>2/7/2021</a:t>
+              <a:t>2/26/2021</a:t>
             </a:fld>
             <a:endParaRPr lang="en-US"/>
           </a:p>
@@ -1840,7 +1854,7 @@
           <a:p>
             <a:fld id="{0BC610E4-0AD4-4B2C-A1AF-CEC06808CA2D}" type="datetimeFigureOut">
               <a:rPr lang="en-US" smtClean="0"/>
-              <a:t>2/7/2021</a:t>
+              <a:t>2/26/2021</a:t>
             </a:fld>
             <a:endParaRPr lang="en-US"/>
           </a:p>
@@ -1989,7 +2003,7 @@
           <a:p>
             <a:fld id="{0BC610E4-0AD4-4B2C-A1AF-CEC06808CA2D}" type="datetimeFigureOut">
               <a:rPr lang="en-US" smtClean="0"/>
-              <a:t>2/7/2021</a:t>
+              <a:t>2/26/2021</a:t>
             </a:fld>
             <a:endParaRPr lang="en-US"/>
           </a:p>
@@ -2110,7 +2124,7 @@
           <a:p>
             <a:fld id="{0BC610E4-0AD4-4B2C-A1AF-CEC06808CA2D}" type="datetimeFigureOut">
               <a:rPr lang="en-US" smtClean="0"/>
-              <a:t>2/7/2021</a:t>
+              <a:t>2/26/2021</a:t>
             </a:fld>
             <a:endParaRPr lang="en-US"/>
           </a:p>
@@ -2429,7 +2443,7 @@
           <a:p>
             <a:fld id="{0BC610E4-0AD4-4B2C-A1AF-CEC06808CA2D}" type="datetimeFigureOut">
               <a:rPr lang="en-US" smtClean="0"/>
-              <a:t>2/7/2021</a:t>
+              <a:t>2/26/2021</a:t>
             </a:fld>
             <a:endParaRPr lang="en-US"/>
           </a:p>
@@ -2725,7 +2739,7 @@
           <a:p>
             <a:fld id="{0BC610E4-0AD4-4B2C-A1AF-CEC06808CA2D}" type="datetimeFigureOut">
               <a:rPr lang="en-US" smtClean="0"/>
-              <a:t>2/7/2021</a:t>
+              <a:t>2/26/2021</a:t>
             </a:fld>
             <a:endParaRPr lang="en-US"/>
           </a:p>
@@ -3688,63 +3702,10 @@
       </p:grpSpPr>
       <p:sp>
         <p:nvSpPr>
-          <p:cNvPr id="30" name="Oval 29">
-            <a:extLst>
-              <a:ext uri="{FF2B5EF4-FFF2-40B4-BE49-F238E27FC236}">
-                <a16:creationId xmlns:a16="http://schemas.microsoft.com/office/drawing/2014/main" id="{D8C1E074-19B0-4BA4-83E5-3E77DC29EAF8}"/>
-              </a:ext>
-            </a:extLst>
-          </p:cNvPr>
-          <p:cNvSpPr/>
-          <p:nvPr/>
-        </p:nvSpPr>
-        <p:spPr>
-          <a:xfrm>
-            <a:off x="4876154" y="5538909"/>
-            <a:ext cx="1967869" cy="1089433"/>
-          </a:xfrm>
-          <a:prstGeom prst="ellipse">
-            <a:avLst/>
-          </a:prstGeom>
-          <a:noFill/>
-          <a:ln>
-            <a:solidFill>
-              <a:schemeClr val="tx1"/>
-            </a:solidFill>
-            <a:prstDash val="dash"/>
-          </a:ln>
-        </p:spPr>
-        <p:style>
-          <a:lnRef idx="2">
-            <a:schemeClr val="accent1">
-              <a:shade val="50000"/>
-            </a:schemeClr>
-          </a:lnRef>
-          <a:fillRef idx="1">
-            <a:schemeClr val="accent1"/>
-          </a:fillRef>
-          <a:effectRef idx="0">
-            <a:schemeClr val="accent1"/>
-          </a:effectRef>
-          <a:fontRef idx="minor">
-            <a:schemeClr val="lt1"/>
-          </a:fontRef>
-        </p:style>
-        <p:txBody>
-          <a:bodyPr rtlCol="0" anchor="ctr"/>
-          <a:lstStyle/>
-          <a:p>
-            <a:pPr algn="ctr"/>
-            <a:endParaRPr lang="en-US"/>
-          </a:p>
-        </p:txBody>
-      </p:sp>
-      <p:sp>
-        <p:nvSpPr>
           <p:cNvPr id="2" name="Title 1">
             <a:extLst>
               <a:ext uri="{FF2B5EF4-FFF2-40B4-BE49-F238E27FC236}">
-                <a16:creationId xmlns:a16="http://schemas.microsoft.com/office/drawing/2014/main" id="{76966D12-A105-4527-83E8-64F0055CAF93}"/>
+                <a16:creationId xmlns:a16="http://schemas.microsoft.com/office/drawing/2014/main" id="{13064A55-F78D-4F4E-B0EF-26B0A543884E}"/>
               </a:ext>
             </a:extLst>
           </p:cNvPr>
@@ -3767,12 +3728,198 @@
           </a:p>
         </p:txBody>
       </p:sp>
+      <p:pic>
+        <p:nvPicPr>
+          <p:cNvPr id="5" name="Picture 4">
+            <a:extLst>
+              <a:ext uri="{FF2B5EF4-FFF2-40B4-BE49-F238E27FC236}">
+                <a16:creationId xmlns:a16="http://schemas.microsoft.com/office/drawing/2014/main" id="{104278D7-4E4B-44CE-BA1E-82380FAABD4C}"/>
+              </a:ext>
+            </a:extLst>
+          </p:cNvPr>
+          <p:cNvPicPr>
+            <a:picLocks noChangeAspect="1"/>
+          </p:cNvPicPr>
+          <p:nvPr/>
+        </p:nvPicPr>
+        <p:blipFill rotWithShape="1">
+          <a:blip r:embed="rId2">
+            <a:extLst>
+              <a:ext uri="{28A0092B-C50C-407E-A947-70E740481C1C}">
+                <a14:useLocalDpi xmlns:a14="http://schemas.microsoft.com/office/drawing/2010/main" val="0"/>
+              </a:ext>
+            </a:extLst>
+          </a:blip>
+          <a:srcRect l="51309" r="35113" b="49599"/>
+          <a:stretch/>
+        </p:blipFill>
+        <p:spPr>
+          <a:xfrm>
+            <a:off x="6742907" y="2055310"/>
+            <a:ext cx="2215503" cy="2052604"/>
+          </a:xfrm>
+          <a:prstGeom prst="rect">
+            <a:avLst/>
+          </a:prstGeom>
+        </p:spPr>
+      </p:pic>
+      <p:pic>
+        <p:nvPicPr>
+          <p:cNvPr id="6" name="Picture 5">
+            <a:extLst>
+              <a:ext uri="{FF2B5EF4-FFF2-40B4-BE49-F238E27FC236}">
+                <a16:creationId xmlns:a16="http://schemas.microsoft.com/office/drawing/2014/main" id="{DB7BD461-95D2-45A2-901C-686E60FC9884}"/>
+              </a:ext>
+            </a:extLst>
+          </p:cNvPr>
+          <p:cNvPicPr>
+            <a:picLocks noChangeAspect="1"/>
+          </p:cNvPicPr>
+          <p:nvPr/>
+        </p:nvPicPr>
+        <p:blipFill rotWithShape="1">
+          <a:blip r:embed="rId3">
+            <a:extLst>
+              <a:ext uri="{28A0092B-C50C-407E-A947-70E740481C1C}">
+                <a14:useLocalDpi xmlns:a14="http://schemas.microsoft.com/office/drawing/2010/main" val="0"/>
+              </a:ext>
+            </a:extLst>
+          </a:blip>
+          <a:srcRect t="33512" b="38457"/>
+          <a:stretch/>
+        </p:blipFill>
+        <p:spPr>
+          <a:xfrm>
+            <a:off x="6927273" y="4585275"/>
+            <a:ext cx="3419904" cy="1922323"/>
+          </a:xfrm>
+          <a:prstGeom prst="rect">
+            <a:avLst/>
+          </a:prstGeom>
+        </p:spPr>
+      </p:pic>
+      <p:sp>
+        <p:nvSpPr>
+          <p:cNvPr id="7" name="TextBox 6">
+            <a:extLst>
+              <a:ext uri="{FF2B5EF4-FFF2-40B4-BE49-F238E27FC236}">
+                <a16:creationId xmlns:a16="http://schemas.microsoft.com/office/drawing/2014/main" id="{174C5B68-F0AB-44A2-A6B7-E32D7CA5BBD4}"/>
+              </a:ext>
+            </a:extLst>
+          </p:cNvPr>
+          <p:cNvSpPr txBox="1"/>
+          <p:nvPr/>
+        </p:nvSpPr>
+        <p:spPr>
+          <a:xfrm>
+            <a:off x="6927273" y="4238178"/>
+            <a:ext cx="3578176" cy="523220"/>
+          </a:xfrm>
+          <a:prstGeom prst="rect">
+            <a:avLst/>
+          </a:prstGeom>
+          <a:noFill/>
+        </p:spPr>
+        <p:txBody>
+          <a:bodyPr wrap="square" rtlCol="0">
+            <a:spAutoFit/>
+          </a:bodyPr>
+          <a:lstStyle/>
+          <a:p>
+            <a:r>
+              <a:rPr lang="en-US" sz="1400" dirty="0">
+                <a:latin typeface="Arial" panose="020B0604020202020204" pitchFamily="34" charset="0"/>
+                <a:cs typeface="Arial" panose="020B0604020202020204" pitchFamily="34" charset="0"/>
+              </a:rPr>
+              <a:t>Spike raster plot of a population of 50 neurons with a 10 Hz average firing rate.</a:t>
+            </a:r>
+          </a:p>
+        </p:txBody>
+      </p:sp>
+      <p:cxnSp>
+        <p:nvCxnSpPr>
+          <p:cNvPr id="8" name="Straight Arrow Connector 7">
+            <a:extLst>
+              <a:ext uri="{FF2B5EF4-FFF2-40B4-BE49-F238E27FC236}">
+                <a16:creationId xmlns:a16="http://schemas.microsoft.com/office/drawing/2014/main" id="{E58286BD-40BF-4624-859F-FD2327649ABA}"/>
+              </a:ext>
+            </a:extLst>
+          </p:cNvPr>
+          <p:cNvCxnSpPr/>
+          <p:nvPr/>
+        </p:nvCxnSpPr>
+        <p:spPr>
+          <a:xfrm>
+            <a:off x="7569902" y="6489321"/>
+            <a:ext cx="2463800" cy="0"/>
+          </a:xfrm>
+          <a:prstGeom prst="straightConnector1">
+            <a:avLst/>
+          </a:prstGeom>
+          <a:ln>
+            <a:headEnd type="triangle"/>
+            <a:tailEnd type="triangle"/>
+          </a:ln>
+        </p:spPr>
+        <p:style>
+          <a:lnRef idx="1">
+            <a:schemeClr val="dk1"/>
+          </a:lnRef>
+          <a:fillRef idx="0">
+            <a:schemeClr val="dk1"/>
+          </a:fillRef>
+          <a:effectRef idx="0">
+            <a:schemeClr val="dk1"/>
+          </a:effectRef>
+          <a:fontRef idx="minor">
+            <a:schemeClr val="tx1"/>
+          </a:fontRef>
+        </p:style>
+      </p:cxnSp>
+      <p:sp>
+        <p:nvSpPr>
+          <p:cNvPr id="9" name="TextBox 8">
+            <a:extLst>
+              <a:ext uri="{FF2B5EF4-FFF2-40B4-BE49-F238E27FC236}">
+                <a16:creationId xmlns:a16="http://schemas.microsoft.com/office/drawing/2014/main" id="{035783C7-6A42-4B87-AC57-8F3A1EA8C1D0}"/>
+              </a:ext>
+            </a:extLst>
+          </p:cNvPr>
+          <p:cNvSpPr txBox="1"/>
+          <p:nvPr/>
+        </p:nvSpPr>
+        <p:spPr>
+          <a:xfrm>
+            <a:off x="8308510" y="6466553"/>
+            <a:ext cx="1254620" cy="307777"/>
+          </a:xfrm>
+          <a:prstGeom prst="rect">
+            <a:avLst/>
+          </a:prstGeom>
+          <a:noFill/>
+        </p:spPr>
+        <p:txBody>
+          <a:bodyPr wrap="square" rtlCol="0">
+            <a:spAutoFit/>
+          </a:bodyPr>
+          <a:lstStyle/>
+          <a:p>
+            <a:r>
+              <a:rPr lang="en-US" sz="1400" dirty="0">
+                <a:latin typeface="Arial" panose="020B0604020202020204" pitchFamily="34" charset="0"/>
+                <a:cs typeface="Arial" panose="020B0604020202020204" pitchFamily="34" charset="0"/>
+              </a:rPr>
+              <a:t>2 seconds</a:t>
+            </a:r>
+          </a:p>
+        </p:txBody>
+      </p:sp>
       <p:grpSp>
         <p:nvGrpSpPr>
-          <p:cNvPr id="4" name="Group 3">
-            <a:extLst>
-              <a:ext uri="{FF2B5EF4-FFF2-40B4-BE49-F238E27FC236}">
-                <a16:creationId xmlns:a16="http://schemas.microsoft.com/office/drawing/2014/main" id="{EEBD4CE5-051B-4455-8652-AE4DCB5E2106}"/>
+          <p:cNvPr id="19" name="Group 18">
+            <a:extLst>
+              <a:ext uri="{FF2B5EF4-FFF2-40B4-BE49-F238E27FC236}">
+                <a16:creationId xmlns:a16="http://schemas.microsoft.com/office/drawing/2014/main" id="{A70C585D-8A58-4BDA-BA4F-498A8A565B78}"/>
               </a:ext>
             </a:extLst>
           </p:cNvPr>
@@ -3781,18 +3928,18 @@
         </p:nvGrpSpPr>
         <p:grpSpPr>
           <a:xfrm>
-            <a:off x="676265" y="1568595"/>
-            <a:ext cx="6330951" cy="5132387"/>
-            <a:chOff x="942584" y="996865"/>
-            <a:chExt cx="6330951" cy="5132387"/>
+            <a:off x="3026409" y="1808576"/>
+            <a:ext cx="2572826" cy="3429000"/>
+            <a:chOff x="2691903" y="2117437"/>
+            <a:chExt cx="2572826" cy="3429000"/>
           </a:xfrm>
         </p:grpSpPr>
         <p:pic>
           <p:nvPicPr>
-            <p:cNvPr id="5" name="Picture 4" descr="A picture containing map&#10;&#10;Description automatically generated">
+            <p:cNvPr id="4" name="Picture 3" descr="Chart&#10;&#10;Description automatically generated">
               <a:extLst>
                 <a:ext uri="{FF2B5EF4-FFF2-40B4-BE49-F238E27FC236}">
-                  <a16:creationId xmlns:a16="http://schemas.microsoft.com/office/drawing/2014/main" id="{83469872-DE07-4C1D-955B-3374A66DD81E}"/>
+                  <a16:creationId xmlns:a16="http://schemas.microsoft.com/office/drawing/2014/main" id="{9602E889-1D7D-40C6-84F7-380551CB9B9B}"/>
                 </a:ext>
               </a:extLst>
             </p:cNvPr>
@@ -3801,116 +3948,34 @@
             </p:cNvPicPr>
             <p:nvPr/>
           </p:nvPicPr>
-          <p:blipFill rotWithShape="1">
-            <a:blip r:embed="rId2">
+          <p:blipFill>
+            <a:blip r:embed="rId4">
               <a:extLst>
                 <a:ext uri="{28A0092B-C50C-407E-A947-70E740481C1C}">
                   <a14:useLocalDpi xmlns:a14="http://schemas.microsoft.com/office/drawing/2010/main" val="0"/>
                 </a:ext>
               </a:extLst>
             </a:blip>
-            <a:srcRect t="12890" b="16722"/>
-            <a:stretch/>
+            <a:stretch>
+              <a:fillRect/>
+            </a:stretch>
           </p:blipFill>
           <p:spPr>
             <a:xfrm>
-              <a:off x="4918464" y="996865"/>
-              <a:ext cx="2355071" cy="3857854"/>
+              <a:off x="2691903" y="2117437"/>
+              <a:ext cx="2572826" cy="3429000"/>
             </a:xfrm>
             <a:prstGeom prst="rect">
               <a:avLst/>
             </a:prstGeom>
           </p:spPr>
         </p:pic>
-        <p:cxnSp>
-          <p:nvCxnSpPr>
-            <p:cNvPr id="6" name="Connector: Curved 5">
+        <p:sp>
+          <p:nvSpPr>
+            <p:cNvPr id="10" name="Oval 9">
               <a:extLst>
                 <a:ext uri="{FF2B5EF4-FFF2-40B4-BE49-F238E27FC236}">
-                  <a16:creationId xmlns:a16="http://schemas.microsoft.com/office/drawing/2014/main" id="{F3B82A6E-3854-4AF1-8C3F-190853E60483}"/>
-                </a:ext>
-              </a:extLst>
-            </p:cNvPr>
-            <p:cNvCxnSpPr>
-              <a:cxnSpLocks/>
-              <a:stCxn id="21" idx="0"/>
-            </p:cNvCxnSpPr>
-            <p:nvPr/>
-          </p:nvCxnSpPr>
-          <p:spPr>
-            <a:xfrm rot="5400000" flipH="1" flipV="1">
-              <a:off x="4382429" y="3763747"/>
-              <a:ext cx="646749" cy="1129884"/>
-            </a:xfrm>
-            <a:prstGeom prst="curvedConnector2">
-              <a:avLst/>
-            </a:prstGeom>
-            <a:ln>
-              <a:solidFill>
-                <a:schemeClr val="tx1"/>
-              </a:solidFill>
-              <a:tailEnd type="triangle"/>
-            </a:ln>
-          </p:spPr>
-          <p:style>
-            <a:lnRef idx="3">
-              <a:schemeClr val="accent6"/>
-            </a:lnRef>
-            <a:fillRef idx="0">
-              <a:schemeClr val="accent6"/>
-            </a:fillRef>
-            <a:effectRef idx="2">
-              <a:schemeClr val="accent6"/>
-            </a:effectRef>
-            <a:fontRef idx="minor">
-              <a:schemeClr val="tx1"/>
-            </a:fontRef>
-          </p:style>
-        </p:cxnSp>
-        <p:sp>
-          <p:nvSpPr>
-            <p:cNvPr id="7" name="TextBox 6">
-              <a:extLst>
-                <a:ext uri="{FF2B5EF4-FFF2-40B4-BE49-F238E27FC236}">
-                  <a16:creationId xmlns:a16="http://schemas.microsoft.com/office/drawing/2014/main" id="{E7BCC743-562A-4D98-8F0B-F0C1F5548A0F}"/>
-                </a:ext>
-              </a:extLst>
-            </p:cNvPr>
-            <p:cNvSpPr txBox="1"/>
-            <p:nvPr/>
-          </p:nvSpPr>
-          <p:spPr>
-            <a:xfrm>
-              <a:off x="942584" y="5482921"/>
-              <a:ext cx="4538861" cy="646331"/>
-            </a:xfrm>
-            <a:prstGeom prst="rect">
-              <a:avLst/>
-            </a:prstGeom>
-            <a:noFill/>
-          </p:spPr>
-          <p:txBody>
-            <a:bodyPr wrap="square" rtlCol="0">
-              <a:spAutoFit/>
-            </a:bodyPr>
-            <a:lstStyle/>
-            <a:p>
-              <a:r>
-                <a:rPr lang="en-US" dirty="0">
-                  <a:latin typeface="Arial" panose="020B0604020202020204" pitchFamily="34" charset="0"/>
-                  <a:cs typeface="Arial" panose="020B0604020202020204" pitchFamily="34" charset="0"/>
-                </a:rPr>
-                <a:t>Population of neurons whose average firing rate we want to encode and transmit</a:t>
-              </a:r>
-            </a:p>
-          </p:txBody>
-        </p:sp>
-        <p:sp>
-          <p:nvSpPr>
-            <p:cNvPr id="8" name="Oval 7">
-              <a:extLst>
-                <a:ext uri="{FF2B5EF4-FFF2-40B4-BE49-F238E27FC236}">
-                  <a16:creationId xmlns:a16="http://schemas.microsoft.com/office/drawing/2014/main" id="{5619D366-F32B-4044-9198-E43DF8592A5D}"/>
+                  <a16:creationId xmlns:a16="http://schemas.microsoft.com/office/drawing/2014/main" id="{28E99DA0-54C7-45EA-BCEF-11B68CAD0837}"/>
                 </a:ext>
               </a:extLst>
             </p:cNvPr>
@@ -3919,507 +3984,8 @@
           </p:nvSpPr>
           <p:spPr>
             <a:xfrm>
-              <a:off x="5335928" y="5356437"/>
-              <a:ext cx="197708" cy="205946"/>
-            </a:xfrm>
-            <a:prstGeom prst="ellipse">
-              <a:avLst/>
-            </a:prstGeom>
-          </p:spPr>
-          <p:style>
-            <a:lnRef idx="2">
-              <a:schemeClr val="accent1">
-                <a:shade val="50000"/>
-              </a:schemeClr>
-            </a:lnRef>
-            <a:fillRef idx="1">
-              <a:schemeClr val="accent1"/>
-            </a:fillRef>
-            <a:effectRef idx="0">
-              <a:schemeClr val="accent1"/>
-            </a:effectRef>
-            <a:fontRef idx="minor">
-              <a:schemeClr val="lt1"/>
-            </a:fontRef>
-          </p:style>
-          <p:txBody>
-            <a:bodyPr rtlCol="0" anchor="ctr"/>
-            <a:lstStyle/>
-            <a:p>
-              <a:pPr algn="ctr"/>
-              <a:endParaRPr lang="en-US"/>
-            </a:p>
-          </p:txBody>
-        </p:sp>
-        <p:sp>
-          <p:nvSpPr>
-            <p:cNvPr id="9" name="Oval 8">
-              <a:extLst>
-                <a:ext uri="{FF2B5EF4-FFF2-40B4-BE49-F238E27FC236}">
-                  <a16:creationId xmlns:a16="http://schemas.microsoft.com/office/drawing/2014/main" id="{C94162A4-2C9F-42EE-A02D-318995C45E48}"/>
-                </a:ext>
-              </a:extLst>
-            </p:cNvPr>
-            <p:cNvSpPr/>
-            <p:nvPr/>
-          </p:nvSpPr>
-          <p:spPr>
-            <a:xfrm>
-              <a:off x="6125148" y="5387036"/>
-              <a:ext cx="197708" cy="205946"/>
-            </a:xfrm>
-            <a:prstGeom prst="ellipse">
-              <a:avLst/>
-            </a:prstGeom>
-          </p:spPr>
-          <p:style>
-            <a:lnRef idx="2">
-              <a:schemeClr val="accent1">
-                <a:shade val="50000"/>
-              </a:schemeClr>
-            </a:lnRef>
-            <a:fillRef idx="1">
-              <a:schemeClr val="accent1"/>
-            </a:fillRef>
-            <a:effectRef idx="0">
-              <a:schemeClr val="accent1"/>
-            </a:effectRef>
-            <a:fontRef idx="minor">
-              <a:schemeClr val="lt1"/>
-            </a:fontRef>
-          </p:style>
-          <p:txBody>
-            <a:bodyPr rtlCol="0" anchor="ctr"/>
-            <a:lstStyle/>
-            <a:p>
-              <a:pPr algn="ctr"/>
-              <a:endParaRPr lang="en-US"/>
-            </a:p>
-          </p:txBody>
-        </p:sp>
-        <p:sp>
-          <p:nvSpPr>
-            <p:cNvPr id="10" name="Oval 9">
-              <a:extLst>
-                <a:ext uri="{FF2B5EF4-FFF2-40B4-BE49-F238E27FC236}">
-                  <a16:creationId xmlns:a16="http://schemas.microsoft.com/office/drawing/2014/main" id="{F1DAE79C-DCE5-4762-9064-3C79B0E43BB7}"/>
-                </a:ext>
-              </a:extLst>
-            </p:cNvPr>
-            <p:cNvSpPr/>
-            <p:nvPr/>
-          </p:nvSpPr>
-          <p:spPr>
-            <a:xfrm>
-              <a:off x="5687086" y="5683679"/>
-              <a:ext cx="197708" cy="205946"/>
-            </a:xfrm>
-            <a:prstGeom prst="ellipse">
-              <a:avLst/>
-            </a:prstGeom>
-          </p:spPr>
-          <p:style>
-            <a:lnRef idx="2">
-              <a:schemeClr val="accent1">
-                <a:shade val="50000"/>
-              </a:schemeClr>
-            </a:lnRef>
-            <a:fillRef idx="1">
-              <a:schemeClr val="accent1"/>
-            </a:fillRef>
-            <a:effectRef idx="0">
-              <a:schemeClr val="accent1"/>
-            </a:effectRef>
-            <a:fontRef idx="minor">
-              <a:schemeClr val="lt1"/>
-            </a:fontRef>
-          </p:style>
-          <p:txBody>
-            <a:bodyPr rtlCol="0" anchor="ctr"/>
-            <a:lstStyle/>
-            <a:p>
-              <a:pPr algn="ctr"/>
-              <a:endParaRPr lang="en-US"/>
-            </a:p>
-          </p:txBody>
-        </p:sp>
-        <p:sp>
-          <p:nvSpPr>
-            <p:cNvPr id="11" name="Oval 10">
-              <a:extLst>
-                <a:ext uri="{FF2B5EF4-FFF2-40B4-BE49-F238E27FC236}">
-                  <a16:creationId xmlns:a16="http://schemas.microsoft.com/office/drawing/2014/main" id="{FC495984-5100-47C3-96B0-8BF29592A95D}"/>
-                </a:ext>
-              </a:extLst>
-            </p:cNvPr>
-            <p:cNvSpPr/>
-            <p:nvPr/>
-          </p:nvSpPr>
-          <p:spPr>
-            <a:xfrm>
-              <a:off x="6596898" y="5562383"/>
-              <a:ext cx="197708" cy="205946"/>
-            </a:xfrm>
-            <a:prstGeom prst="ellipse">
-              <a:avLst/>
-            </a:prstGeom>
-          </p:spPr>
-          <p:style>
-            <a:lnRef idx="2">
-              <a:schemeClr val="accent1">
-                <a:shade val="50000"/>
-              </a:schemeClr>
-            </a:lnRef>
-            <a:fillRef idx="1">
-              <a:schemeClr val="accent1"/>
-            </a:fillRef>
-            <a:effectRef idx="0">
-              <a:schemeClr val="accent1"/>
-            </a:effectRef>
-            <a:fontRef idx="minor">
-              <a:schemeClr val="lt1"/>
-            </a:fontRef>
-          </p:style>
-          <p:txBody>
-            <a:bodyPr rtlCol="0" anchor="ctr"/>
-            <a:lstStyle/>
-            <a:p>
-              <a:pPr algn="ctr"/>
-              <a:endParaRPr lang="en-US"/>
-            </a:p>
-          </p:txBody>
-        </p:sp>
-        <p:cxnSp>
-          <p:nvCxnSpPr>
-            <p:cNvPr id="12" name="Straight Arrow Connector 11">
-              <a:extLst>
-                <a:ext uri="{FF2B5EF4-FFF2-40B4-BE49-F238E27FC236}">
-                  <a16:creationId xmlns:a16="http://schemas.microsoft.com/office/drawing/2014/main" id="{370678BA-4A76-491B-ADE2-74E2D158D768}"/>
-                </a:ext>
-              </a:extLst>
-            </p:cNvPr>
-            <p:cNvCxnSpPr>
-              <a:cxnSpLocks/>
-              <a:stCxn id="9" idx="0"/>
-            </p:cNvCxnSpPr>
-            <p:nvPr/>
-          </p:nvCxnSpPr>
-          <p:spPr>
-            <a:xfrm flipV="1">
-              <a:off x="6224002" y="4137490"/>
-              <a:ext cx="247394" cy="1249546"/>
-            </a:xfrm>
-            <a:prstGeom prst="straightConnector1">
-              <a:avLst/>
-            </a:prstGeom>
-            <a:ln>
-              <a:solidFill>
-                <a:schemeClr val="tx1"/>
-              </a:solidFill>
-              <a:tailEnd type="triangle"/>
-            </a:ln>
-          </p:spPr>
-          <p:style>
-            <a:lnRef idx="1">
-              <a:schemeClr val="accent1"/>
-            </a:lnRef>
-            <a:fillRef idx="0">
-              <a:schemeClr val="accent1"/>
-            </a:fillRef>
-            <a:effectRef idx="0">
-              <a:schemeClr val="accent1"/>
-            </a:effectRef>
-            <a:fontRef idx="minor">
-              <a:schemeClr val="tx1"/>
-            </a:fontRef>
-          </p:style>
-        </p:cxnSp>
-        <p:cxnSp>
-          <p:nvCxnSpPr>
-            <p:cNvPr id="13" name="Straight Arrow Connector 12">
-              <a:extLst>
-                <a:ext uri="{FF2B5EF4-FFF2-40B4-BE49-F238E27FC236}">
-                  <a16:creationId xmlns:a16="http://schemas.microsoft.com/office/drawing/2014/main" id="{ED06CC8E-5CF1-47BB-A32D-5F0763F3A01A}"/>
-                </a:ext>
-              </a:extLst>
-            </p:cNvPr>
-            <p:cNvCxnSpPr>
-              <a:cxnSpLocks/>
-              <a:stCxn id="10" idx="0"/>
-            </p:cNvCxnSpPr>
-            <p:nvPr/>
-          </p:nvCxnSpPr>
-          <p:spPr>
-            <a:xfrm flipV="1">
-              <a:off x="5785940" y="4110681"/>
-              <a:ext cx="719039" cy="1572998"/>
-            </a:xfrm>
-            <a:prstGeom prst="straightConnector1">
-              <a:avLst/>
-            </a:prstGeom>
-            <a:ln>
-              <a:solidFill>
-                <a:schemeClr val="tx1"/>
-              </a:solidFill>
-              <a:tailEnd type="triangle"/>
-            </a:ln>
-          </p:spPr>
-          <p:style>
-            <a:lnRef idx="1">
-              <a:schemeClr val="accent1"/>
-            </a:lnRef>
-            <a:fillRef idx="0">
-              <a:schemeClr val="accent1"/>
-            </a:fillRef>
-            <a:effectRef idx="0">
-              <a:schemeClr val="accent1"/>
-            </a:effectRef>
-            <a:fontRef idx="minor">
-              <a:schemeClr val="tx1"/>
-            </a:fontRef>
-          </p:style>
-        </p:cxnSp>
-        <p:cxnSp>
-          <p:nvCxnSpPr>
-            <p:cNvPr id="14" name="Straight Arrow Connector 13">
-              <a:extLst>
-                <a:ext uri="{FF2B5EF4-FFF2-40B4-BE49-F238E27FC236}">
-                  <a16:creationId xmlns:a16="http://schemas.microsoft.com/office/drawing/2014/main" id="{BE857334-4DEB-4C7D-A26B-CD79182666BD}"/>
-                </a:ext>
-              </a:extLst>
-            </p:cNvPr>
-            <p:cNvCxnSpPr>
-              <a:cxnSpLocks/>
-              <a:stCxn id="8" idx="0"/>
-            </p:cNvCxnSpPr>
-            <p:nvPr/>
-          </p:nvCxnSpPr>
-          <p:spPr>
-            <a:xfrm flipV="1">
-              <a:off x="5434782" y="3778285"/>
-              <a:ext cx="98854" cy="1578152"/>
-            </a:xfrm>
-            <a:prstGeom prst="straightConnector1">
-              <a:avLst/>
-            </a:prstGeom>
-            <a:ln>
-              <a:solidFill>
-                <a:schemeClr val="tx1"/>
-              </a:solidFill>
-              <a:tailEnd type="triangle"/>
-            </a:ln>
-          </p:spPr>
-          <p:style>
-            <a:lnRef idx="1">
-              <a:schemeClr val="accent1"/>
-            </a:lnRef>
-            <a:fillRef idx="0">
-              <a:schemeClr val="accent1"/>
-            </a:fillRef>
-            <a:effectRef idx="0">
-              <a:schemeClr val="accent1"/>
-            </a:effectRef>
-            <a:fontRef idx="minor">
-              <a:schemeClr val="tx1"/>
-            </a:fontRef>
-          </p:style>
-        </p:cxnSp>
-        <p:cxnSp>
-          <p:nvCxnSpPr>
-            <p:cNvPr id="15" name="Straight Arrow Connector 14">
-              <a:extLst>
-                <a:ext uri="{FF2B5EF4-FFF2-40B4-BE49-F238E27FC236}">
-                  <a16:creationId xmlns:a16="http://schemas.microsoft.com/office/drawing/2014/main" id="{E267DCEF-6217-4E1C-9ECB-57595E0BE8F2}"/>
-                </a:ext>
-              </a:extLst>
-            </p:cNvPr>
-            <p:cNvCxnSpPr>
-              <a:cxnSpLocks/>
-              <a:stCxn id="11" idx="0"/>
-            </p:cNvCxnSpPr>
-            <p:nvPr/>
-          </p:nvCxnSpPr>
-          <p:spPr>
-            <a:xfrm flipH="1" flipV="1">
-              <a:off x="6460777" y="4110681"/>
-              <a:ext cx="234975" cy="1451702"/>
-            </a:xfrm>
-            <a:prstGeom prst="straightConnector1">
-              <a:avLst/>
-            </a:prstGeom>
-            <a:ln>
-              <a:solidFill>
-                <a:schemeClr val="tx1"/>
-              </a:solidFill>
-              <a:tailEnd type="triangle"/>
-            </a:ln>
-          </p:spPr>
-          <p:style>
-            <a:lnRef idx="1">
-              <a:schemeClr val="accent1"/>
-            </a:lnRef>
-            <a:fillRef idx="0">
-              <a:schemeClr val="accent1"/>
-            </a:fillRef>
-            <a:effectRef idx="0">
-              <a:schemeClr val="accent1"/>
-            </a:effectRef>
-            <a:fontRef idx="minor">
-              <a:schemeClr val="tx1"/>
-            </a:fontRef>
-          </p:style>
-        </p:cxnSp>
-        <p:cxnSp>
-          <p:nvCxnSpPr>
-            <p:cNvPr id="16" name="Straight Arrow Connector 15">
-              <a:extLst>
-                <a:ext uri="{FF2B5EF4-FFF2-40B4-BE49-F238E27FC236}">
-                  <a16:creationId xmlns:a16="http://schemas.microsoft.com/office/drawing/2014/main" id="{FDE4F8BF-B450-41A4-9819-EE863C2B8B65}"/>
-                </a:ext>
-              </a:extLst>
-            </p:cNvPr>
-            <p:cNvCxnSpPr>
-              <a:cxnSpLocks/>
-              <a:stCxn id="10" idx="0"/>
-            </p:cNvCxnSpPr>
-            <p:nvPr/>
-          </p:nvCxnSpPr>
-          <p:spPr>
-            <a:xfrm flipV="1">
-              <a:off x="5785940" y="4506741"/>
-              <a:ext cx="164020" cy="1176938"/>
-            </a:xfrm>
-            <a:prstGeom prst="straightConnector1">
-              <a:avLst/>
-            </a:prstGeom>
-            <a:ln>
-              <a:solidFill>
-                <a:schemeClr val="tx1"/>
-              </a:solidFill>
-              <a:tailEnd type="triangle"/>
-            </a:ln>
-          </p:spPr>
-          <p:style>
-            <a:lnRef idx="1">
-              <a:schemeClr val="accent1"/>
-            </a:lnRef>
-            <a:fillRef idx="0">
-              <a:schemeClr val="accent1"/>
-            </a:fillRef>
-            <a:effectRef idx="0">
-              <a:schemeClr val="accent1"/>
-            </a:effectRef>
-            <a:fontRef idx="minor">
-              <a:schemeClr val="tx1"/>
-            </a:fontRef>
-          </p:style>
-        </p:cxnSp>
-        <p:cxnSp>
-          <p:nvCxnSpPr>
-            <p:cNvPr id="17" name="Straight Arrow Connector 16">
-              <a:extLst>
-                <a:ext uri="{FF2B5EF4-FFF2-40B4-BE49-F238E27FC236}">
-                  <a16:creationId xmlns:a16="http://schemas.microsoft.com/office/drawing/2014/main" id="{81433BF7-D966-49D1-84B8-43BB7C281D71}"/>
-                </a:ext>
-              </a:extLst>
-            </p:cNvPr>
-            <p:cNvCxnSpPr>
-              <a:cxnSpLocks/>
-              <a:stCxn id="9" idx="0"/>
-            </p:cNvCxnSpPr>
-            <p:nvPr/>
-          </p:nvCxnSpPr>
-          <p:spPr>
-            <a:xfrm flipH="1" flipV="1">
-              <a:off x="5976608" y="4544404"/>
-              <a:ext cx="247394" cy="842632"/>
-            </a:xfrm>
-            <a:prstGeom prst="straightConnector1">
-              <a:avLst/>
-            </a:prstGeom>
-            <a:ln>
-              <a:solidFill>
-                <a:schemeClr val="tx1"/>
-              </a:solidFill>
-              <a:tailEnd type="triangle"/>
-            </a:ln>
-          </p:spPr>
-          <p:style>
-            <a:lnRef idx="1">
-              <a:schemeClr val="accent1"/>
-            </a:lnRef>
-            <a:fillRef idx="0">
-              <a:schemeClr val="accent1"/>
-            </a:fillRef>
-            <a:effectRef idx="0">
-              <a:schemeClr val="accent1"/>
-            </a:effectRef>
-            <a:fontRef idx="minor">
-              <a:schemeClr val="tx1"/>
-            </a:fontRef>
-          </p:style>
-        </p:cxnSp>
-        <p:cxnSp>
-          <p:nvCxnSpPr>
-            <p:cNvPr id="18" name="Straight Arrow Connector 17">
-              <a:extLst>
-                <a:ext uri="{FF2B5EF4-FFF2-40B4-BE49-F238E27FC236}">
-                  <a16:creationId xmlns:a16="http://schemas.microsoft.com/office/drawing/2014/main" id="{72F79803-47CA-4697-977E-4CA25A46D866}"/>
-                </a:ext>
-              </a:extLst>
-            </p:cNvPr>
-            <p:cNvCxnSpPr>
-              <a:cxnSpLocks/>
-              <a:stCxn id="11" idx="0"/>
-            </p:cNvCxnSpPr>
-            <p:nvPr/>
-          </p:nvCxnSpPr>
-          <p:spPr>
-            <a:xfrm flipV="1">
-              <a:off x="6695752" y="4085260"/>
-              <a:ext cx="339208" cy="1477123"/>
-            </a:xfrm>
-            <a:prstGeom prst="straightConnector1">
-              <a:avLst/>
-            </a:prstGeom>
-            <a:ln>
-              <a:solidFill>
-                <a:schemeClr val="tx1"/>
-              </a:solidFill>
-              <a:tailEnd type="triangle"/>
-            </a:ln>
-          </p:spPr>
-          <p:style>
-            <a:lnRef idx="1">
-              <a:schemeClr val="accent1"/>
-            </a:lnRef>
-            <a:fillRef idx="0">
-              <a:schemeClr val="accent1"/>
-            </a:fillRef>
-            <a:effectRef idx="0">
-              <a:schemeClr val="accent1"/>
-            </a:effectRef>
-            <a:fontRef idx="minor">
-              <a:schemeClr val="tx1"/>
-            </a:fontRef>
-          </p:style>
-        </p:cxnSp>
-        <p:sp>
-          <p:nvSpPr>
-            <p:cNvPr id="19" name="Oval 18">
-              <a:extLst>
-                <a:ext uri="{FF2B5EF4-FFF2-40B4-BE49-F238E27FC236}">
-                  <a16:creationId xmlns:a16="http://schemas.microsoft.com/office/drawing/2014/main" id="{2AA3CAF3-0EF3-4755-957D-40266EDD95CA}"/>
-                </a:ext>
-              </a:extLst>
-            </p:cNvPr>
-            <p:cNvSpPr/>
-            <p:nvPr/>
-          </p:nvSpPr>
-          <p:spPr>
-            <a:xfrm>
-              <a:off x="5142473" y="2450853"/>
-              <a:ext cx="1920861" cy="2161193"/>
+              <a:off x="3238204" y="4761398"/>
+              <a:ext cx="1480224" cy="592440"/>
             </a:xfrm>
             <a:prstGeom prst="ellipse">
               <a:avLst/>
@@ -4460,10 +4026,10 @@
         </p:sp>
         <p:sp>
           <p:nvSpPr>
-            <p:cNvPr id="20" name="Oval 19">
+            <p:cNvPr id="11" name="Oval 10">
               <a:extLst>
                 <a:ext uri="{FF2B5EF4-FFF2-40B4-BE49-F238E27FC236}">
-                  <a16:creationId xmlns:a16="http://schemas.microsoft.com/office/drawing/2014/main" id="{6C6A6F9A-8A23-48C6-90D5-3EB8E39BF97A}"/>
+                  <a16:creationId xmlns:a16="http://schemas.microsoft.com/office/drawing/2014/main" id="{66AC719F-F816-43C3-9A1D-2EB1EAAB8F8B}"/>
                 </a:ext>
               </a:extLst>
             </p:cNvPr>
@@ -4472,8 +4038,8 @@
           </p:nvSpPr>
           <p:spPr>
             <a:xfrm>
-              <a:off x="5142473" y="1483154"/>
-              <a:ext cx="1967869" cy="1777442"/>
+              <a:off x="3238204" y="2299854"/>
+              <a:ext cx="1480225" cy="454891"/>
             </a:xfrm>
             <a:prstGeom prst="ellipse">
               <a:avLst/>
@@ -4512,270 +4078,321 @@
             </a:p>
           </p:txBody>
         </p:sp>
+      </p:grpSp>
+      <p:sp>
+        <p:nvSpPr>
+          <p:cNvPr id="12" name="TextBox 11">
+            <a:extLst>
+              <a:ext uri="{FF2B5EF4-FFF2-40B4-BE49-F238E27FC236}">
+                <a16:creationId xmlns:a16="http://schemas.microsoft.com/office/drawing/2014/main" id="{7EB8CDA6-A2C1-41BF-A742-EEBA9DE0643B}"/>
+              </a:ext>
+            </a:extLst>
+          </p:cNvPr>
+          <p:cNvSpPr txBox="1"/>
+          <p:nvPr/>
+        </p:nvSpPr>
+        <p:spPr>
+          <a:xfrm>
+            <a:off x="430698" y="5656106"/>
+            <a:ext cx="3059275" cy="830997"/>
+          </a:xfrm>
+          <a:prstGeom prst="rect">
+            <a:avLst/>
+          </a:prstGeom>
+          <a:noFill/>
+        </p:spPr>
+        <p:txBody>
+          <a:bodyPr wrap="square" rtlCol="0">
+            <a:spAutoFit/>
+          </a:bodyPr>
+          <a:lstStyle/>
+          <a:p>
+            <a:r>
+              <a:rPr lang="en-US" sz="1600" dirty="0">
+                <a:latin typeface="Arial" panose="020B0604020202020204" pitchFamily="34" charset="0"/>
+                <a:cs typeface="Arial" panose="020B0604020202020204" pitchFamily="34" charset="0"/>
+              </a:rPr>
+              <a:t>Population of neurons whose average firing rate we want to encode and transmit</a:t>
+            </a:r>
+          </a:p>
+        </p:txBody>
+      </p:sp>
+      <p:grpSp>
+        <p:nvGrpSpPr>
+          <p:cNvPr id="20" name="Group 19">
+            <a:extLst>
+              <a:ext uri="{FF2B5EF4-FFF2-40B4-BE49-F238E27FC236}">
+                <a16:creationId xmlns:a16="http://schemas.microsoft.com/office/drawing/2014/main" id="{ED26298E-10EC-4881-878C-39D60BA35711}"/>
+              </a:ext>
+            </a:extLst>
+          </p:cNvPr>
+          <p:cNvGrpSpPr/>
+          <p:nvPr/>
+        </p:nvGrpSpPr>
+        <p:grpSpPr>
+          <a:xfrm>
+            <a:off x="3360494" y="5439496"/>
+            <a:ext cx="1967869" cy="845112"/>
+            <a:chOff x="4666088" y="5742156"/>
+            <a:chExt cx="1967869" cy="845112"/>
+          </a:xfrm>
+        </p:grpSpPr>
         <p:sp>
           <p:nvSpPr>
-            <p:cNvPr id="21" name="TextBox 20">
+            <p:cNvPr id="14" name="Oval 13">
               <a:extLst>
                 <a:ext uri="{FF2B5EF4-FFF2-40B4-BE49-F238E27FC236}">
-                  <a16:creationId xmlns:a16="http://schemas.microsoft.com/office/drawing/2014/main" id="{DB3AA3CB-0234-4ACE-B928-4C8B42DD4559}"/>
+                  <a16:creationId xmlns:a16="http://schemas.microsoft.com/office/drawing/2014/main" id="{BCFD0439-5562-48D7-899D-3B3918DB7176}"/>
                 </a:ext>
               </a:extLst>
             </p:cNvPr>
-            <p:cNvSpPr txBox="1"/>
+            <p:cNvSpPr/>
             <p:nvPr/>
           </p:nvSpPr>
           <p:spPr>
             <a:xfrm>
-              <a:off x="3289912" y="4652063"/>
-              <a:ext cx="1701898" cy="461665"/>
+              <a:off x="4666088" y="5742156"/>
+              <a:ext cx="1967869" cy="845112"/>
             </a:xfrm>
-            <a:prstGeom prst="rect">
+            <a:prstGeom prst="ellipse">
               <a:avLst/>
             </a:prstGeom>
             <a:noFill/>
+            <a:ln>
+              <a:solidFill>
+                <a:schemeClr val="tx1"/>
+              </a:solidFill>
+              <a:prstDash val="dash"/>
+            </a:ln>
           </p:spPr>
+          <p:style>
+            <a:lnRef idx="2">
+              <a:schemeClr val="accent1">
+                <a:shade val="50000"/>
+              </a:schemeClr>
+            </a:lnRef>
+            <a:fillRef idx="1">
+              <a:schemeClr val="accent1"/>
+            </a:fillRef>
+            <a:effectRef idx="0">
+              <a:schemeClr val="accent1"/>
+            </a:effectRef>
+            <a:fontRef idx="minor">
+              <a:schemeClr val="lt1"/>
+            </a:fontRef>
+          </p:style>
           <p:txBody>
-            <a:bodyPr wrap="square" rtlCol="0">
-              <a:spAutoFit/>
-            </a:bodyPr>
+            <a:bodyPr rtlCol="0" anchor="ctr"/>
             <a:lstStyle/>
             <a:p>
-              <a:r>
-                <a:rPr lang="en-US" sz="1200" dirty="0">
-                  <a:latin typeface="Arial" panose="020B0604020202020204" pitchFamily="34" charset="0"/>
-                  <a:cs typeface="Arial" panose="020B0604020202020204" pitchFamily="34" charset="0"/>
-                </a:rPr>
-                <a:t>Input to base layer of SCE</a:t>
-              </a:r>
+              <a:pPr algn="ctr"/>
+              <a:endParaRPr lang="en-US"/>
             </a:p>
           </p:txBody>
         </p:sp>
         <p:sp>
           <p:nvSpPr>
-            <p:cNvPr id="22" name="TextBox 21">
+            <p:cNvPr id="15" name="Oval 14">
               <a:extLst>
                 <a:ext uri="{FF2B5EF4-FFF2-40B4-BE49-F238E27FC236}">
-                  <a16:creationId xmlns:a16="http://schemas.microsoft.com/office/drawing/2014/main" id="{70C626B9-3D88-43A8-8752-783C2939249E}"/>
+                  <a16:creationId xmlns:a16="http://schemas.microsoft.com/office/drawing/2014/main" id="{56042661-468F-4E4A-969E-1F1BBDFEFA1B}"/>
                 </a:ext>
               </a:extLst>
             </p:cNvPr>
-            <p:cNvSpPr txBox="1"/>
+            <p:cNvSpPr/>
             <p:nvPr/>
           </p:nvSpPr>
           <p:spPr>
             <a:xfrm>
-              <a:off x="2713186" y="2970493"/>
-              <a:ext cx="1968503" cy="461665"/>
+              <a:off x="5069609" y="5928167"/>
+              <a:ext cx="197708" cy="205946"/>
             </a:xfrm>
-            <a:prstGeom prst="rect">
+            <a:prstGeom prst="ellipse">
               <a:avLst/>
             </a:prstGeom>
-            <a:noFill/>
           </p:spPr>
+          <p:style>
+            <a:lnRef idx="2">
+              <a:schemeClr val="accent1">
+                <a:shade val="50000"/>
+              </a:schemeClr>
+            </a:lnRef>
+            <a:fillRef idx="1">
+              <a:schemeClr val="accent1"/>
+            </a:fillRef>
+            <a:effectRef idx="0">
+              <a:schemeClr val="accent1"/>
+            </a:effectRef>
+            <a:fontRef idx="minor">
+              <a:schemeClr val="lt1"/>
+            </a:fontRef>
+          </p:style>
           <p:txBody>
-            <a:bodyPr wrap="square" rtlCol="0">
-              <a:spAutoFit/>
-            </a:bodyPr>
+            <a:bodyPr rtlCol="0" anchor="ctr"/>
             <a:lstStyle/>
             <a:p>
-              <a:r>
-                <a:rPr lang="en-US" sz="1200" dirty="0">
-                  <a:latin typeface="Arial" panose="020B0604020202020204" pitchFamily="34" charset="0"/>
-                  <a:cs typeface="Arial" panose="020B0604020202020204" pitchFamily="34" charset="0"/>
-                </a:rPr>
-                <a:t>SCE, various topologies possible</a:t>
-              </a:r>
+              <a:pPr algn="ctr"/>
+              <a:endParaRPr lang="en-US"/>
             </a:p>
           </p:txBody>
         </p:sp>
-        <p:cxnSp>
-          <p:nvCxnSpPr>
-            <p:cNvPr id="23" name="Connector: Curved 22">
+        <p:sp>
+          <p:nvSpPr>
+            <p:cNvPr id="16" name="Oval 15">
               <a:extLst>
                 <a:ext uri="{FF2B5EF4-FFF2-40B4-BE49-F238E27FC236}">
-                  <a16:creationId xmlns:a16="http://schemas.microsoft.com/office/drawing/2014/main" id="{A4C40669-5A11-48FD-8C5A-6DFCA295FDAB}"/>
+                  <a16:creationId xmlns:a16="http://schemas.microsoft.com/office/drawing/2014/main" id="{6C7BDCEB-25E8-44AE-B68C-E636AFF7FFBC}"/>
                 </a:ext>
               </a:extLst>
             </p:cNvPr>
-            <p:cNvCxnSpPr>
-              <a:cxnSpLocks/>
-              <a:stCxn id="22" idx="3"/>
-            </p:cNvCxnSpPr>
-            <p:nvPr/>
-          </p:nvCxnSpPr>
-          <p:spPr>
-            <a:xfrm>
-              <a:off x="4681689" y="3201326"/>
-              <a:ext cx="1005397" cy="266804"/>
-            </a:xfrm>
-            <a:prstGeom prst="curvedConnector3">
-              <a:avLst>
-                <a:gd name="adj1" fmla="val 50000"/>
-              </a:avLst>
-            </a:prstGeom>
-            <a:ln>
-              <a:solidFill>
-                <a:schemeClr val="tx1"/>
-              </a:solidFill>
-              <a:tailEnd type="triangle"/>
-            </a:ln>
-          </p:spPr>
-          <p:style>
-            <a:lnRef idx="3">
-              <a:schemeClr val="accent6"/>
-            </a:lnRef>
-            <a:fillRef idx="0">
-              <a:schemeClr val="accent6"/>
-            </a:fillRef>
-            <a:effectRef idx="2">
-              <a:schemeClr val="accent6"/>
-            </a:effectRef>
-            <a:fontRef idx="minor">
-              <a:schemeClr val="tx1"/>
-            </a:fontRef>
-          </p:style>
-        </p:cxnSp>
-        <p:sp>
-          <p:nvSpPr>
-            <p:cNvPr id="24" name="TextBox 23">
-              <a:extLst>
-                <a:ext uri="{FF2B5EF4-FFF2-40B4-BE49-F238E27FC236}">
-                  <a16:creationId xmlns:a16="http://schemas.microsoft.com/office/drawing/2014/main" id="{55DA10A9-A49A-407C-B7AE-3E1E03268261}"/>
-                </a:ext>
-              </a:extLst>
-            </p:cNvPr>
-            <p:cNvSpPr txBox="1"/>
+            <p:cNvSpPr/>
             <p:nvPr/>
           </p:nvSpPr>
           <p:spPr>
             <a:xfrm>
-              <a:off x="2727728" y="1956159"/>
-              <a:ext cx="1818467" cy="461665"/>
+              <a:off x="5858829" y="5958766"/>
+              <a:ext cx="197708" cy="205946"/>
             </a:xfrm>
-            <a:prstGeom prst="rect">
+            <a:prstGeom prst="ellipse">
               <a:avLst/>
             </a:prstGeom>
-            <a:noFill/>
           </p:spPr>
+          <p:style>
+            <a:lnRef idx="2">
+              <a:schemeClr val="accent1">
+                <a:shade val="50000"/>
+              </a:schemeClr>
+            </a:lnRef>
+            <a:fillRef idx="1">
+              <a:schemeClr val="accent1"/>
+            </a:fillRef>
+            <a:effectRef idx="0">
+              <a:schemeClr val="accent1"/>
+            </a:effectRef>
+            <a:fontRef idx="minor">
+              <a:schemeClr val="lt1"/>
+            </a:fontRef>
+          </p:style>
           <p:txBody>
-            <a:bodyPr wrap="square" rtlCol="0">
-              <a:spAutoFit/>
-            </a:bodyPr>
+            <a:bodyPr rtlCol="0" anchor="ctr"/>
             <a:lstStyle/>
             <a:p>
-              <a:r>
-                <a:rPr lang="en-US" sz="1200" dirty="0">
-                  <a:latin typeface="Arial" panose="020B0604020202020204" pitchFamily="34" charset="0"/>
-                  <a:cs typeface="Arial" panose="020B0604020202020204" pitchFamily="34" charset="0"/>
-                </a:rPr>
-                <a:t>Output from top layer of SCE</a:t>
-              </a:r>
+              <a:pPr algn="ctr"/>
+              <a:endParaRPr lang="en-US"/>
             </a:p>
           </p:txBody>
         </p:sp>
-        <p:cxnSp>
-          <p:nvCxnSpPr>
-            <p:cNvPr id="25" name="Connector: Curved 24">
+        <p:sp>
+          <p:nvSpPr>
+            <p:cNvPr id="17" name="Oval 16">
               <a:extLst>
                 <a:ext uri="{FF2B5EF4-FFF2-40B4-BE49-F238E27FC236}">
-                  <a16:creationId xmlns:a16="http://schemas.microsoft.com/office/drawing/2014/main" id="{A45983D8-D165-45D5-A4A1-AAFAC4E3F7E5}"/>
+                  <a16:creationId xmlns:a16="http://schemas.microsoft.com/office/drawing/2014/main" id="{00F01924-8597-4B42-A24B-2FB6C00720AB}"/>
                 </a:ext>
               </a:extLst>
             </p:cNvPr>
-            <p:cNvCxnSpPr>
-              <a:cxnSpLocks/>
-              <a:stCxn id="24" idx="3"/>
-              <a:endCxn id="20" idx="2"/>
-            </p:cNvCxnSpPr>
+            <p:cNvSpPr/>
             <p:nvPr/>
-          </p:nvCxnSpPr>
+          </p:nvSpPr>
           <p:spPr>
             <a:xfrm>
-              <a:off x="4546195" y="2186992"/>
-              <a:ext cx="596278" cy="184883"/>
+              <a:off x="5420767" y="6255409"/>
+              <a:ext cx="197708" cy="205946"/>
             </a:xfrm>
-            <a:prstGeom prst="curvedConnector3">
-              <a:avLst>
-                <a:gd name="adj1" fmla="val 50000"/>
-              </a:avLst>
+            <a:prstGeom prst="ellipse">
+              <a:avLst/>
             </a:prstGeom>
-            <a:ln>
-              <a:solidFill>
-                <a:schemeClr val="tx1"/>
-              </a:solidFill>
-              <a:tailEnd type="triangle"/>
-            </a:ln>
           </p:spPr>
           <p:style>
-            <a:lnRef idx="3">
-              <a:schemeClr val="accent6"/>
+            <a:lnRef idx="2">
+              <a:schemeClr val="accent1">
+                <a:shade val="50000"/>
+              </a:schemeClr>
             </a:lnRef>
-            <a:fillRef idx="0">
-              <a:schemeClr val="accent6"/>
+            <a:fillRef idx="1">
+              <a:schemeClr val="accent1"/>
             </a:fillRef>
-            <a:effectRef idx="2">
-              <a:schemeClr val="accent6"/>
+            <a:effectRef idx="0">
+              <a:schemeClr val="accent1"/>
             </a:effectRef>
             <a:fontRef idx="minor">
-              <a:schemeClr val="tx1"/>
+              <a:schemeClr val="lt1"/>
             </a:fontRef>
           </p:style>
-        </p:cxnSp>
+          <p:txBody>
+            <a:bodyPr rtlCol="0" anchor="ctr"/>
+            <a:lstStyle/>
+            <a:p>
+              <a:pPr algn="ctr"/>
+              <a:endParaRPr lang="en-US"/>
+            </a:p>
+          </p:txBody>
+        </p:sp>
+        <p:sp>
+          <p:nvSpPr>
+            <p:cNvPr id="18" name="Oval 17">
+              <a:extLst>
+                <a:ext uri="{FF2B5EF4-FFF2-40B4-BE49-F238E27FC236}">
+                  <a16:creationId xmlns:a16="http://schemas.microsoft.com/office/drawing/2014/main" id="{5437040A-060B-4FDB-9E52-933446DAE270}"/>
+                </a:ext>
+              </a:extLst>
+            </p:cNvPr>
+            <p:cNvSpPr/>
+            <p:nvPr/>
+          </p:nvSpPr>
+          <p:spPr>
+            <a:xfrm>
+              <a:off x="6330579" y="6134113"/>
+              <a:ext cx="197708" cy="205946"/>
+            </a:xfrm>
+            <a:prstGeom prst="ellipse">
+              <a:avLst/>
+            </a:prstGeom>
+          </p:spPr>
+          <p:style>
+            <a:lnRef idx="2">
+              <a:schemeClr val="accent1">
+                <a:shade val="50000"/>
+              </a:schemeClr>
+            </a:lnRef>
+            <a:fillRef idx="1">
+              <a:schemeClr val="accent1"/>
+            </a:fillRef>
+            <a:effectRef idx="0">
+              <a:schemeClr val="accent1"/>
+            </a:effectRef>
+            <a:fontRef idx="minor">
+              <a:schemeClr val="lt1"/>
+            </a:fontRef>
+          </p:style>
+          <p:txBody>
+            <a:bodyPr rtlCol="0" anchor="ctr"/>
+            <a:lstStyle/>
+            <a:p>
+              <a:pPr algn="ctr"/>
+              <a:endParaRPr lang="en-US"/>
+            </a:p>
+          </p:txBody>
+        </p:sp>
       </p:grpSp>
-      <p:pic>
-        <p:nvPicPr>
-          <p:cNvPr id="34" name="Picture 33">
-            <a:extLst>
-              <a:ext uri="{FF2B5EF4-FFF2-40B4-BE49-F238E27FC236}">
-                <a16:creationId xmlns:a16="http://schemas.microsoft.com/office/drawing/2014/main" id="{320A0DCC-0E3F-4547-9EE8-257DFF0EF03B}"/>
-              </a:ext>
-            </a:extLst>
-          </p:cNvPr>
-          <p:cNvPicPr>
-            <a:picLocks noChangeAspect="1"/>
-          </p:cNvPicPr>
-          <p:nvPr/>
-        </p:nvPicPr>
-        <p:blipFill rotWithShape="1">
-          <a:blip r:embed="rId3">
-            <a:extLst>
-              <a:ext uri="{28A0092B-C50C-407E-A947-70E740481C1C}">
-                <a14:useLocalDpi xmlns:a14="http://schemas.microsoft.com/office/drawing/2010/main" val="0"/>
-              </a:ext>
-            </a:extLst>
-          </a:blip>
-          <a:srcRect t="33512" b="38457"/>
-          <a:stretch/>
-        </p:blipFill>
-        <p:spPr>
-          <a:xfrm>
-            <a:off x="8136467" y="4380666"/>
-            <a:ext cx="3419904" cy="1922323"/>
-          </a:xfrm>
-          <a:prstGeom prst="rect">
-            <a:avLst/>
-          </a:prstGeom>
-        </p:spPr>
-      </p:pic>
       <p:cxnSp>
         <p:nvCxnSpPr>
-          <p:cNvPr id="37" name="Straight Arrow Connector 36">
-            <a:extLst>
-              <a:ext uri="{FF2B5EF4-FFF2-40B4-BE49-F238E27FC236}">
-                <a16:creationId xmlns:a16="http://schemas.microsoft.com/office/drawing/2014/main" id="{771F6EDA-07A6-4E91-A633-FF6B48DEFA56}"/>
+          <p:cNvPr id="23" name="Straight Arrow Connector 22">
+            <a:extLst>
+              <a:ext uri="{FF2B5EF4-FFF2-40B4-BE49-F238E27FC236}">
+                <a16:creationId xmlns:a16="http://schemas.microsoft.com/office/drawing/2014/main" id="{E80DB934-FCBB-4307-8029-635F0E7F90C6}"/>
               </a:ext>
             </a:extLst>
           </p:cNvPr>
           <p:cNvCxnSpPr>
-            <a:cxnSpLocks/>
-            <a:stCxn id="30" idx="6"/>
+            <a:stCxn id="15" idx="0"/>
           </p:cNvCxnSpPr>
           <p:nvPr/>
         </p:nvCxnSpPr>
         <p:spPr>
           <a:xfrm flipV="1">
-            <a:off x="6844023" y="5493523"/>
-            <a:ext cx="1292444" cy="590103"/>
+            <a:off x="3862869" y="4673600"/>
+            <a:ext cx="252304" cy="951907"/>
           </a:xfrm>
           <a:prstGeom prst="straightConnector1">
             <a:avLst/>
@@ -4785,104 +4402,318 @@
           </a:ln>
         </p:spPr>
         <p:style>
-          <a:lnRef idx="2">
-            <a:schemeClr val="dk1"/>
+          <a:lnRef idx="1">
+            <a:schemeClr val="accent1"/>
           </a:lnRef>
           <a:fillRef idx="0">
-            <a:schemeClr val="dk1"/>
+            <a:schemeClr val="accent1"/>
           </a:fillRef>
-          <a:effectRef idx="1">
-            <a:schemeClr val="dk1"/>
+          <a:effectRef idx="0">
+            <a:schemeClr val="accent1"/>
           </a:effectRef>
           <a:fontRef idx="minor">
             <a:schemeClr val="tx1"/>
           </a:fontRef>
         </p:style>
       </p:cxnSp>
-      <p:sp>
-        <p:nvSpPr>
-          <p:cNvPr id="45" name="TextBox 44">
-            <a:extLst>
-              <a:ext uri="{FF2B5EF4-FFF2-40B4-BE49-F238E27FC236}">
-                <a16:creationId xmlns:a16="http://schemas.microsoft.com/office/drawing/2014/main" id="{43BDF72F-4117-4702-867C-05D7A898754D}"/>
-              </a:ext>
-            </a:extLst>
-          </p:cNvPr>
-          <p:cNvSpPr txBox="1"/>
-          <p:nvPr/>
-        </p:nvSpPr>
-        <p:spPr>
-          <a:xfrm>
-            <a:off x="8136467" y="4033569"/>
-            <a:ext cx="3578176" cy="523220"/>
-          </a:xfrm>
-          <a:prstGeom prst="rect">
-            <a:avLst/>
-          </a:prstGeom>
-          <a:noFill/>
-        </p:spPr>
-        <p:txBody>
-          <a:bodyPr wrap="square" rtlCol="0">
-            <a:spAutoFit/>
-          </a:bodyPr>
-          <a:lstStyle/>
-          <a:p>
-            <a:r>
-              <a:rPr lang="en-US" sz="1400" dirty="0">
-                <a:latin typeface="Arial" panose="020B0604020202020204" pitchFamily="34" charset="0"/>
-                <a:cs typeface="Arial" panose="020B0604020202020204" pitchFamily="34" charset="0"/>
-              </a:rPr>
-              <a:t>Spike raster plot of a population of 50 neurons with a 10 Hz average firing rate.</a:t>
-            </a:r>
-          </a:p>
-        </p:txBody>
-      </p:sp>
       <p:cxnSp>
         <p:nvCxnSpPr>
-          <p:cNvPr id="41" name="Straight Arrow Connector 40">
-            <a:extLst>
-              <a:ext uri="{FF2B5EF4-FFF2-40B4-BE49-F238E27FC236}">
-                <a16:creationId xmlns:a16="http://schemas.microsoft.com/office/drawing/2014/main" id="{BD0BDD1A-F449-4E33-BF98-33898896CCB7}"/>
-              </a:ext>
-            </a:extLst>
-          </p:cNvPr>
-          <p:cNvCxnSpPr/>
+          <p:cNvPr id="24" name="Straight Arrow Connector 23">
+            <a:extLst>
+              <a:ext uri="{FF2B5EF4-FFF2-40B4-BE49-F238E27FC236}">
+                <a16:creationId xmlns:a16="http://schemas.microsoft.com/office/drawing/2014/main" id="{61727334-D316-4800-A108-58D72940FB85}"/>
+              </a:ext>
+            </a:extLst>
+          </p:cNvPr>
+          <p:cNvCxnSpPr>
+            <a:cxnSpLocks/>
+            <a:stCxn id="15" idx="7"/>
+          </p:cNvCxnSpPr>
           <p:nvPr/>
         </p:nvCxnSpPr>
         <p:spPr>
-          <a:xfrm>
-            <a:off x="8779096" y="6284712"/>
-            <a:ext cx="2463800" cy="0"/>
+          <a:xfrm flipV="1">
+            <a:off x="3932769" y="4761398"/>
+            <a:ext cx="620466" cy="894269"/>
           </a:xfrm>
           <a:prstGeom prst="straightConnector1">
             <a:avLst/>
           </a:prstGeom>
           <a:ln>
-            <a:headEnd type="triangle"/>
             <a:tailEnd type="triangle"/>
           </a:ln>
         </p:spPr>
         <p:style>
           <a:lnRef idx="1">
-            <a:schemeClr val="dk1"/>
+            <a:schemeClr val="accent1"/>
           </a:lnRef>
           <a:fillRef idx="0">
-            <a:schemeClr val="dk1"/>
+            <a:schemeClr val="accent1"/>
           </a:fillRef>
           <a:effectRef idx="0">
-            <a:schemeClr val="dk1"/>
+            <a:schemeClr val="accent1"/>
           </a:effectRef>
           <a:fontRef idx="minor">
             <a:schemeClr val="tx1"/>
           </a:fontRef>
         </p:style>
       </p:cxnSp>
-      <p:sp>
-        <p:nvSpPr>
-          <p:cNvPr id="47" name="TextBox 46">
-            <a:extLst>
-              <a:ext uri="{FF2B5EF4-FFF2-40B4-BE49-F238E27FC236}">
-                <a16:creationId xmlns:a16="http://schemas.microsoft.com/office/drawing/2014/main" id="{CBD8AA63-FC3E-482D-B9C4-A900BFD1276D}"/>
+      <p:cxnSp>
+        <p:nvCxnSpPr>
+          <p:cNvPr id="27" name="Straight Arrow Connector 26">
+            <a:extLst>
+              <a:ext uri="{FF2B5EF4-FFF2-40B4-BE49-F238E27FC236}">
+                <a16:creationId xmlns:a16="http://schemas.microsoft.com/office/drawing/2014/main" id="{D10608F6-D094-40CB-A0B2-7943950A691D}"/>
+              </a:ext>
+            </a:extLst>
+          </p:cNvPr>
+          <p:cNvCxnSpPr>
+            <a:cxnSpLocks/>
+            <a:stCxn id="17" idx="0"/>
+          </p:cNvCxnSpPr>
+          <p:nvPr/>
+        </p:nvCxnSpPr>
+        <p:spPr>
+          <a:xfrm flipV="1">
+            <a:off x="4214027" y="4839973"/>
+            <a:ext cx="98795" cy="1112776"/>
+          </a:xfrm>
+          <a:prstGeom prst="straightConnector1">
+            <a:avLst/>
+          </a:prstGeom>
+          <a:ln>
+            <a:tailEnd type="triangle"/>
+          </a:ln>
+        </p:spPr>
+        <p:style>
+          <a:lnRef idx="1">
+            <a:schemeClr val="accent1"/>
+          </a:lnRef>
+          <a:fillRef idx="0">
+            <a:schemeClr val="accent1"/>
+          </a:fillRef>
+          <a:effectRef idx="0">
+            <a:schemeClr val="accent1"/>
+          </a:effectRef>
+          <a:fontRef idx="minor">
+            <a:schemeClr val="tx1"/>
+          </a:fontRef>
+        </p:style>
+      </p:cxnSp>
+      <p:cxnSp>
+        <p:nvCxnSpPr>
+          <p:cNvPr id="30" name="Straight Arrow Connector 29">
+            <a:extLst>
+              <a:ext uri="{FF2B5EF4-FFF2-40B4-BE49-F238E27FC236}">
+                <a16:creationId xmlns:a16="http://schemas.microsoft.com/office/drawing/2014/main" id="{5D3D8E29-0D79-450A-9F5B-1D0160B0F138}"/>
+              </a:ext>
+            </a:extLst>
+          </p:cNvPr>
+          <p:cNvCxnSpPr>
+            <a:cxnSpLocks/>
+            <a:stCxn id="16" idx="0"/>
+          </p:cNvCxnSpPr>
+          <p:nvPr/>
+        </p:nvCxnSpPr>
+        <p:spPr>
+          <a:xfrm flipH="1" flipV="1">
+            <a:off x="4575470" y="4748757"/>
+            <a:ext cx="76619" cy="907349"/>
+          </a:xfrm>
+          <a:prstGeom prst="straightConnector1">
+            <a:avLst/>
+          </a:prstGeom>
+          <a:ln>
+            <a:tailEnd type="triangle"/>
+          </a:ln>
+        </p:spPr>
+        <p:style>
+          <a:lnRef idx="1">
+            <a:schemeClr val="accent1"/>
+          </a:lnRef>
+          <a:fillRef idx="0">
+            <a:schemeClr val="accent1"/>
+          </a:fillRef>
+          <a:effectRef idx="0">
+            <a:schemeClr val="accent1"/>
+          </a:effectRef>
+          <a:fontRef idx="minor">
+            <a:schemeClr val="tx1"/>
+          </a:fontRef>
+        </p:style>
+      </p:cxnSp>
+      <p:cxnSp>
+        <p:nvCxnSpPr>
+          <p:cNvPr id="33" name="Straight Arrow Connector 32">
+            <a:extLst>
+              <a:ext uri="{FF2B5EF4-FFF2-40B4-BE49-F238E27FC236}">
+                <a16:creationId xmlns:a16="http://schemas.microsoft.com/office/drawing/2014/main" id="{D64B55C5-B321-4299-98E1-F7FCB3A124D9}"/>
+              </a:ext>
+            </a:extLst>
+          </p:cNvPr>
+          <p:cNvCxnSpPr>
+            <a:cxnSpLocks/>
+            <a:stCxn id="16" idx="0"/>
+          </p:cNvCxnSpPr>
+          <p:nvPr/>
+        </p:nvCxnSpPr>
+        <p:spPr>
+          <a:xfrm flipH="1" flipV="1">
+            <a:off x="4354067" y="4585275"/>
+            <a:ext cx="298022" cy="1070831"/>
+          </a:xfrm>
+          <a:prstGeom prst="straightConnector1">
+            <a:avLst/>
+          </a:prstGeom>
+          <a:ln>
+            <a:tailEnd type="triangle"/>
+          </a:ln>
+        </p:spPr>
+        <p:style>
+          <a:lnRef idx="1">
+            <a:schemeClr val="accent1"/>
+          </a:lnRef>
+          <a:fillRef idx="0">
+            <a:schemeClr val="accent1"/>
+          </a:fillRef>
+          <a:effectRef idx="0">
+            <a:schemeClr val="accent1"/>
+          </a:effectRef>
+          <a:fontRef idx="minor">
+            <a:schemeClr val="tx1"/>
+          </a:fontRef>
+        </p:style>
+      </p:cxnSp>
+      <p:cxnSp>
+        <p:nvCxnSpPr>
+          <p:cNvPr id="36" name="Straight Arrow Connector 35">
+            <a:extLst>
+              <a:ext uri="{FF2B5EF4-FFF2-40B4-BE49-F238E27FC236}">
+                <a16:creationId xmlns:a16="http://schemas.microsoft.com/office/drawing/2014/main" id="{9F3DA7FF-3A90-41EB-931E-9458C1FA28FA}"/>
+              </a:ext>
+            </a:extLst>
+          </p:cNvPr>
+          <p:cNvCxnSpPr>
+            <a:cxnSpLocks/>
+            <a:stCxn id="18" idx="1"/>
+          </p:cNvCxnSpPr>
+          <p:nvPr/>
+        </p:nvCxnSpPr>
+        <p:spPr>
+          <a:xfrm flipH="1" flipV="1">
+            <a:off x="4551716" y="4748757"/>
+            <a:ext cx="502223" cy="1112856"/>
+          </a:xfrm>
+          <a:prstGeom prst="straightConnector1">
+            <a:avLst/>
+          </a:prstGeom>
+          <a:ln>
+            <a:tailEnd type="triangle"/>
+          </a:ln>
+        </p:spPr>
+        <p:style>
+          <a:lnRef idx="1">
+            <a:schemeClr val="accent1"/>
+          </a:lnRef>
+          <a:fillRef idx="0">
+            <a:schemeClr val="accent1"/>
+          </a:fillRef>
+          <a:effectRef idx="0">
+            <a:schemeClr val="accent1"/>
+          </a:effectRef>
+          <a:fontRef idx="minor">
+            <a:schemeClr val="tx1"/>
+          </a:fontRef>
+        </p:style>
+      </p:cxnSp>
+      <p:cxnSp>
+        <p:nvCxnSpPr>
+          <p:cNvPr id="40" name="Straight Arrow Connector 39">
+            <a:extLst>
+              <a:ext uri="{FF2B5EF4-FFF2-40B4-BE49-F238E27FC236}">
+                <a16:creationId xmlns:a16="http://schemas.microsoft.com/office/drawing/2014/main" id="{6AD37AE1-D043-44DE-9EE7-54011D4A1758}"/>
+              </a:ext>
+            </a:extLst>
+          </p:cNvPr>
+          <p:cNvCxnSpPr>
+            <a:stCxn id="10" idx="6"/>
+          </p:cNvCxnSpPr>
+          <p:nvPr/>
+        </p:nvCxnSpPr>
+        <p:spPr>
+          <a:xfrm flipV="1">
+            <a:off x="5052934" y="3768436"/>
+            <a:ext cx="1874339" cy="980321"/>
+          </a:xfrm>
+          <a:prstGeom prst="straightConnector1">
+            <a:avLst/>
+          </a:prstGeom>
+          <a:ln>
+            <a:tailEnd type="triangle"/>
+          </a:ln>
+        </p:spPr>
+        <p:style>
+          <a:lnRef idx="1">
+            <a:schemeClr val="accent1"/>
+          </a:lnRef>
+          <a:fillRef idx="0">
+            <a:schemeClr val="accent1"/>
+          </a:fillRef>
+          <a:effectRef idx="0">
+            <a:schemeClr val="accent1"/>
+          </a:effectRef>
+          <a:fontRef idx="minor">
+            <a:schemeClr val="tx1"/>
+          </a:fontRef>
+        </p:style>
+      </p:cxnSp>
+      <p:cxnSp>
+        <p:nvCxnSpPr>
+          <p:cNvPr id="41" name="Straight Arrow Connector 40">
+            <a:extLst>
+              <a:ext uri="{FF2B5EF4-FFF2-40B4-BE49-F238E27FC236}">
+                <a16:creationId xmlns:a16="http://schemas.microsoft.com/office/drawing/2014/main" id="{0341B81C-A472-411F-B73B-932F8B8732AC}"/>
+              </a:ext>
+            </a:extLst>
+          </p:cNvPr>
+          <p:cNvCxnSpPr>
+            <a:cxnSpLocks/>
+          </p:cNvCxnSpPr>
+          <p:nvPr/>
+        </p:nvCxnSpPr>
+        <p:spPr>
+          <a:xfrm>
+            <a:off x="5052432" y="2239401"/>
+            <a:ext cx="1690475" cy="119185"/>
+          </a:xfrm>
+          <a:prstGeom prst="straightConnector1">
+            <a:avLst/>
+          </a:prstGeom>
+          <a:ln>
+            <a:tailEnd type="triangle"/>
+          </a:ln>
+        </p:spPr>
+        <p:style>
+          <a:lnRef idx="1">
+            <a:schemeClr val="accent1"/>
+          </a:lnRef>
+          <a:fillRef idx="0">
+            <a:schemeClr val="accent1"/>
+          </a:fillRef>
+          <a:effectRef idx="0">
+            <a:schemeClr val="accent1"/>
+          </a:effectRef>
+          <a:fontRef idx="minor">
+            <a:schemeClr val="tx1"/>
+          </a:fontRef>
+        </p:style>
+      </p:cxnSp>
+      <p:sp>
+        <p:nvSpPr>
+          <p:cNvPr id="44" name="TextBox 43">
+            <a:extLst>
+              <a:ext uri="{FF2B5EF4-FFF2-40B4-BE49-F238E27FC236}">
+                <a16:creationId xmlns:a16="http://schemas.microsoft.com/office/drawing/2014/main" id="{5FE88E63-FF72-4170-A130-525C2DA0E631}"/>
               </a:ext>
             </a:extLst>
           </p:cNvPr>
@@ -4891,8 +4722,8 @@
         </p:nvSpPr>
         <p:spPr>
           <a:xfrm>
-            <a:off x="9517704" y="6261944"/>
-            <a:ext cx="1254620" cy="307777"/>
+            <a:off x="2424870" y="4536852"/>
+            <a:ext cx="1193853" cy="369332"/>
           </a:xfrm>
           <a:prstGeom prst="rect">
             <a:avLst/>
@@ -4900,17 +4731,49 @@
           <a:noFill/>
         </p:spPr>
         <p:txBody>
-          <a:bodyPr wrap="square" rtlCol="0">
+          <a:bodyPr wrap="none" rtlCol="0">
             <a:spAutoFit/>
           </a:bodyPr>
           <a:lstStyle/>
           <a:p>
             <a:r>
-              <a:rPr lang="en-US" sz="1400" dirty="0">
-                <a:latin typeface="Arial" panose="020B0604020202020204" pitchFamily="34" charset="0"/>
-                <a:cs typeface="Arial" panose="020B0604020202020204" pitchFamily="34" charset="0"/>
-              </a:rPr>
-              <a:t>2 seconds</a:t>
+              <a:rPr lang="en-US" dirty="0"/>
+              <a:t>Input layer</a:t>
+            </a:r>
+          </a:p>
+        </p:txBody>
+      </p:sp>
+      <p:sp>
+        <p:nvSpPr>
+          <p:cNvPr id="46" name="TextBox 45">
+            <a:extLst>
+              <a:ext uri="{FF2B5EF4-FFF2-40B4-BE49-F238E27FC236}">
+                <a16:creationId xmlns:a16="http://schemas.microsoft.com/office/drawing/2014/main" id="{87D3E2B6-DB3A-42A9-9356-5F6922A5D53D}"/>
+              </a:ext>
+            </a:extLst>
+          </p:cNvPr>
+          <p:cNvSpPr txBox="1"/>
+          <p:nvPr/>
+        </p:nvSpPr>
+        <p:spPr>
+          <a:xfrm>
+            <a:off x="2184723" y="2007033"/>
+            <a:ext cx="1365374" cy="369332"/>
+          </a:xfrm>
+          <a:prstGeom prst="rect">
+            <a:avLst/>
+          </a:prstGeom>
+          <a:noFill/>
+        </p:spPr>
+        <p:txBody>
+          <a:bodyPr wrap="none" rtlCol="0">
+            <a:spAutoFit/>
+          </a:bodyPr>
+          <a:lstStyle/>
+          <a:p>
+            <a:r>
+              <a:rPr lang="en-US" dirty="0"/>
+              <a:t>Output layer</a:t>
             </a:r>
           </a:p>
         </p:txBody>
@@ -4918,7 +4781,7 @@
     </p:spTree>
     <p:extLst>
       <p:ext uri="{BB962C8B-B14F-4D97-AF65-F5344CB8AC3E}">
-        <p14:creationId xmlns:p14="http://schemas.microsoft.com/office/powerpoint/2010/main" val="1947425932"/>
+        <p14:creationId xmlns:p14="http://schemas.microsoft.com/office/powerpoint/2010/main" val="3368916611"/>
       </p:ext>
     </p:extLst>
   </p:cSld>
@@ -4950,7 +4813,7 @@
           <p:cNvPr id="2" name="Title 1">
             <a:extLst>
               <a:ext uri="{FF2B5EF4-FFF2-40B4-BE49-F238E27FC236}">
-                <a16:creationId xmlns:a16="http://schemas.microsoft.com/office/drawing/2014/main" id="{145C7521-8C47-48F0-A9DD-952E59F368B4}"/>
+                <a16:creationId xmlns:a16="http://schemas.microsoft.com/office/drawing/2014/main" id="{F6B84CC4-AA77-427E-89C7-A55504D0F4C9}"/>
               </a:ext>
             </a:extLst>
           </p:cNvPr>
@@ -4968,17 +4831,17 @@
           <a:p>
             <a:r>
               <a:rPr lang="en-US" dirty="0"/>
-              <a:t>Two SCEs studied</a:t>
+              <a:t>Results</a:t>
             </a:r>
           </a:p>
         </p:txBody>
       </p:sp>
       <p:pic>
         <p:nvPicPr>
-          <p:cNvPr id="4" name="Picture 3">
-            <a:extLst>
-              <a:ext uri="{FF2B5EF4-FFF2-40B4-BE49-F238E27FC236}">
-                <a16:creationId xmlns:a16="http://schemas.microsoft.com/office/drawing/2014/main" id="{B03554D5-D736-40A7-B727-B4ABA8B40ECE}"/>
+          <p:cNvPr id="4" name="Picture 3" descr="Chart, line chart&#10;&#10;Description automatically generated">
+            <a:extLst>
+              <a:ext uri="{FF2B5EF4-FFF2-40B4-BE49-F238E27FC236}">
+                <a16:creationId xmlns:a16="http://schemas.microsoft.com/office/drawing/2014/main" id="{A85FBD96-8D89-4986-BE3A-13D94CDDFC8D}"/>
               </a:ext>
             </a:extLst>
           </p:cNvPr>
@@ -5001,56 +4864,20 @@
         </p:blipFill>
         <p:spPr>
           <a:xfrm>
-            <a:off x="2692399" y="1539875"/>
-            <a:ext cx="3714750" cy="4953000"/>
+            <a:off x="274782" y="2002443"/>
+            <a:ext cx="8859982" cy="4011442"/>
           </a:xfrm>
           <a:prstGeom prst="rect">
             <a:avLst/>
           </a:prstGeom>
         </p:spPr>
       </p:pic>
-      <p:pic>
-        <p:nvPicPr>
-          <p:cNvPr id="6" name="Picture 5">
-            <a:extLst>
-              <a:ext uri="{FF2B5EF4-FFF2-40B4-BE49-F238E27FC236}">
-                <a16:creationId xmlns:a16="http://schemas.microsoft.com/office/drawing/2014/main" id="{EA713653-DAC0-4D34-A08D-A90D88A90714}"/>
-              </a:ext>
-            </a:extLst>
-          </p:cNvPr>
-          <p:cNvPicPr>
-            <a:picLocks noChangeAspect="1"/>
-          </p:cNvPicPr>
-          <p:nvPr/>
-        </p:nvPicPr>
-        <p:blipFill>
-          <a:blip r:embed="rId3">
-            <a:extLst>
-              <a:ext uri="{28A0092B-C50C-407E-A947-70E740481C1C}">
-                <a14:useLocalDpi xmlns:a14="http://schemas.microsoft.com/office/drawing/2010/main" val="0"/>
-              </a:ext>
-            </a:extLst>
-          </a:blip>
-          <a:stretch>
-            <a:fillRect/>
-          </a:stretch>
-        </p:blipFill>
-        <p:spPr>
-          <a:xfrm>
-            <a:off x="5765743" y="1598349"/>
-            <a:ext cx="3714750" cy="4953000"/>
-          </a:xfrm>
-          <a:prstGeom prst="rect">
-            <a:avLst/>
-          </a:prstGeom>
-        </p:spPr>
-      </p:pic>
-      <p:sp>
-        <p:nvSpPr>
-          <p:cNvPr id="7" name="TextBox 6">
-            <a:extLst>
-              <a:ext uri="{FF2B5EF4-FFF2-40B4-BE49-F238E27FC236}">
-                <a16:creationId xmlns:a16="http://schemas.microsoft.com/office/drawing/2014/main" id="{BA0E82F1-B9E6-4B02-8AA0-0AB88D1552BE}"/>
+      <p:sp>
+        <p:nvSpPr>
+          <p:cNvPr id="5" name="TextBox 4">
+            <a:extLst>
+              <a:ext uri="{FF2B5EF4-FFF2-40B4-BE49-F238E27FC236}">
+                <a16:creationId xmlns:a16="http://schemas.microsoft.com/office/drawing/2014/main" id="{25F7DC3F-DA47-47BF-A64C-D81BEA5FFC75}"/>
               </a:ext>
             </a:extLst>
           </p:cNvPr>
@@ -5059,8 +4886,8 @@
         </p:nvSpPr>
         <p:spPr>
           <a:xfrm>
-            <a:off x="2301666" y="3429000"/>
-            <a:ext cx="912429" cy="369332"/>
+            <a:off x="8811491" y="3260436"/>
+            <a:ext cx="2613472" cy="1200329"/>
           </a:xfrm>
           <a:prstGeom prst="rect">
             <a:avLst/>
@@ -5075,17 +4902,35 @@
           <a:p>
             <a:r>
               <a:rPr lang="en-US" dirty="0"/>
-              <a:t>4x4 SCE</a:t>
-            </a:r>
-          </a:p>
-        </p:txBody>
-      </p:sp>
-      <p:sp>
-        <p:nvSpPr>
-          <p:cNvPr id="8" name="TextBox 7">
-            <a:extLst>
-              <a:ext uri="{FF2B5EF4-FFF2-40B4-BE49-F238E27FC236}">
-                <a16:creationId xmlns:a16="http://schemas.microsoft.com/office/drawing/2014/main" id="{70FE62B0-27BE-43DF-9520-6F0FA2DB0B8C}"/>
+              <a:t>Connection strength scale</a:t>
+            </a:r>
+          </a:p>
+          <a:p>
+            <a:r>
+              <a:rPr lang="en-US" dirty="0"/>
+              <a:t>1.0 – K = 24</a:t>
+            </a:r>
+          </a:p>
+          <a:p>
+            <a:r>
+              <a:rPr lang="en-US" dirty="0"/>
+              <a:t>0.5 – K = 12</a:t>
+            </a:r>
+          </a:p>
+          <a:p>
+            <a:r>
+              <a:rPr lang="en-US" dirty="0"/>
+              <a:t>1.5 – K = 36</a:t>
+            </a:r>
+          </a:p>
+        </p:txBody>
+      </p:sp>
+      <p:sp>
+        <p:nvSpPr>
+          <p:cNvPr id="6" name="TextBox 5">
+            <a:extLst>
+              <a:ext uri="{FF2B5EF4-FFF2-40B4-BE49-F238E27FC236}">
+                <a16:creationId xmlns:a16="http://schemas.microsoft.com/office/drawing/2014/main" id="{7C0F5A74-5CC8-4657-B8D4-860EDED98EE2}"/>
               </a:ext>
             </a:extLst>
           </p:cNvPr>
@@ -5094,8 +4939,8 @@
         </p:nvSpPr>
         <p:spPr>
           <a:xfrm>
-            <a:off x="9082616" y="3429000"/>
-            <a:ext cx="2949525" cy="369332"/>
+            <a:off x="1219200" y="1690688"/>
+            <a:ext cx="7231018" cy="369332"/>
           </a:xfrm>
           <a:prstGeom prst="rect">
             <a:avLst/>
@@ -5109,8 +4954,8 @@
           <a:lstStyle/>
           <a:p>
             <a:r>
-              <a:rPr lang="en-US" dirty="0"/>
-              <a:t>SCE with 4 columns, each 2x2</a:t>
+              <a:rPr lang="en-US" i="1" dirty="0"/>
+              <a:t>The activation function of the SCE depends upon the connection strength K</a:t>
             </a:r>
           </a:p>
         </p:txBody>
@@ -5118,7 +4963,7 @@
     </p:spTree>
     <p:extLst>
       <p:ext uri="{BB962C8B-B14F-4D97-AF65-F5344CB8AC3E}">
-        <p14:creationId xmlns:p14="http://schemas.microsoft.com/office/powerpoint/2010/main" val="1579680342"/>
+        <p14:creationId xmlns:p14="http://schemas.microsoft.com/office/powerpoint/2010/main" val="1820980380"/>
       </p:ext>
     </p:extLst>
   </p:cSld>
@@ -5147,10 +4992,63 @@
       </p:grpSpPr>
       <p:sp>
         <p:nvSpPr>
+          <p:cNvPr id="30" name="Oval 29">
+            <a:extLst>
+              <a:ext uri="{FF2B5EF4-FFF2-40B4-BE49-F238E27FC236}">
+                <a16:creationId xmlns:a16="http://schemas.microsoft.com/office/drawing/2014/main" id="{D8C1E074-19B0-4BA4-83E5-3E77DC29EAF8}"/>
+              </a:ext>
+            </a:extLst>
+          </p:cNvPr>
+          <p:cNvSpPr/>
+          <p:nvPr/>
+        </p:nvSpPr>
+        <p:spPr>
+          <a:xfrm>
+            <a:off x="4876154" y="5509934"/>
+            <a:ext cx="1967869" cy="1089433"/>
+          </a:xfrm>
+          <a:prstGeom prst="ellipse">
+            <a:avLst/>
+          </a:prstGeom>
+          <a:noFill/>
+          <a:ln>
+            <a:solidFill>
+              <a:schemeClr val="tx1"/>
+            </a:solidFill>
+            <a:prstDash val="dash"/>
+          </a:ln>
+        </p:spPr>
+        <p:style>
+          <a:lnRef idx="2">
+            <a:schemeClr val="accent1">
+              <a:shade val="50000"/>
+            </a:schemeClr>
+          </a:lnRef>
+          <a:fillRef idx="1">
+            <a:schemeClr val="accent1"/>
+          </a:fillRef>
+          <a:effectRef idx="0">
+            <a:schemeClr val="accent1"/>
+          </a:effectRef>
+          <a:fontRef idx="minor">
+            <a:schemeClr val="lt1"/>
+          </a:fontRef>
+        </p:style>
+        <p:txBody>
+          <a:bodyPr rtlCol="0" anchor="ctr"/>
+          <a:lstStyle/>
+          <a:p>
+            <a:pPr algn="ctr"/>
+            <a:endParaRPr lang="en-US"/>
+          </a:p>
+        </p:txBody>
+      </p:sp>
+      <p:sp>
+        <p:nvSpPr>
           <p:cNvPr id="2" name="Title 1">
             <a:extLst>
               <a:ext uri="{FF2B5EF4-FFF2-40B4-BE49-F238E27FC236}">
-                <a16:creationId xmlns:a16="http://schemas.microsoft.com/office/drawing/2014/main" id="{CA17E180-5948-4F3D-83B6-1559C7E111DB}"/>
+                <a16:creationId xmlns:a16="http://schemas.microsoft.com/office/drawing/2014/main" id="{76966D12-A105-4527-83E8-64F0055CAF93}"/>
               </a:ext>
             </a:extLst>
           </p:cNvPr>
@@ -5168,17 +5066,17 @@
           <a:p>
             <a:r>
               <a:rPr lang="en-US" dirty="0"/>
-              <a:t>Firing Rate converted to Wave Rate</a:t>
+              <a:t>Experiment</a:t>
             </a:r>
           </a:p>
         </p:txBody>
       </p:sp>
       <p:pic>
         <p:nvPicPr>
-          <p:cNvPr id="3" name="Picture 2">
-            <a:extLst>
-              <a:ext uri="{FF2B5EF4-FFF2-40B4-BE49-F238E27FC236}">
-                <a16:creationId xmlns:a16="http://schemas.microsoft.com/office/drawing/2014/main" id="{7FC0347F-E3BA-443D-9061-E8C956FFCBF8}"/>
+          <p:cNvPr id="5" name="Picture 4" descr="A picture containing map&#10;&#10;Description automatically generated">
+            <a:extLst>
+              <a:ext uri="{FF2B5EF4-FFF2-40B4-BE49-F238E27FC236}">
+                <a16:creationId xmlns:a16="http://schemas.microsoft.com/office/drawing/2014/main" id="{83469872-DE07-4C1D-955B-3374A66DD81E}"/>
               </a:ext>
             </a:extLst>
           </p:cNvPr>
@@ -5195,25 +5093,70 @@
               </a:ext>
             </a:extLst>
           </a:blip>
-          <a:srcRect l="9483" r="8354"/>
+          <a:srcRect t="12890" b="16722"/>
           <a:stretch/>
         </p:blipFill>
         <p:spPr>
           <a:xfrm>
-            <a:off x="2286001" y="2561728"/>
-            <a:ext cx="9389534" cy="2852362"/>
+            <a:off x="4652145" y="1568595"/>
+            <a:ext cx="2355071" cy="3857854"/>
           </a:xfrm>
           <a:prstGeom prst="rect">
             <a:avLst/>
           </a:prstGeom>
         </p:spPr>
       </p:pic>
-      <p:sp>
-        <p:nvSpPr>
-          <p:cNvPr id="4" name="TextBox 3">
-            <a:extLst>
-              <a:ext uri="{FF2B5EF4-FFF2-40B4-BE49-F238E27FC236}">
-                <a16:creationId xmlns:a16="http://schemas.microsoft.com/office/drawing/2014/main" id="{0225E9DC-045D-40FE-BD6D-992AB387647B}"/>
+      <p:cxnSp>
+        <p:nvCxnSpPr>
+          <p:cNvPr id="6" name="Connector: Curved 5">
+            <a:extLst>
+              <a:ext uri="{FF2B5EF4-FFF2-40B4-BE49-F238E27FC236}">
+                <a16:creationId xmlns:a16="http://schemas.microsoft.com/office/drawing/2014/main" id="{F3B82A6E-3854-4AF1-8C3F-190853E60483}"/>
+              </a:ext>
+            </a:extLst>
+          </p:cNvPr>
+          <p:cNvCxnSpPr>
+            <a:cxnSpLocks/>
+            <a:stCxn id="21" idx="0"/>
+          </p:cNvCxnSpPr>
+          <p:nvPr/>
+        </p:nvCxnSpPr>
+        <p:spPr>
+          <a:xfrm rot="5400000" flipH="1" flipV="1">
+            <a:off x="4116110" y="4335477"/>
+            <a:ext cx="646749" cy="1129884"/>
+          </a:xfrm>
+          <a:prstGeom prst="curvedConnector2">
+            <a:avLst/>
+          </a:prstGeom>
+          <a:ln>
+            <a:solidFill>
+              <a:schemeClr val="tx1"/>
+            </a:solidFill>
+            <a:tailEnd type="triangle"/>
+          </a:ln>
+        </p:spPr>
+        <p:style>
+          <a:lnRef idx="3">
+            <a:schemeClr val="accent6"/>
+          </a:lnRef>
+          <a:fillRef idx="0">
+            <a:schemeClr val="accent6"/>
+          </a:fillRef>
+          <a:effectRef idx="2">
+            <a:schemeClr val="accent6"/>
+          </a:effectRef>
+          <a:fontRef idx="minor">
+            <a:schemeClr val="tx1"/>
+          </a:fontRef>
+        </p:style>
+      </p:cxnSp>
+      <p:sp>
+        <p:nvSpPr>
+          <p:cNvPr id="7" name="TextBox 6">
+            <a:extLst>
+              <a:ext uri="{FF2B5EF4-FFF2-40B4-BE49-F238E27FC236}">
+                <a16:creationId xmlns:a16="http://schemas.microsoft.com/office/drawing/2014/main" id="{E7BCC743-562A-4D98-8F0B-F0C1F5548A0F}"/>
               </a:ext>
             </a:extLst>
           </p:cNvPr>
@@ -5222,8 +5165,8 @@
         </p:nvSpPr>
         <p:spPr>
           <a:xfrm>
-            <a:off x="516465" y="2962100"/>
-            <a:ext cx="1118667" cy="369332"/>
+            <a:off x="676265" y="6054651"/>
+            <a:ext cx="4538861" cy="646331"/>
           </a:xfrm>
           <a:prstGeom prst="rect">
             <a:avLst/>
@@ -5241,30 +5184,881 @@
                 <a:latin typeface="Arial" panose="020B0604020202020204" pitchFamily="34" charset="0"/>
                 <a:cs typeface="Arial" panose="020B0604020202020204" pitchFamily="34" charset="0"/>
               </a:rPr>
-              <a:t>4x4 SCE</a:t>
-            </a:r>
+              <a:t>Population of neurons whose average firing rate we want to encode and transmit</a:t>
+            </a:r>
+          </a:p>
+        </p:txBody>
+      </p:sp>
+      <p:sp>
+        <p:nvSpPr>
+          <p:cNvPr id="8" name="Oval 7">
+            <a:extLst>
+              <a:ext uri="{FF2B5EF4-FFF2-40B4-BE49-F238E27FC236}">
+                <a16:creationId xmlns:a16="http://schemas.microsoft.com/office/drawing/2014/main" id="{5619D366-F32B-4044-9198-E43DF8592A5D}"/>
+              </a:ext>
+            </a:extLst>
+          </p:cNvPr>
+          <p:cNvSpPr/>
+          <p:nvPr/>
+        </p:nvSpPr>
+        <p:spPr>
+          <a:xfrm>
+            <a:off x="5069609" y="5928167"/>
+            <a:ext cx="197708" cy="205946"/>
+          </a:xfrm>
+          <a:prstGeom prst="ellipse">
+            <a:avLst/>
+          </a:prstGeom>
+        </p:spPr>
+        <p:style>
+          <a:lnRef idx="2">
+            <a:schemeClr val="accent1">
+              <a:shade val="50000"/>
+            </a:schemeClr>
+          </a:lnRef>
+          <a:fillRef idx="1">
+            <a:schemeClr val="accent1"/>
+          </a:fillRef>
+          <a:effectRef idx="0">
+            <a:schemeClr val="accent1"/>
+          </a:effectRef>
+          <a:fontRef idx="minor">
+            <a:schemeClr val="lt1"/>
+          </a:fontRef>
+        </p:style>
+        <p:txBody>
+          <a:bodyPr rtlCol="0" anchor="ctr"/>
+          <a:lstStyle/>
+          <a:p>
+            <a:pPr algn="ctr"/>
+            <a:endParaRPr lang="en-US"/>
+          </a:p>
+        </p:txBody>
+      </p:sp>
+      <p:sp>
+        <p:nvSpPr>
+          <p:cNvPr id="9" name="Oval 8">
+            <a:extLst>
+              <a:ext uri="{FF2B5EF4-FFF2-40B4-BE49-F238E27FC236}">
+                <a16:creationId xmlns:a16="http://schemas.microsoft.com/office/drawing/2014/main" id="{C94162A4-2C9F-42EE-A02D-318995C45E48}"/>
+              </a:ext>
+            </a:extLst>
+          </p:cNvPr>
+          <p:cNvSpPr/>
+          <p:nvPr/>
+        </p:nvSpPr>
+        <p:spPr>
+          <a:xfrm>
+            <a:off x="5858829" y="5958766"/>
+            <a:ext cx="197708" cy="205946"/>
+          </a:xfrm>
+          <a:prstGeom prst="ellipse">
+            <a:avLst/>
+          </a:prstGeom>
+        </p:spPr>
+        <p:style>
+          <a:lnRef idx="2">
+            <a:schemeClr val="accent1">
+              <a:shade val="50000"/>
+            </a:schemeClr>
+          </a:lnRef>
+          <a:fillRef idx="1">
+            <a:schemeClr val="accent1"/>
+          </a:fillRef>
+          <a:effectRef idx="0">
+            <a:schemeClr val="accent1"/>
+          </a:effectRef>
+          <a:fontRef idx="minor">
+            <a:schemeClr val="lt1"/>
+          </a:fontRef>
+        </p:style>
+        <p:txBody>
+          <a:bodyPr rtlCol="0" anchor="ctr"/>
+          <a:lstStyle/>
+          <a:p>
+            <a:pPr algn="ctr"/>
+            <a:endParaRPr lang="en-US"/>
+          </a:p>
+        </p:txBody>
+      </p:sp>
+      <p:sp>
+        <p:nvSpPr>
+          <p:cNvPr id="10" name="Oval 9">
+            <a:extLst>
+              <a:ext uri="{FF2B5EF4-FFF2-40B4-BE49-F238E27FC236}">
+                <a16:creationId xmlns:a16="http://schemas.microsoft.com/office/drawing/2014/main" id="{F1DAE79C-DCE5-4762-9064-3C79B0E43BB7}"/>
+              </a:ext>
+            </a:extLst>
+          </p:cNvPr>
+          <p:cNvSpPr/>
+          <p:nvPr/>
+        </p:nvSpPr>
+        <p:spPr>
+          <a:xfrm>
+            <a:off x="5420767" y="6255409"/>
+            <a:ext cx="197708" cy="205946"/>
+          </a:xfrm>
+          <a:prstGeom prst="ellipse">
+            <a:avLst/>
+          </a:prstGeom>
+        </p:spPr>
+        <p:style>
+          <a:lnRef idx="2">
+            <a:schemeClr val="accent1">
+              <a:shade val="50000"/>
+            </a:schemeClr>
+          </a:lnRef>
+          <a:fillRef idx="1">
+            <a:schemeClr val="accent1"/>
+          </a:fillRef>
+          <a:effectRef idx="0">
+            <a:schemeClr val="accent1"/>
+          </a:effectRef>
+          <a:fontRef idx="minor">
+            <a:schemeClr val="lt1"/>
+          </a:fontRef>
+        </p:style>
+        <p:txBody>
+          <a:bodyPr rtlCol="0" anchor="ctr"/>
+          <a:lstStyle/>
+          <a:p>
+            <a:pPr algn="ctr"/>
+            <a:endParaRPr lang="en-US"/>
+          </a:p>
+        </p:txBody>
+      </p:sp>
+      <p:sp>
+        <p:nvSpPr>
+          <p:cNvPr id="11" name="Oval 10">
+            <a:extLst>
+              <a:ext uri="{FF2B5EF4-FFF2-40B4-BE49-F238E27FC236}">
+                <a16:creationId xmlns:a16="http://schemas.microsoft.com/office/drawing/2014/main" id="{FC495984-5100-47C3-96B0-8BF29592A95D}"/>
+              </a:ext>
+            </a:extLst>
+          </p:cNvPr>
+          <p:cNvSpPr/>
+          <p:nvPr/>
+        </p:nvSpPr>
+        <p:spPr>
+          <a:xfrm>
+            <a:off x="6330579" y="6134113"/>
+            <a:ext cx="197708" cy="205946"/>
+          </a:xfrm>
+          <a:prstGeom prst="ellipse">
+            <a:avLst/>
+          </a:prstGeom>
+        </p:spPr>
+        <p:style>
+          <a:lnRef idx="2">
+            <a:schemeClr val="accent1">
+              <a:shade val="50000"/>
+            </a:schemeClr>
+          </a:lnRef>
+          <a:fillRef idx="1">
+            <a:schemeClr val="accent1"/>
+          </a:fillRef>
+          <a:effectRef idx="0">
+            <a:schemeClr val="accent1"/>
+          </a:effectRef>
+          <a:fontRef idx="minor">
+            <a:schemeClr val="lt1"/>
+          </a:fontRef>
+        </p:style>
+        <p:txBody>
+          <a:bodyPr rtlCol="0" anchor="ctr"/>
+          <a:lstStyle/>
+          <a:p>
+            <a:pPr algn="ctr"/>
+            <a:endParaRPr lang="en-US"/>
           </a:p>
         </p:txBody>
       </p:sp>
       <p:cxnSp>
         <p:nvCxnSpPr>
-          <p:cNvPr id="5" name="Straight Arrow Connector 4">
-            <a:extLst>
-              <a:ext uri="{FF2B5EF4-FFF2-40B4-BE49-F238E27FC236}">
-                <a16:creationId xmlns:a16="http://schemas.microsoft.com/office/drawing/2014/main" id="{2E874146-D498-449A-B982-229BCBA9C59D}"/>
+          <p:cNvPr id="12" name="Straight Arrow Connector 11">
+            <a:extLst>
+              <a:ext uri="{FF2B5EF4-FFF2-40B4-BE49-F238E27FC236}">
+                <a16:creationId xmlns:a16="http://schemas.microsoft.com/office/drawing/2014/main" id="{370678BA-4A76-491B-ADE2-74E2D158D768}"/>
               </a:ext>
             </a:extLst>
           </p:cNvPr>
           <p:cNvCxnSpPr>
             <a:cxnSpLocks/>
-            <a:stCxn id="4" idx="3"/>
+            <a:stCxn id="9" idx="0"/>
           </p:cNvCxnSpPr>
           <p:nvPr/>
         </p:nvCxnSpPr>
         <p:spPr>
-          <a:xfrm>
-            <a:off x="1635132" y="3146766"/>
-            <a:ext cx="762000" cy="0"/>
+          <a:xfrm flipV="1">
+            <a:off x="5957683" y="4709220"/>
+            <a:ext cx="247394" cy="1249546"/>
+          </a:xfrm>
+          <a:prstGeom prst="straightConnector1">
+            <a:avLst/>
+          </a:prstGeom>
+          <a:ln>
+            <a:solidFill>
+              <a:schemeClr val="tx1"/>
+            </a:solidFill>
+            <a:tailEnd type="triangle"/>
+          </a:ln>
+        </p:spPr>
+        <p:style>
+          <a:lnRef idx="1">
+            <a:schemeClr val="accent1"/>
+          </a:lnRef>
+          <a:fillRef idx="0">
+            <a:schemeClr val="accent1"/>
+          </a:fillRef>
+          <a:effectRef idx="0">
+            <a:schemeClr val="accent1"/>
+          </a:effectRef>
+          <a:fontRef idx="minor">
+            <a:schemeClr val="tx1"/>
+          </a:fontRef>
+        </p:style>
+      </p:cxnSp>
+      <p:cxnSp>
+        <p:nvCxnSpPr>
+          <p:cNvPr id="13" name="Straight Arrow Connector 12">
+            <a:extLst>
+              <a:ext uri="{FF2B5EF4-FFF2-40B4-BE49-F238E27FC236}">
+                <a16:creationId xmlns:a16="http://schemas.microsoft.com/office/drawing/2014/main" id="{ED06CC8E-5CF1-47BB-A32D-5F0763F3A01A}"/>
+              </a:ext>
+            </a:extLst>
+          </p:cNvPr>
+          <p:cNvCxnSpPr>
+            <a:cxnSpLocks/>
+            <a:stCxn id="10" idx="0"/>
+          </p:cNvCxnSpPr>
+          <p:nvPr/>
+        </p:nvCxnSpPr>
+        <p:spPr>
+          <a:xfrm flipV="1">
+            <a:off x="5519621" y="4682411"/>
+            <a:ext cx="719039" cy="1572998"/>
+          </a:xfrm>
+          <a:prstGeom prst="straightConnector1">
+            <a:avLst/>
+          </a:prstGeom>
+          <a:ln>
+            <a:solidFill>
+              <a:schemeClr val="tx1"/>
+            </a:solidFill>
+            <a:tailEnd type="triangle"/>
+          </a:ln>
+        </p:spPr>
+        <p:style>
+          <a:lnRef idx="1">
+            <a:schemeClr val="accent1"/>
+          </a:lnRef>
+          <a:fillRef idx="0">
+            <a:schemeClr val="accent1"/>
+          </a:fillRef>
+          <a:effectRef idx="0">
+            <a:schemeClr val="accent1"/>
+          </a:effectRef>
+          <a:fontRef idx="minor">
+            <a:schemeClr val="tx1"/>
+          </a:fontRef>
+        </p:style>
+      </p:cxnSp>
+      <p:cxnSp>
+        <p:nvCxnSpPr>
+          <p:cNvPr id="14" name="Straight Arrow Connector 13">
+            <a:extLst>
+              <a:ext uri="{FF2B5EF4-FFF2-40B4-BE49-F238E27FC236}">
+                <a16:creationId xmlns:a16="http://schemas.microsoft.com/office/drawing/2014/main" id="{BE857334-4DEB-4C7D-A26B-CD79182666BD}"/>
+              </a:ext>
+            </a:extLst>
+          </p:cNvPr>
+          <p:cNvCxnSpPr>
+            <a:cxnSpLocks/>
+            <a:stCxn id="8" idx="0"/>
+          </p:cNvCxnSpPr>
+          <p:nvPr/>
+        </p:nvCxnSpPr>
+        <p:spPr>
+          <a:xfrm flipV="1">
+            <a:off x="5168463" y="4350015"/>
+            <a:ext cx="98854" cy="1578152"/>
+          </a:xfrm>
+          <a:prstGeom prst="straightConnector1">
+            <a:avLst/>
+          </a:prstGeom>
+          <a:ln>
+            <a:solidFill>
+              <a:schemeClr val="tx1"/>
+            </a:solidFill>
+            <a:tailEnd type="triangle"/>
+          </a:ln>
+        </p:spPr>
+        <p:style>
+          <a:lnRef idx="1">
+            <a:schemeClr val="accent1"/>
+          </a:lnRef>
+          <a:fillRef idx="0">
+            <a:schemeClr val="accent1"/>
+          </a:fillRef>
+          <a:effectRef idx="0">
+            <a:schemeClr val="accent1"/>
+          </a:effectRef>
+          <a:fontRef idx="minor">
+            <a:schemeClr val="tx1"/>
+          </a:fontRef>
+        </p:style>
+      </p:cxnSp>
+      <p:cxnSp>
+        <p:nvCxnSpPr>
+          <p:cNvPr id="15" name="Straight Arrow Connector 14">
+            <a:extLst>
+              <a:ext uri="{FF2B5EF4-FFF2-40B4-BE49-F238E27FC236}">
+                <a16:creationId xmlns:a16="http://schemas.microsoft.com/office/drawing/2014/main" id="{E267DCEF-6217-4E1C-9ECB-57595E0BE8F2}"/>
+              </a:ext>
+            </a:extLst>
+          </p:cNvPr>
+          <p:cNvCxnSpPr>
+            <a:cxnSpLocks/>
+            <a:stCxn id="11" idx="0"/>
+          </p:cNvCxnSpPr>
+          <p:nvPr/>
+        </p:nvCxnSpPr>
+        <p:spPr>
+          <a:xfrm flipH="1" flipV="1">
+            <a:off x="6194458" y="4682411"/>
+            <a:ext cx="234975" cy="1451702"/>
+          </a:xfrm>
+          <a:prstGeom prst="straightConnector1">
+            <a:avLst/>
+          </a:prstGeom>
+          <a:ln>
+            <a:solidFill>
+              <a:schemeClr val="tx1"/>
+            </a:solidFill>
+            <a:tailEnd type="triangle"/>
+          </a:ln>
+        </p:spPr>
+        <p:style>
+          <a:lnRef idx="1">
+            <a:schemeClr val="accent1"/>
+          </a:lnRef>
+          <a:fillRef idx="0">
+            <a:schemeClr val="accent1"/>
+          </a:fillRef>
+          <a:effectRef idx="0">
+            <a:schemeClr val="accent1"/>
+          </a:effectRef>
+          <a:fontRef idx="minor">
+            <a:schemeClr val="tx1"/>
+          </a:fontRef>
+        </p:style>
+      </p:cxnSp>
+      <p:cxnSp>
+        <p:nvCxnSpPr>
+          <p:cNvPr id="16" name="Straight Arrow Connector 15">
+            <a:extLst>
+              <a:ext uri="{FF2B5EF4-FFF2-40B4-BE49-F238E27FC236}">
+                <a16:creationId xmlns:a16="http://schemas.microsoft.com/office/drawing/2014/main" id="{FDE4F8BF-B450-41A4-9819-EE863C2B8B65}"/>
+              </a:ext>
+            </a:extLst>
+          </p:cNvPr>
+          <p:cNvCxnSpPr>
+            <a:cxnSpLocks/>
+            <a:stCxn id="10" idx="0"/>
+          </p:cNvCxnSpPr>
+          <p:nvPr/>
+        </p:nvCxnSpPr>
+        <p:spPr>
+          <a:xfrm flipV="1">
+            <a:off x="5519621" y="5078471"/>
+            <a:ext cx="164020" cy="1176938"/>
+          </a:xfrm>
+          <a:prstGeom prst="straightConnector1">
+            <a:avLst/>
+          </a:prstGeom>
+          <a:ln>
+            <a:solidFill>
+              <a:schemeClr val="tx1"/>
+            </a:solidFill>
+            <a:tailEnd type="triangle"/>
+          </a:ln>
+        </p:spPr>
+        <p:style>
+          <a:lnRef idx="1">
+            <a:schemeClr val="accent1"/>
+          </a:lnRef>
+          <a:fillRef idx="0">
+            <a:schemeClr val="accent1"/>
+          </a:fillRef>
+          <a:effectRef idx="0">
+            <a:schemeClr val="accent1"/>
+          </a:effectRef>
+          <a:fontRef idx="minor">
+            <a:schemeClr val="tx1"/>
+          </a:fontRef>
+        </p:style>
+      </p:cxnSp>
+      <p:cxnSp>
+        <p:nvCxnSpPr>
+          <p:cNvPr id="17" name="Straight Arrow Connector 16">
+            <a:extLst>
+              <a:ext uri="{FF2B5EF4-FFF2-40B4-BE49-F238E27FC236}">
+                <a16:creationId xmlns:a16="http://schemas.microsoft.com/office/drawing/2014/main" id="{81433BF7-D966-49D1-84B8-43BB7C281D71}"/>
+              </a:ext>
+            </a:extLst>
+          </p:cNvPr>
+          <p:cNvCxnSpPr>
+            <a:cxnSpLocks/>
+            <a:stCxn id="9" idx="0"/>
+          </p:cNvCxnSpPr>
+          <p:nvPr/>
+        </p:nvCxnSpPr>
+        <p:spPr>
+          <a:xfrm flipH="1" flipV="1">
+            <a:off x="5710289" y="5116134"/>
+            <a:ext cx="247394" cy="842632"/>
+          </a:xfrm>
+          <a:prstGeom prst="straightConnector1">
+            <a:avLst/>
+          </a:prstGeom>
+          <a:ln>
+            <a:solidFill>
+              <a:schemeClr val="tx1"/>
+            </a:solidFill>
+            <a:tailEnd type="triangle"/>
+          </a:ln>
+        </p:spPr>
+        <p:style>
+          <a:lnRef idx="1">
+            <a:schemeClr val="accent1"/>
+          </a:lnRef>
+          <a:fillRef idx="0">
+            <a:schemeClr val="accent1"/>
+          </a:fillRef>
+          <a:effectRef idx="0">
+            <a:schemeClr val="accent1"/>
+          </a:effectRef>
+          <a:fontRef idx="minor">
+            <a:schemeClr val="tx1"/>
+          </a:fontRef>
+        </p:style>
+      </p:cxnSp>
+      <p:cxnSp>
+        <p:nvCxnSpPr>
+          <p:cNvPr id="18" name="Straight Arrow Connector 17">
+            <a:extLst>
+              <a:ext uri="{FF2B5EF4-FFF2-40B4-BE49-F238E27FC236}">
+                <a16:creationId xmlns:a16="http://schemas.microsoft.com/office/drawing/2014/main" id="{72F79803-47CA-4697-977E-4CA25A46D866}"/>
+              </a:ext>
+            </a:extLst>
+          </p:cNvPr>
+          <p:cNvCxnSpPr>
+            <a:cxnSpLocks/>
+            <a:stCxn id="11" idx="0"/>
+          </p:cNvCxnSpPr>
+          <p:nvPr/>
+        </p:nvCxnSpPr>
+        <p:spPr>
+          <a:xfrm flipV="1">
+            <a:off x="6429433" y="4656990"/>
+            <a:ext cx="339208" cy="1477123"/>
+          </a:xfrm>
+          <a:prstGeom prst="straightConnector1">
+            <a:avLst/>
+          </a:prstGeom>
+          <a:ln>
+            <a:solidFill>
+              <a:schemeClr val="tx1"/>
+            </a:solidFill>
+            <a:tailEnd type="triangle"/>
+          </a:ln>
+        </p:spPr>
+        <p:style>
+          <a:lnRef idx="1">
+            <a:schemeClr val="accent1"/>
+          </a:lnRef>
+          <a:fillRef idx="0">
+            <a:schemeClr val="accent1"/>
+          </a:fillRef>
+          <a:effectRef idx="0">
+            <a:schemeClr val="accent1"/>
+          </a:effectRef>
+          <a:fontRef idx="minor">
+            <a:schemeClr val="tx1"/>
+          </a:fontRef>
+        </p:style>
+      </p:cxnSp>
+      <p:sp>
+        <p:nvSpPr>
+          <p:cNvPr id="19" name="Oval 18">
+            <a:extLst>
+              <a:ext uri="{FF2B5EF4-FFF2-40B4-BE49-F238E27FC236}">
+                <a16:creationId xmlns:a16="http://schemas.microsoft.com/office/drawing/2014/main" id="{2AA3CAF3-0EF3-4755-957D-40266EDD95CA}"/>
+              </a:ext>
+            </a:extLst>
+          </p:cNvPr>
+          <p:cNvSpPr/>
+          <p:nvPr/>
+        </p:nvSpPr>
+        <p:spPr>
+          <a:xfrm>
+            <a:off x="4876154" y="3022583"/>
+            <a:ext cx="1920861" cy="2161193"/>
+          </a:xfrm>
+          <a:prstGeom prst="ellipse">
+            <a:avLst/>
+          </a:prstGeom>
+          <a:solidFill>
+            <a:srgbClr val="00B050">
+              <a:alpha val="24000"/>
+            </a:srgbClr>
+          </a:solidFill>
+          <a:ln>
+            <a:noFill/>
+          </a:ln>
+        </p:spPr>
+        <p:style>
+          <a:lnRef idx="2">
+            <a:schemeClr val="accent1">
+              <a:shade val="50000"/>
+            </a:schemeClr>
+          </a:lnRef>
+          <a:fillRef idx="1">
+            <a:schemeClr val="accent1"/>
+          </a:fillRef>
+          <a:effectRef idx="0">
+            <a:schemeClr val="accent1"/>
+          </a:effectRef>
+          <a:fontRef idx="minor">
+            <a:schemeClr val="lt1"/>
+          </a:fontRef>
+        </p:style>
+        <p:txBody>
+          <a:bodyPr rtlCol="0" anchor="ctr"/>
+          <a:lstStyle/>
+          <a:p>
+            <a:pPr algn="ctr"/>
+            <a:endParaRPr lang="en-US"/>
+          </a:p>
+        </p:txBody>
+      </p:sp>
+      <p:sp>
+        <p:nvSpPr>
+          <p:cNvPr id="20" name="Oval 19">
+            <a:extLst>
+              <a:ext uri="{FF2B5EF4-FFF2-40B4-BE49-F238E27FC236}">
+                <a16:creationId xmlns:a16="http://schemas.microsoft.com/office/drawing/2014/main" id="{6C6A6F9A-8A23-48C6-90D5-3EB8E39BF97A}"/>
+              </a:ext>
+            </a:extLst>
+          </p:cNvPr>
+          <p:cNvSpPr/>
+          <p:nvPr/>
+        </p:nvSpPr>
+        <p:spPr>
+          <a:xfrm>
+            <a:off x="4876154" y="2054884"/>
+            <a:ext cx="1967869" cy="1777442"/>
+          </a:xfrm>
+          <a:prstGeom prst="ellipse">
+            <a:avLst/>
+          </a:prstGeom>
+          <a:solidFill>
+            <a:srgbClr val="FFFF00">
+              <a:alpha val="24000"/>
+            </a:srgbClr>
+          </a:solidFill>
+          <a:ln>
+            <a:noFill/>
+          </a:ln>
+        </p:spPr>
+        <p:style>
+          <a:lnRef idx="2">
+            <a:schemeClr val="accent1">
+              <a:shade val="50000"/>
+            </a:schemeClr>
+          </a:lnRef>
+          <a:fillRef idx="1">
+            <a:schemeClr val="accent1"/>
+          </a:fillRef>
+          <a:effectRef idx="0">
+            <a:schemeClr val="accent1"/>
+          </a:effectRef>
+          <a:fontRef idx="minor">
+            <a:schemeClr val="lt1"/>
+          </a:fontRef>
+        </p:style>
+        <p:txBody>
+          <a:bodyPr rtlCol="0" anchor="ctr"/>
+          <a:lstStyle/>
+          <a:p>
+            <a:pPr algn="ctr"/>
+            <a:endParaRPr lang="en-US"/>
+          </a:p>
+        </p:txBody>
+      </p:sp>
+      <p:sp>
+        <p:nvSpPr>
+          <p:cNvPr id="21" name="TextBox 20">
+            <a:extLst>
+              <a:ext uri="{FF2B5EF4-FFF2-40B4-BE49-F238E27FC236}">
+                <a16:creationId xmlns:a16="http://schemas.microsoft.com/office/drawing/2014/main" id="{DB3AA3CB-0234-4ACE-B928-4C8B42DD4559}"/>
+              </a:ext>
+            </a:extLst>
+          </p:cNvPr>
+          <p:cNvSpPr txBox="1"/>
+          <p:nvPr/>
+        </p:nvSpPr>
+        <p:spPr>
+          <a:xfrm>
+            <a:off x="3023593" y="5223793"/>
+            <a:ext cx="1701898" cy="461665"/>
+          </a:xfrm>
+          <a:prstGeom prst="rect">
+            <a:avLst/>
+          </a:prstGeom>
+          <a:noFill/>
+        </p:spPr>
+        <p:txBody>
+          <a:bodyPr wrap="square" rtlCol="0">
+            <a:spAutoFit/>
+          </a:bodyPr>
+          <a:lstStyle/>
+          <a:p>
+            <a:r>
+              <a:rPr lang="en-US" sz="1200" dirty="0">
+                <a:latin typeface="Arial" panose="020B0604020202020204" pitchFamily="34" charset="0"/>
+                <a:cs typeface="Arial" panose="020B0604020202020204" pitchFamily="34" charset="0"/>
+              </a:rPr>
+              <a:t>Input to base layer of SCE</a:t>
+            </a:r>
+          </a:p>
+        </p:txBody>
+      </p:sp>
+      <p:sp>
+        <p:nvSpPr>
+          <p:cNvPr id="22" name="TextBox 21">
+            <a:extLst>
+              <a:ext uri="{FF2B5EF4-FFF2-40B4-BE49-F238E27FC236}">
+                <a16:creationId xmlns:a16="http://schemas.microsoft.com/office/drawing/2014/main" id="{70C626B9-3D88-43A8-8752-783C2939249E}"/>
+              </a:ext>
+            </a:extLst>
+          </p:cNvPr>
+          <p:cNvSpPr txBox="1"/>
+          <p:nvPr/>
+        </p:nvSpPr>
+        <p:spPr>
+          <a:xfrm>
+            <a:off x="2446867" y="3542223"/>
+            <a:ext cx="1968503" cy="461665"/>
+          </a:xfrm>
+          <a:prstGeom prst="rect">
+            <a:avLst/>
+          </a:prstGeom>
+          <a:noFill/>
+        </p:spPr>
+        <p:txBody>
+          <a:bodyPr wrap="square" rtlCol="0">
+            <a:spAutoFit/>
+          </a:bodyPr>
+          <a:lstStyle/>
+          <a:p>
+            <a:r>
+              <a:rPr lang="en-US" sz="1200" dirty="0">
+                <a:latin typeface="Arial" panose="020B0604020202020204" pitchFamily="34" charset="0"/>
+                <a:cs typeface="Arial" panose="020B0604020202020204" pitchFamily="34" charset="0"/>
+              </a:rPr>
+              <a:t>SCE, various topologies possible</a:t>
+            </a:r>
+          </a:p>
+        </p:txBody>
+      </p:sp>
+      <p:cxnSp>
+        <p:nvCxnSpPr>
+          <p:cNvPr id="23" name="Connector: Curved 22">
+            <a:extLst>
+              <a:ext uri="{FF2B5EF4-FFF2-40B4-BE49-F238E27FC236}">
+                <a16:creationId xmlns:a16="http://schemas.microsoft.com/office/drawing/2014/main" id="{A4C40669-5A11-48FD-8C5A-6DFCA295FDAB}"/>
+              </a:ext>
+            </a:extLst>
+          </p:cNvPr>
+          <p:cNvCxnSpPr>
+            <a:cxnSpLocks/>
+            <a:stCxn id="22" idx="3"/>
+          </p:cNvCxnSpPr>
+          <p:nvPr/>
+        </p:nvCxnSpPr>
+        <p:spPr>
+          <a:xfrm>
+            <a:off x="4415370" y="3773056"/>
+            <a:ext cx="1005397" cy="266804"/>
+          </a:xfrm>
+          <a:prstGeom prst="curvedConnector3">
+            <a:avLst>
+              <a:gd name="adj1" fmla="val 50000"/>
+            </a:avLst>
+          </a:prstGeom>
+          <a:ln>
+            <a:solidFill>
+              <a:schemeClr val="tx1"/>
+            </a:solidFill>
+            <a:tailEnd type="triangle"/>
+          </a:ln>
+        </p:spPr>
+        <p:style>
+          <a:lnRef idx="3">
+            <a:schemeClr val="accent6"/>
+          </a:lnRef>
+          <a:fillRef idx="0">
+            <a:schemeClr val="accent6"/>
+          </a:fillRef>
+          <a:effectRef idx="2">
+            <a:schemeClr val="accent6"/>
+          </a:effectRef>
+          <a:fontRef idx="minor">
+            <a:schemeClr val="tx1"/>
+          </a:fontRef>
+        </p:style>
+      </p:cxnSp>
+      <p:sp>
+        <p:nvSpPr>
+          <p:cNvPr id="24" name="TextBox 23">
+            <a:extLst>
+              <a:ext uri="{FF2B5EF4-FFF2-40B4-BE49-F238E27FC236}">
+                <a16:creationId xmlns:a16="http://schemas.microsoft.com/office/drawing/2014/main" id="{55DA10A9-A49A-407C-B7AE-3E1E03268261}"/>
+              </a:ext>
+            </a:extLst>
+          </p:cNvPr>
+          <p:cNvSpPr txBox="1"/>
+          <p:nvPr/>
+        </p:nvSpPr>
+        <p:spPr>
+          <a:xfrm>
+            <a:off x="2461409" y="2527889"/>
+            <a:ext cx="1818467" cy="461665"/>
+          </a:xfrm>
+          <a:prstGeom prst="rect">
+            <a:avLst/>
+          </a:prstGeom>
+          <a:noFill/>
+        </p:spPr>
+        <p:txBody>
+          <a:bodyPr wrap="square" rtlCol="0">
+            <a:spAutoFit/>
+          </a:bodyPr>
+          <a:lstStyle/>
+          <a:p>
+            <a:r>
+              <a:rPr lang="en-US" sz="1200" dirty="0">
+                <a:latin typeface="Arial" panose="020B0604020202020204" pitchFamily="34" charset="0"/>
+                <a:cs typeface="Arial" panose="020B0604020202020204" pitchFamily="34" charset="0"/>
+              </a:rPr>
+              <a:t>Output from top layer of SCE</a:t>
+            </a:r>
+          </a:p>
+        </p:txBody>
+      </p:sp>
+      <p:cxnSp>
+        <p:nvCxnSpPr>
+          <p:cNvPr id="25" name="Connector: Curved 24">
+            <a:extLst>
+              <a:ext uri="{FF2B5EF4-FFF2-40B4-BE49-F238E27FC236}">
+                <a16:creationId xmlns:a16="http://schemas.microsoft.com/office/drawing/2014/main" id="{A45983D8-D165-45D5-A4A1-AAFAC4E3F7E5}"/>
+              </a:ext>
+            </a:extLst>
+          </p:cNvPr>
+          <p:cNvCxnSpPr>
+            <a:cxnSpLocks/>
+            <a:stCxn id="24" idx="3"/>
+            <a:endCxn id="20" idx="2"/>
+          </p:cNvCxnSpPr>
+          <p:nvPr/>
+        </p:nvCxnSpPr>
+        <p:spPr>
+          <a:xfrm>
+            <a:off x="4279876" y="2758722"/>
+            <a:ext cx="596278" cy="184883"/>
+          </a:xfrm>
+          <a:prstGeom prst="curvedConnector3">
+            <a:avLst>
+              <a:gd name="adj1" fmla="val 50000"/>
+            </a:avLst>
+          </a:prstGeom>
+          <a:ln>
+            <a:solidFill>
+              <a:schemeClr val="tx1"/>
+            </a:solidFill>
+            <a:tailEnd type="triangle"/>
+          </a:ln>
+        </p:spPr>
+        <p:style>
+          <a:lnRef idx="3">
+            <a:schemeClr val="accent6"/>
+          </a:lnRef>
+          <a:fillRef idx="0">
+            <a:schemeClr val="accent6"/>
+          </a:fillRef>
+          <a:effectRef idx="2">
+            <a:schemeClr val="accent6"/>
+          </a:effectRef>
+          <a:fontRef idx="minor">
+            <a:schemeClr val="tx1"/>
+          </a:fontRef>
+        </p:style>
+      </p:cxnSp>
+      <p:pic>
+        <p:nvPicPr>
+          <p:cNvPr id="34" name="Picture 33">
+            <a:extLst>
+              <a:ext uri="{FF2B5EF4-FFF2-40B4-BE49-F238E27FC236}">
+                <a16:creationId xmlns:a16="http://schemas.microsoft.com/office/drawing/2014/main" id="{320A0DCC-0E3F-4547-9EE8-257DFF0EF03B}"/>
+              </a:ext>
+            </a:extLst>
+          </p:cNvPr>
+          <p:cNvPicPr>
+            <a:picLocks noChangeAspect="1"/>
+          </p:cNvPicPr>
+          <p:nvPr/>
+        </p:nvPicPr>
+        <p:blipFill rotWithShape="1">
+          <a:blip r:embed="rId3">
+            <a:extLst>
+              <a:ext uri="{28A0092B-C50C-407E-A947-70E740481C1C}">
+                <a14:useLocalDpi xmlns:a14="http://schemas.microsoft.com/office/drawing/2010/main" val="0"/>
+              </a:ext>
+            </a:extLst>
+          </a:blip>
+          <a:srcRect t="33512" b="38457"/>
+          <a:stretch/>
+        </p:blipFill>
+        <p:spPr>
+          <a:xfrm>
+            <a:off x="8136467" y="4380666"/>
+            <a:ext cx="3419904" cy="1922323"/>
+          </a:xfrm>
+          <a:prstGeom prst="rect">
+            <a:avLst/>
+          </a:prstGeom>
+        </p:spPr>
+      </p:pic>
+      <p:cxnSp>
+        <p:nvCxnSpPr>
+          <p:cNvPr id="37" name="Straight Arrow Connector 36">
+            <a:extLst>
+              <a:ext uri="{FF2B5EF4-FFF2-40B4-BE49-F238E27FC236}">
+                <a16:creationId xmlns:a16="http://schemas.microsoft.com/office/drawing/2014/main" id="{771F6EDA-07A6-4E91-A633-FF6B48DEFA56}"/>
+              </a:ext>
+            </a:extLst>
+          </p:cNvPr>
+          <p:cNvCxnSpPr>
+            <a:cxnSpLocks/>
+            <a:stCxn id="30" idx="6"/>
+          </p:cNvCxnSpPr>
+          <p:nvPr/>
+        </p:nvCxnSpPr>
+        <p:spPr>
+          <a:xfrm flipV="1">
+            <a:off x="6844023" y="5464548"/>
+            <a:ext cx="1292444" cy="590103"/>
           </a:xfrm>
           <a:prstGeom prst="straightConnector1">
             <a:avLst/>
@@ -5290,10 +6084,10 @@
       </p:cxnSp>
       <p:sp>
         <p:nvSpPr>
-          <p:cNvPr id="9" name="TextBox 8">
-            <a:extLst>
-              <a:ext uri="{FF2B5EF4-FFF2-40B4-BE49-F238E27FC236}">
-                <a16:creationId xmlns:a16="http://schemas.microsoft.com/office/drawing/2014/main" id="{BDDE0629-CF36-4C5A-8BC2-E43E6816B903}"/>
+          <p:cNvPr id="45" name="TextBox 44">
+            <a:extLst>
+              <a:ext uri="{FF2B5EF4-FFF2-40B4-BE49-F238E27FC236}">
+                <a16:creationId xmlns:a16="http://schemas.microsoft.com/office/drawing/2014/main" id="{43BDF72F-4117-4702-867C-05D7A898754D}"/>
               </a:ext>
             </a:extLst>
           </p:cNvPr>
@@ -5302,8 +6096,417 @@
         </p:nvSpPr>
         <p:spPr>
           <a:xfrm>
-            <a:off x="274101" y="4301047"/>
-            <a:ext cx="1359968" cy="646331"/>
+            <a:off x="8136467" y="4033569"/>
+            <a:ext cx="3578176" cy="523220"/>
+          </a:xfrm>
+          <a:prstGeom prst="rect">
+            <a:avLst/>
+          </a:prstGeom>
+          <a:noFill/>
+        </p:spPr>
+        <p:txBody>
+          <a:bodyPr wrap="square" rtlCol="0">
+            <a:spAutoFit/>
+          </a:bodyPr>
+          <a:lstStyle/>
+          <a:p>
+            <a:r>
+              <a:rPr lang="en-US" sz="1400" dirty="0">
+                <a:latin typeface="Arial" panose="020B0604020202020204" pitchFamily="34" charset="0"/>
+                <a:cs typeface="Arial" panose="020B0604020202020204" pitchFamily="34" charset="0"/>
+              </a:rPr>
+              <a:t>Spike raster plot of a population of 50 neurons with a 10 Hz average firing rate.</a:t>
+            </a:r>
+          </a:p>
+        </p:txBody>
+      </p:sp>
+      <p:cxnSp>
+        <p:nvCxnSpPr>
+          <p:cNvPr id="41" name="Straight Arrow Connector 40">
+            <a:extLst>
+              <a:ext uri="{FF2B5EF4-FFF2-40B4-BE49-F238E27FC236}">
+                <a16:creationId xmlns:a16="http://schemas.microsoft.com/office/drawing/2014/main" id="{BD0BDD1A-F449-4E33-BF98-33898896CCB7}"/>
+              </a:ext>
+            </a:extLst>
+          </p:cNvPr>
+          <p:cNvCxnSpPr/>
+          <p:nvPr/>
+        </p:nvCxnSpPr>
+        <p:spPr>
+          <a:xfrm>
+            <a:off x="8779096" y="6284712"/>
+            <a:ext cx="2463800" cy="0"/>
+          </a:xfrm>
+          <a:prstGeom prst="straightConnector1">
+            <a:avLst/>
+          </a:prstGeom>
+          <a:ln>
+            <a:headEnd type="triangle"/>
+            <a:tailEnd type="triangle"/>
+          </a:ln>
+        </p:spPr>
+        <p:style>
+          <a:lnRef idx="1">
+            <a:schemeClr val="dk1"/>
+          </a:lnRef>
+          <a:fillRef idx="0">
+            <a:schemeClr val="dk1"/>
+          </a:fillRef>
+          <a:effectRef idx="0">
+            <a:schemeClr val="dk1"/>
+          </a:effectRef>
+          <a:fontRef idx="minor">
+            <a:schemeClr val="tx1"/>
+          </a:fontRef>
+        </p:style>
+      </p:cxnSp>
+      <p:sp>
+        <p:nvSpPr>
+          <p:cNvPr id="47" name="TextBox 46">
+            <a:extLst>
+              <a:ext uri="{FF2B5EF4-FFF2-40B4-BE49-F238E27FC236}">
+                <a16:creationId xmlns:a16="http://schemas.microsoft.com/office/drawing/2014/main" id="{CBD8AA63-FC3E-482D-B9C4-A900BFD1276D}"/>
+              </a:ext>
+            </a:extLst>
+          </p:cNvPr>
+          <p:cNvSpPr txBox="1"/>
+          <p:nvPr/>
+        </p:nvSpPr>
+        <p:spPr>
+          <a:xfrm>
+            <a:off x="9517704" y="6261944"/>
+            <a:ext cx="1254620" cy="307777"/>
+          </a:xfrm>
+          <a:prstGeom prst="rect">
+            <a:avLst/>
+          </a:prstGeom>
+          <a:noFill/>
+        </p:spPr>
+        <p:txBody>
+          <a:bodyPr wrap="square" rtlCol="0">
+            <a:spAutoFit/>
+          </a:bodyPr>
+          <a:lstStyle/>
+          <a:p>
+            <a:r>
+              <a:rPr lang="en-US" sz="1400" dirty="0">
+                <a:latin typeface="Arial" panose="020B0604020202020204" pitchFamily="34" charset="0"/>
+                <a:cs typeface="Arial" panose="020B0604020202020204" pitchFamily="34" charset="0"/>
+              </a:rPr>
+              <a:t>2 seconds</a:t>
+            </a:r>
+          </a:p>
+        </p:txBody>
+      </p:sp>
+    </p:spTree>
+    <p:extLst>
+      <p:ext uri="{BB962C8B-B14F-4D97-AF65-F5344CB8AC3E}">
+        <p14:creationId xmlns:p14="http://schemas.microsoft.com/office/powerpoint/2010/main" val="1947425932"/>
+      </p:ext>
+    </p:extLst>
+  </p:cSld>
+  <p:clrMapOvr>
+    <a:masterClrMapping/>
+  </p:clrMapOvr>
+</p:sld>
+</file>
+
+<file path=ppt/slides/slide7.xml><?xml version="1.0" encoding="utf-8"?>
+<p:sld xmlns:a="http://schemas.openxmlformats.org/drawingml/2006/main" xmlns:r="http://schemas.openxmlformats.org/officeDocument/2006/relationships" xmlns:p="http://schemas.openxmlformats.org/presentationml/2006/main">
+  <p:cSld>
+    <p:spTree>
+      <p:nvGrpSpPr>
+        <p:cNvPr id="1" name=""/>
+        <p:cNvGrpSpPr/>
+        <p:nvPr/>
+      </p:nvGrpSpPr>
+      <p:grpSpPr>
+        <a:xfrm>
+          <a:off x="0" y="0"/>
+          <a:ext cx="0" cy="0"/>
+          <a:chOff x="0" y="0"/>
+          <a:chExt cx="0" cy="0"/>
+        </a:xfrm>
+      </p:grpSpPr>
+      <p:sp>
+        <p:nvSpPr>
+          <p:cNvPr id="2" name="Title 1">
+            <a:extLst>
+              <a:ext uri="{FF2B5EF4-FFF2-40B4-BE49-F238E27FC236}">
+                <a16:creationId xmlns:a16="http://schemas.microsoft.com/office/drawing/2014/main" id="{145C7521-8C47-48F0-A9DD-952E59F368B4}"/>
+              </a:ext>
+            </a:extLst>
+          </p:cNvPr>
+          <p:cNvSpPr>
+            <a:spLocks noGrp="1"/>
+          </p:cNvSpPr>
+          <p:nvPr>
+            <p:ph type="title"/>
+          </p:nvPr>
+        </p:nvSpPr>
+        <p:spPr/>
+        <p:txBody>
+          <a:bodyPr/>
+          <a:lstStyle/>
+          <a:p>
+            <a:r>
+              <a:rPr lang="en-US" dirty="0"/>
+              <a:t>Two SCEs studied</a:t>
+            </a:r>
+          </a:p>
+        </p:txBody>
+      </p:sp>
+      <p:pic>
+        <p:nvPicPr>
+          <p:cNvPr id="4" name="Picture 3">
+            <a:extLst>
+              <a:ext uri="{FF2B5EF4-FFF2-40B4-BE49-F238E27FC236}">
+                <a16:creationId xmlns:a16="http://schemas.microsoft.com/office/drawing/2014/main" id="{B03554D5-D736-40A7-B727-B4ABA8B40ECE}"/>
+              </a:ext>
+            </a:extLst>
+          </p:cNvPr>
+          <p:cNvPicPr>
+            <a:picLocks noChangeAspect="1"/>
+          </p:cNvPicPr>
+          <p:nvPr/>
+        </p:nvPicPr>
+        <p:blipFill>
+          <a:blip r:embed="rId2">
+            <a:extLst>
+              <a:ext uri="{28A0092B-C50C-407E-A947-70E740481C1C}">
+                <a14:useLocalDpi xmlns:a14="http://schemas.microsoft.com/office/drawing/2010/main" val="0"/>
+              </a:ext>
+            </a:extLst>
+          </a:blip>
+          <a:stretch>
+            <a:fillRect/>
+          </a:stretch>
+        </p:blipFill>
+        <p:spPr>
+          <a:xfrm>
+            <a:off x="2692399" y="1539875"/>
+            <a:ext cx="3714750" cy="4953000"/>
+          </a:xfrm>
+          <a:prstGeom prst="rect">
+            <a:avLst/>
+          </a:prstGeom>
+        </p:spPr>
+      </p:pic>
+      <p:pic>
+        <p:nvPicPr>
+          <p:cNvPr id="6" name="Picture 5">
+            <a:extLst>
+              <a:ext uri="{FF2B5EF4-FFF2-40B4-BE49-F238E27FC236}">
+                <a16:creationId xmlns:a16="http://schemas.microsoft.com/office/drawing/2014/main" id="{EA713653-DAC0-4D34-A08D-A90D88A90714}"/>
+              </a:ext>
+            </a:extLst>
+          </p:cNvPr>
+          <p:cNvPicPr>
+            <a:picLocks noChangeAspect="1"/>
+          </p:cNvPicPr>
+          <p:nvPr/>
+        </p:nvPicPr>
+        <p:blipFill>
+          <a:blip r:embed="rId3">
+            <a:extLst>
+              <a:ext uri="{28A0092B-C50C-407E-A947-70E740481C1C}">
+                <a14:useLocalDpi xmlns:a14="http://schemas.microsoft.com/office/drawing/2010/main" val="0"/>
+              </a:ext>
+            </a:extLst>
+          </a:blip>
+          <a:stretch>
+            <a:fillRect/>
+          </a:stretch>
+        </p:blipFill>
+        <p:spPr>
+          <a:xfrm>
+            <a:off x="5765743" y="1598349"/>
+            <a:ext cx="3714750" cy="4953000"/>
+          </a:xfrm>
+          <a:prstGeom prst="rect">
+            <a:avLst/>
+          </a:prstGeom>
+        </p:spPr>
+      </p:pic>
+      <p:sp>
+        <p:nvSpPr>
+          <p:cNvPr id="7" name="TextBox 6">
+            <a:extLst>
+              <a:ext uri="{FF2B5EF4-FFF2-40B4-BE49-F238E27FC236}">
+                <a16:creationId xmlns:a16="http://schemas.microsoft.com/office/drawing/2014/main" id="{BA0E82F1-B9E6-4B02-8AA0-0AB88D1552BE}"/>
+              </a:ext>
+            </a:extLst>
+          </p:cNvPr>
+          <p:cNvSpPr txBox="1"/>
+          <p:nvPr/>
+        </p:nvSpPr>
+        <p:spPr>
+          <a:xfrm>
+            <a:off x="2301666" y="3429000"/>
+            <a:ext cx="912429" cy="369332"/>
+          </a:xfrm>
+          <a:prstGeom prst="rect">
+            <a:avLst/>
+          </a:prstGeom>
+          <a:noFill/>
+        </p:spPr>
+        <p:txBody>
+          <a:bodyPr wrap="none" rtlCol="0">
+            <a:spAutoFit/>
+          </a:bodyPr>
+          <a:lstStyle/>
+          <a:p>
+            <a:r>
+              <a:rPr lang="en-US" dirty="0"/>
+              <a:t>4x4 SCE</a:t>
+            </a:r>
+          </a:p>
+        </p:txBody>
+      </p:sp>
+      <p:sp>
+        <p:nvSpPr>
+          <p:cNvPr id="8" name="TextBox 7">
+            <a:extLst>
+              <a:ext uri="{FF2B5EF4-FFF2-40B4-BE49-F238E27FC236}">
+                <a16:creationId xmlns:a16="http://schemas.microsoft.com/office/drawing/2014/main" id="{70FE62B0-27BE-43DF-9520-6F0FA2DB0B8C}"/>
+              </a:ext>
+            </a:extLst>
+          </p:cNvPr>
+          <p:cNvSpPr txBox="1"/>
+          <p:nvPr/>
+        </p:nvSpPr>
+        <p:spPr>
+          <a:xfrm>
+            <a:off x="9082616" y="3429000"/>
+            <a:ext cx="2949525" cy="369332"/>
+          </a:xfrm>
+          <a:prstGeom prst="rect">
+            <a:avLst/>
+          </a:prstGeom>
+          <a:noFill/>
+        </p:spPr>
+        <p:txBody>
+          <a:bodyPr wrap="none" rtlCol="0">
+            <a:spAutoFit/>
+          </a:bodyPr>
+          <a:lstStyle/>
+          <a:p>
+            <a:r>
+              <a:rPr lang="en-US" dirty="0"/>
+              <a:t>SCE with 4 columns, each 2x2</a:t>
+            </a:r>
+          </a:p>
+        </p:txBody>
+      </p:sp>
+    </p:spTree>
+    <p:extLst>
+      <p:ext uri="{BB962C8B-B14F-4D97-AF65-F5344CB8AC3E}">
+        <p14:creationId xmlns:p14="http://schemas.microsoft.com/office/powerpoint/2010/main" val="1579680342"/>
+      </p:ext>
+    </p:extLst>
+  </p:cSld>
+  <p:clrMapOvr>
+    <a:masterClrMapping/>
+  </p:clrMapOvr>
+</p:sld>
+</file>
+
+<file path=ppt/slides/slide8.xml><?xml version="1.0" encoding="utf-8"?>
+<p:sld xmlns:a="http://schemas.openxmlformats.org/drawingml/2006/main" xmlns:r="http://schemas.openxmlformats.org/officeDocument/2006/relationships" xmlns:p="http://schemas.openxmlformats.org/presentationml/2006/main">
+  <p:cSld>
+    <p:spTree>
+      <p:nvGrpSpPr>
+        <p:cNvPr id="1" name=""/>
+        <p:cNvGrpSpPr/>
+        <p:nvPr/>
+      </p:nvGrpSpPr>
+      <p:grpSpPr>
+        <a:xfrm>
+          <a:off x="0" y="0"/>
+          <a:ext cx="0" cy="0"/>
+          <a:chOff x="0" y="0"/>
+          <a:chExt cx="0" cy="0"/>
+        </a:xfrm>
+      </p:grpSpPr>
+      <p:sp>
+        <p:nvSpPr>
+          <p:cNvPr id="2" name="Title 1">
+            <a:extLst>
+              <a:ext uri="{FF2B5EF4-FFF2-40B4-BE49-F238E27FC236}">
+                <a16:creationId xmlns:a16="http://schemas.microsoft.com/office/drawing/2014/main" id="{CA17E180-5948-4F3D-83B6-1559C7E111DB}"/>
+              </a:ext>
+            </a:extLst>
+          </p:cNvPr>
+          <p:cNvSpPr>
+            <a:spLocks noGrp="1"/>
+          </p:cNvSpPr>
+          <p:nvPr>
+            <p:ph type="title"/>
+          </p:nvPr>
+        </p:nvSpPr>
+        <p:spPr/>
+        <p:txBody>
+          <a:bodyPr/>
+          <a:lstStyle/>
+          <a:p>
+            <a:r>
+              <a:rPr lang="en-US" dirty="0"/>
+              <a:t>Firing Rate converted to Wave Rate</a:t>
+            </a:r>
+          </a:p>
+        </p:txBody>
+      </p:sp>
+      <p:pic>
+        <p:nvPicPr>
+          <p:cNvPr id="3" name="Picture 2">
+            <a:extLst>
+              <a:ext uri="{FF2B5EF4-FFF2-40B4-BE49-F238E27FC236}">
+                <a16:creationId xmlns:a16="http://schemas.microsoft.com/office/drawing/2014/main" id="{7FC0347F-E3BA-443D-9061-E8C956FFCBF8}"/>
+              </a:ext>
+            </a:extLst>
+          </p:cNvPr>
+          <p:cNvPicPr>
+            <a:picLocks noChangeAspect="1"/>
+          </p:cNvPicPr>
+          <p:nvPr/>
+        </p:nvPicPr>
+        <p:blipFill rotWithShape="1">
+          <a:blip r:embed="rId2">
+            <a:extLst>
+              <a:ext uri="{28A0092B-C50C-407E-A947-70E740481C1C}">
+                <a14:useLocalDpi xmlns:a14="http://schemas.microsoft.com/office/drawing/2010/main" val="0"/>
+              </a:ext>
+            </a:extLst>
+          </a:blip>
+          <a:srcRect l="9483" r="8354"/>
+          <a:stretch/>
+        </p:blipFill>
+        <p:spPr>
+          <a:xfrm>
+            <a:off x="2286001" y="2561728"/>
+            <a:ext cx="9389534" cy="2852362"/>
+          </a:xfrm>
+          <a:prstGeom prst="rect">
+            <a:avLst/>
+          </a:prstGeom>
+        </p:spPr>
+      </p:pic>
+      <p:sp>
+        <p:nvSpPr>
+          <p:cNvPr id="4" name="TextBox 3">
+            <a:extLst>
+              <a:ext uri="{FF2B5EF4-FFF2-40B4-BE49-F238E27FC236}">
+                <a16:creationId xmlns:a16="http://schemas.microsoft.com/office/drawing/2014/main" id="{0225E9DC-045D-40FE-BD6D-992AB387647B}"/>
+              </a:ext>
+            </a:extLst>
+          </p:cNvPr>
+          <p:cNvSpPr txBox="1"/>
+          <p:nvPr/>
+        </p:nvSpPr>
+        <p:spPr>
+          <a:xfrm>
+            <a:off x="516465" y="2962100"/>
+            <a:ext cx="1118667" cy="369332"/>
           </a:xfrm>
           <a:prstGeom prst="rect">
             <a:avLst/>
@@ -5321,30 +6524,30 @@
                 <a:latin typeface="Arial" panose="020B0604020202020204" pitchFamily="34" charset="0"/>
                 <a:cs typeface="Arial" panose="020B0604020202020204" pitchFamily="34" charset="0"/>
               </a:rPr>
-              <a:t>4 columns, each 2x2</a:t>
+              <a:t>4x4 SCE</a:t>
             </a:r>
           </a:p>
         </p:txBody>
       </p:sp>
       <p:cxnSp>
         <p:nvCxnSpPr>
-          <p:cNvPr id="10" name="Straight Arrow Connector 9">
-            <a:extLst>
-              <a:ext uri="{FF2B5EF4-FFF2-40B4-BE49-F238E27FC236}">
-                <a16:creationId xmlns:a16="http://schemas.microsoft.com/office/drawing/2014/main" id="{F533294F-CC15-492A-A976-7C7817F9A120}"/>
+          <p:cNvPr id="5" name="Straight Arrow Connector 4">
+            <a:extLst>
+              <a:ext uri="{FF2B5EF4-FFF2-40B4-BE49-F238E27FC236}">
+                <a16:creationId xmlns:a16="http://schemas.microsoft.com/office/drawing/2014/main" id="{2E874146-D498-449A-B982-229BCBA9C59D}"/>
               </a:ext>
             </a:extLst>
           </p:cNvPr>
           <p:cNvCxnSpPr>
             <a:cxnSpLocks/>
-            <a:stCxn id="9" idx="3"/>
+            <a:stCxn id="4" idx="3"/>
           </p:cNvCxnSpPr>
           <p:nvPr/>
         </p:nvCxnSpPr>
         <p:spPr>
-          <a:xfrm flipV="1">
-            <a:off x="1634069" y="4624212"/>
-            <a:ext cx="761999" cy="1"/>
+          <a:xfrm>
+            <a:off x="1635132" y="3146766"/>
+            <a:ext cx="762000" cy="0"/>
           </a:xfrm>
           <a:prstGeom prst="straightConnector1">
             <a:avLst/>
@@ -5370,6 +6573,86 @@
       </p:cxnSp>
       <p:sp>
         <p:nvSpPr>
+          <p:cNvPr id="9" name="TextBox 8">
+            <a:extLst>
+              <a:ext uri="{FF2B5EF4-FFF2-40B4-BE49-F238E27FC236}">
+                <a16:creationId xmlns:a16="http://schemas.microsoft.com/office/drawing/2014/main" id="{BDDE0629-CF36-4C5A-8BC2-E43E6816B903}"/>
+              </a:ext>
+            </a:extLst>
+          </p:cNvPr>
+          <p:cNvSpPr txBox="1"/>
+          <p:nvPr/>
+        </p:nvSpPr>
+        <p:spPr>
+          <a:xfrm>
+            <a:off x="274101" y="4301047"/>
+            <a:ext cx="1359968" cy="646331"/>
+          </a:xfrm>
+          <a:prstGeom prst="rect">
+            <a:avLst/>
+          </a:prstGeom>
+          <a:noFill/>
+        </p:spPr>
+        <p:txBody>
+          <a:bodyPr wrap="square" rtlCol="0">
+            <a:spAutoFit/>
+          </a:bodyPr>
+          <a:lstStyle/>
+          <a:p>
+            <a:r>
+              <a:rPr lang="en-US" dirty="0">
+                <a:latin typeface="Arial" panose="020B0604020202020204" pitchFamily="34" charset="0"/>
+                <a:cs typeface="Arial" panose="020B0604020202020204" pitchFamily="34" charset="0"/>
+              </a:rPr>
+              <a:t>4 columns, each 2x2</a:t>
+            </a:r>
+          </a:p>
+        </p:txBody>
+      </p:sp>
+      <p:cxnSp>
+        <p:nvCxnSpPr>
+          <p:cNvPr id="10" name="Straight Arrow Connector 9">
+            <a:extLst>
+              <a:ext uri="{FF2B5EF4-FFF2-40B4-BE49-F238E27FC236}">
+                <a16:creationId xmlns:a16="http://schemas.microsoft.com/office/drawing/2014/main" id="{F533294F-CC15-492A-A976-7C7817F9A120}"/>
+              </a:ext>
+            </a:extLst>
+          </p:cNvPr>
+          <p:cNvCxnSpPr>
+            <a:cxnSpLocks/>
+            <a:stCxn id="9" idx="3"/>
+          </p:cNvCxnSpPr>
+          <p:nvPr/>
+        </p:nvCxnSpPr>
+        <p:spPr>
+          <a:xfrm flipV="1">
+            <a:off x="1634069" y="4624212"/>
+            <a:ext cx="761999" cy="1"/>
+          </a:xfrm>
+          <a:prstGeom prst="straightConnector1">
+            <a:avLst/>
+          </a:prstGeom>
+          <a:ln>
+            <a:tailEnd type="triangle"/>
+          </a:ln>
+        </p:spPr>
+        <p:style>
+          <a:lnRef idx="2">
+            <a:schemeClr val="dk1"/>
+          </a:lnRef>
+          <a:fillRef idx="0">
+            <a:schemeClr val="dk1"/>
+          </a:fillRef>
+          <a:effectRef idx="1">
+            <a:schemeClr val="dk1"/>
+          </a:effectRef>
+          <a:fontRef idx="minor">
+            <a:schemeClr val="tx1"/>
+          </a:fontRef>
+        </p:style>
+      </p:cxnSp>
+      <p:sp>
+        <p:nvSpPr>
           <p:cNvPr id="14" name="TextBox 13">
             <a:extLst>
               <a:ext uri="{FF2B5EF4-FFF2-40B4-BE49-F238E27FC236}">
@@ -5495,7 +6778,7 @@
 </p:sld>
 </file>
 
-<file path=ppt/slides/slide7.xml><?xml version="1.0" encoding="utf-8"?>
+<file path=ppt/slides/slide9.xml><?xml version="1.0" encoding="utf-8"?>
 <p:sld xmlns:a="http://schemas.openxmlformats.org/drawingml/2006/main" xmlns:r="http://schemas.openxmlformats.org/officeDocument/2006/relationships" xmlns:p="http://schemas.openxmlformats.org/presentationml/2006/main">
   <p:cSld>
     <p:spTree>

</xml_diff>

<commit_message>
Netowrk damage experiments. One big SCE andcoupled SCE are resilient, independent SCE are not
</commit_message>
<xml_diff>
--- a/encoding_paper/Firing Rate Encoding Analysis.pptx
+++ b/encoding_paper/Firing Rate Encoding Analysis.pptx
@@ -10,10 +10,16 @@
     <p:sldId id="276" r:id="rId4"/>
     <p:sldId id="280" r:id="rId5"/>
     <p:sldId id="281" r:id="rId6"/>
-    <p:sldId id="271" r:id="rId7"/>
-    <p:sldId id="279" r:id="rId8"/>
-    <p:sldId id="277" r:id="rId9"/>
-    <p:sldId id="278" r:id="rId10"/>
+    <p:sldId id="282" r:id="rId7"/>
+    <p:sldId id="283" r:id="rId8"/>
+    <p:sldId id="284" r:id="rId9"/>
+    <p:sldId id="285" r:id="rId10"/>
+    <p:sldId id="286" r:id="rId11"/>
+    <p:sldId id="287" r:id="rId12"/>
+    <p:sldId id="271" r:id="rId13"/>
+    <p:sldId id="279" r:id="rId14"/>
+    <p:sldId id="277" r:id="rId15"/>
+    <p:sldId id="278" r:id="rId16"/>
   </p:sldIdLst>
   <p:sldSz cx="12192000" cy="6858000"/>
   <p:notesSz cx="6858000" cy="9144000"/>
@@ -456,7 +462,7 @@
           <a:p>
             <a:fld id="{0BC610E4-0AD4-4B2C-A1AF-CEC06808CA2D}" type="datetimeFigureOut">
               <a:rPr lang="en-US" smtClean="0"/>
-              <a:t>2/26/2021</a:t>
+              <a:t>3/6/2021</a:t>
             </a:fld>
             <a:endParaRPr lang="en-US"/>
           </a:p>
@@ -672,7 +678,7 @@
           <a:p>
             <a:fld id="{0BC610E4-0AD4-4B2C-A1AF-CEC06808CA2D}" type="datetimeFigureOut">
               <a:rPr lang="en-US" smtClean="0"/>
-              <a:t>2/26/2021</a:t>
+              <a:t>3/6/2021</a:t>
             </a:fld>
             <a:endParaRPr lang="en-US"/>
           </a:p>
@@ -878,7 +884,7 @@
           <a:p>
             <a:fld id="{0BC610E4-0AD4-4B2C-A1AF-CEC06808CA2D}" type="datetimeFigureOut">
               <a:rPr lang="en-US" smtClean="0"/>
-              <a:t>2/26/2021</a:t>
+              <a:t>3/6/2021</a:t>
             </a:fld>
             <a:endParaRPr lang="en-US"/>
           </a:p>
@@ -1151,7 +1157,7 @@
           <a:p>
             <a:fld id="{0BC610E4-0AD4-4B2C-A1AF-CEC06808CA2D}" type="datetimeFigureOut">
               <a:rPr lang="en-US" smtClean="0"/>
-              <a:t>2/26/2021</a:t>
+              <a:t>3/6/2021</a:t>
             </a:fld>
             <a:endParaRPr lang="en-US"/>
           </a:p>
@@ -1434,7 +1440,7 @@
           <a:p>
             <a:fld id="{0BC610E4-0AD4-4B2C-A1AF-CEC06808CA2D}" type="datetimeFigureOut">
               <a:rPr lang="en-US" smtClean="0"/>
-              <a:t>2/26/2021</a:t>
+              <a:t>3/6/2021</a:t>
             </a:fld>
             <a:endParaRPr lang="en-US"/>
           </a:p>
@@ -1854,7 +1860,7 @@
           <a:p>
             <a:fld id="{0BC610E4-0AD4-4B2C-A1AF-CEC06808CA2D}" type="datetimeFigureOut">
               <a:rPr lang="en-US" smtClean="0"/>
-              <a:t>2/26/2021</a:t>
+              <a:t>3/6/2021</a:t>
             </a:fld>
             <a:endParaRPr lang="en-US"/>
           </a:p>
@@ -2003,7 +2009,7 @@
           <a:p>
             <a:fld id="{0BC610E4-0AD4-4B2C-A1AF-CEC06808CA2D}" type="datetimeFigureOut">
               <a:rPr lang="en-US" smtClean="0"/>
-              <a:t>2/26/2021</a:t>
+              <a:t>3/6/2021</a:t>
             </a:fld>
             <a:endParaRPr lang="en-US"/>
           </a:p>
@@ -2124,7 +2130,7 @@
           <a:p>
             <a:fld id="{0BC610E4-0AD4-4B2C-A1AF-CEC06808CA2D}" type="datetimeFigureOut">
               <a:rPr lang="en-US" smtClean="0"/>
-              <a:t>2/26/2021</a:t>
+              <a:t>3/6/2021</a:t>
             </a:fld>
             <a:endParaRPr lang="en-US"/>
           </a:p>
@@ -2443,7 +2449,7 @@
           <a:p>
             <a:fld id="{0BC610E4-0AD4-4B2C-A1AF-CEC06808CA2D}" type="datetimeFigureOut">
               <a:rPr lang="en-US" smtClean="0"/>
-              <a:t>2/26/2021</a:t>
+              <a:t>3/6/2021</a:t>
             </a:fld>
             <a:endParaRPr lang="en-US"/>
           </a:p>
@@ -2739,7 +2745,7 @@
           <a:p>
             <a:fld id="{0BC610E4-0AD4-4B2C-A1AF-CEC06808CA2D}" type="datetimeFigureOut">
               <a:rPr lang="en-US" smtClean="0"/>
-              <a:t>2/26/2021</a:t>
+              <a:t>3/6/2021</a:t>
             </a:fld>
             <a:endParaRPr lang="en-US"/>
           </a:p>
@@ -3473,6 +3479,2231 @@
 </p:sld>
 </file>
 
+<file path=ppt/slides/slide10.xml><?xml version="1.0" encoding="utf-8"?>
+<p:sld xmlns:a="http://schemas.openxmlformats.org/drawingml/2006/main" xmlns:r="http://schemas.openxmlformats.org/officeDocument/2006/relationships" xmlns:p="http://schemas.openxmlformats.org/presentationml/2006/main">
+  <p:cSld>
+    <p:spTree>
+      <p:nvGrpSpPr>
+        <p:cNvPr id="1" name=""/>
+        <p:cNvGrpSpPr/>
+        <p:nvPr/>
+      </p:nvGrpSpPr>
+      <p:grpSpPr>
+        <a:xfrm>
+          <a:off x="0" y="0"/>
+          <a:ext cx="0" cy="0"/>
+          <a:chOff x="0" y="0"/>
+          <a:chExt cx="0" cy="0"/>
+        </a:xfrm>
+      </p:grpSpPr>
+      <p:sp>
+        <p:nvSpPr>
+          <p:cNvPr id="2" name="Title 1">
+            <a:extLst>
+              <a:ext uri="{FF2B5EF4-FFF2-40B4-BE49-F238E27FC236}">
+                <a16:creationId xmlns:a16="http://schemas.microsoft.com/office/drawing/2014/main" id="{FA562F1E-F46A-47A0-95A1-98F3EAC6095F}"/>
+              </a:ext>
+            </a:extLst>
+          </p:cNvPr>
+          <p:cNvSpPr>
+            <a:spLocks noGrp="1"/>
+          </p:cNvSpPr>
+          <p:nvPr>
+            <p:ph type="title"/>
+          </p:nvPr>
+        </p:nvSpPr>
+        <p:spPr/>
+        <p:txBody>
+          <a:bodyPr/>
+          <a:lstStyle/>
+          <a:p>
+            <a:r>
+              <a:rPr lang="en-US" dirty="0"/>
+              <a:t>Morphology comparison</a:t>
+            </a:r>
+          </a:p>
+        </p:txBody>
+      </p:sp>
+      <p:pic>
+        <p:nvPicPr>
+          <p:cNvPr id="8" name="Picture 7" descr="Chart, line chart&#10;&#10;Description automatically generated">
+            <a:extLst>
+              <a:ext uri="{FF2B5EF4-FFF2-40B4-BE49-F238E27FC236}">
+                <a16:creationId xmlns:a16="http://schemas.microsoft.com/office/drawing/2014/main" id="{8FE2C83A-8FFD-4F6B-ABC7-0B560AAAB7C0}"/>
+              </a:ext>
+            </a:extLst>
+          </p:cNvPr>
+          <p:cNvPicPr>
+            <a:picLocks noChangeAspect="1"/>
+          </p:cNvPicPr>
+          <p:nvPr/>
+        </p:nvPicPr>
+        <p:blipFill>
+          <a:blip r:embed="rId2">
+            <a:extLst>
+              <a:ext uri="{28A0092B-C50C-407E-A947-70E740481C1C}">
+                <a14:useLocalDpi xmlns:a14="http://schemas.microsoft.com/office/drawing/2010/main" val="0"/>
+              </a:ext>
+            </a:extLst>
+          </a:blip>
+          <a:stretch>
+            <a:fillRect/>
+          </a:stretch>
+        </p:blipFill>
+        <p:spPr>
+          <a:xfrm>
+            <a:off x="838200" y="2400001"/>
+            <a:ext cx="6862618" cy="4118857"/>
+          </a:xfrm>
+          <a:prstGeom prst="rect">
+            <a:avLst/>
+          </a:prstGeom>
+        </p:spPr>
+      </p:pic>
+      <p:sp>
+        <p:nvSpPr>
+          <p:cNvPr id="9" name="TextBox 8">
+            <a:extLst>
+              <a:ext uri="{FF2B5EF4-FFF2-40B4-BE49-F238E27FC236}">
+                <a16:creationId xmlns:a16="http://schemas.microsoft.com/office/drawing/2014/main" id="{EA028A7D-E3FE-4519-9547-CDF2EB7E1D1D}"/>
+              </a:ext>
+            </a:extLst>
+          </p:cNvPr>
+          <p:cNvSpPr txBox="1"/>
+          <p:nvPr/>
+        </p:nvSpPr>
+        <p:spPr>
+          <a:xfrm>
+            <a:off x="2270532" y="2215335"/>
+            <a:ext cx="4554195" cy="369332"/>
+          </a:xfrm>
+          <a:prstGeom prst="rect">
+            <a:avLst/>
+          </a:prstGeom>
+          <a:noFill/>
+        </p:spPr>
+        <p:txBody>
+          <a:bodyPr wrap="none" rtlCol="0">
+            <a:spAutoFit/>
+          </a:bodyPr>
+          <a:lstStyle/>
+          <a:p>
+            <a:r>
+              <a:rPr lang="en-US" dirty="0"/>
+              <a:t>4 Coupled 2x2 SCE– highly resistant to damage</a:t>
+            </a:r>
+          </a:p>
+        </p:txBody>
+      </p:sp>
+      <p:pic>
+        <p:nvPicPr>
+          <p:cNvPr id="5" name="Picture 4" descr="Diagram&#10;&#10;Description automatically generated with low confidence">
+            <a:extLst>
+              <a:ext uri="{FF2B5EF4-FFF2-40B4-BE49-F238E27FC236}">
+                <a16:creationId xmlns:a16="http://schemas.microsoft.com/office/drawing/2014/main" id="{5A0922A9-AFE6-4873-A43B-875E2BF2CF43}"/>
+              </a:ext>
+            </a:extLst>
+          </p:cNvPr>
+          <p:cNvPicPr>
+            <a:picLocks noChangeAspect="1"/>
+          </p:cNvPicPr>
+          <p:nvPr/>
+        </p:nvPicPr>
+        <p:blipFill>
+          <a:blip r:embed="rId3">
+            <a:extLst>
+              <a:ext uri="{28A0092B-C50C-407E-A947-70E740481C1C}">
+                <a14:useLocalDpi xmlns:a14="http://schemas.microsoft.com/office/drawing/2010/main" val="0"/>
+              </a:ext>
+            </a:extLst>
+          </a:blip>
+          <a:stretch>
+            <a:fillRect/>
+          </a:stretch>
+        </p:blipFill>
+        <p:spPr>
+          <a:xfrm>
+            <a:off x="8465704" y="2537475"/>
+            <a:ext cx="3042805" cy="4057074"/>
+          </a:xfrm>
+          <a:prstGeom prst="rect">
+            <a:avLst/>
+          </a:prstGeom>
+        </p:spPr>
+      </p:pic>
+    </p:spTree>
+    <p:extLst>
+      <p:ext uri="{BB962C8B-B14F-4D97-AF65-F5344CB8AC3E}">
+        <p14:creationId xmlns:p14="http://schemas.microsoft.com/office/powerpoint/2010/main" val="479754282"/>
+      </p:ext>
+    </p:extLst>
+  </p:cSld>
+  <p:clrMapOvr>
+    <a:masterClrMapping/>
+  </p:clrMapOvr>
+</p:sld>
+</file>
+
+<file path=ppt/slides/slide11.xml><?xml version="1.0" encoding="utf-8"?>
+<p:sld xmlns:a="http://schemas.openxmlformats.org/drawingml/2006/main" xmlns:r="http://schemas.openxmlformats.org/officeDocument/2006/relationships" xmlns:p="http://schemas.openxmlformats.org/presentationml/2006/main">
+  <p:cSld>
+    <p:spTree>
+      <p:nvGrpSpPr>
+        <p:cNvPr id="1" name=""/>
+        <p:cNvGrpSpPr/>
+        <p:nvPr/>
+      </p:nvGrpSpPr>
+      <p:grpSpPr>
+        <a:xfrm>
+          <a:off x="0" y="0"/>
+          <a:ext cx="0" cy="0"/>
+          <a:chOff x="0" y="0"/>
+          <a:chExt cx="0" cy="0"/>
+        </a:xfrm>
+      </p:grpSpPr>
+      <p:sp>
+        <p:nvSpPr>
+          <p:cNvPr id="2" name="Title 1">
+            <a:extLst>
+              <a:ext uri="{FF2B5EF4-FFF2-40B4-BE49-F238E27FC236}">
+                <a16:creationId xmlns:a16="http://schemas.microsoft.com/office/drawing/2014/main" id="{6C882454-1200-4D24-ADD4-46D08AEE2C8F}"/>
+              </a:ext>
+            </a:extLst>
+          </p:cNvPr>
+          <p:cNvSpPr>
+            <a:spLocks noGrp="1"/>
+          </p:cNvSpPr>
+          <p:nvPr>
+            <p:ph type="title"/>
+          </p:nvPr>
+        </p:nvSpPr>
+        <p:spPr/>
+        <p:txBody>
+          <a:bodyPr/>
+          <a:lstStyle/>
+          <a:p>
+            <a:r>
+              <a:rPr lang="en-US" dirty="0"/>
+              <a:t>Backup/Old material</a:t>
+            </a:r>
+          </a:p>
+        </p:txBody>
+      </p:sp>
+      <p:sp>
+        <p:nvSpPr>
+          <p:cNvPr id="3" name="Text Placeholder 2">
+            <a:extLst>
+              <a:ext uri="{FF2B5EF4-FFF2-40B4-BE49-F238E27FC236}">
+                <a16:creationId xmlns:a16="http://schemas.microsoft.com/office/drawing/2014/main" id="{BF704169-0459-418E-9AC9-49D9572FA1F1}"/>
+              </a:ext>
+            </a:extLst>
+          </p:cNvPr>
+          <p:cNvSpPr>
+            <a:spLocks noGrp="1"/>
+          </p:cNvSpPr>
+          <p:nvPr>
+            <p:ph type="body" idx="1"/>
+          </p:nvPr>
+        </p:nvSpPr>
+        <p:spPr/>
+        <p:txBody>
+          <a:bodyPr/>
+          <a:lstStyle/>
+          <a:p>
+            <a:endParaRPr lang="en-US"/>
+          </a:p>
+        </p:txBody>
+      </p:sp>
+    </p:spTree>
+    <p:extLst>
+      <p:ext uri="{BB962C8B-B14F-4D97-AF65-F5344CB8AC3E}">
+        <p14:creationId xmlns:p14="http://schemas.microsoft.com/office/powerpoint/2010/main" val="4028855074"/>
+      </p:ext>
+    </p:extLst>
+  </p:cSld>
+  <p:clrMapOvr>
+    <a:masterClrMapping/>
+  </p:clrMapOvr>
+</p:sld>
+</file>
+
+<file path=ppt/slides/slide12.xml><?xml version="1.0" encoding="utf-8"?>
+<p:sld xmlns:a="http://schemas.openxmlformats.org/drawingml/2006/main" xmlns:r="http://schemas.openxmlformats.org/officeDocument/2006/relationships" xmlns:p="http://schemas.openxmlformats.org/presentationml/2006/main">
+  <p:cSld>
+    <p:spTree>
+      <p:nvGrpSpPr>
+        <p:cNvPr id="1" name=""/>
+        <p:cNvGrpSpPr/>
+        <p:nvPr/>
+      </p:nvGrpSpPr>
+      <p:grpSpPr>
+        <a:xfrm>
+          <a:off x="0" y="0"/>
+          <a:ext cx="0" cy="0"/>
+          <a:chOff x="0" y="0"/>
+          <a:chExt cx="0" cy="0"/>
+        </a:xfrm>
+      </p:grpSpPr>
+      <p:sp>
+        <p:nvSpPr>
+          <p:cNvPr id="30" name="Oval 29">
+            <a:extLst>
+              <a:ext uri="{FF2B5EF4-FFF2-40B4-BE49-F238E27FC236}">
+                <a16:creationId xmlns:a16="http://schemas.microsoft.com/office/drawing/2014/main" id="{D8C1E074-19B0-4BA4-83E5-3E77DC29EAF8}"/>
+              </a:ext>
+            </a:extLst>
+          </p:cNvPr>
+          <p:cNvSpPr/>
+          <p:nvPr/>
+        </p:nvSpPr>
+        <p:spPr>
+          <a:xfrm>
+            <a:off x="4876154" y="5509934"/>
+            <a:ext cx="1967869" cy="1089433"/>
+          </a:xfrm>
+          <a:prstGeom prst="ellipse">
+            <a:avLst/>
+          </a:prstGeom>
+          <a:noFill/>
+          <a:ln>
+            <a:solidFill>
+              <a:schemeClr val="tx1"/>
+            </a:solidFill>
+            <a:prstDash val="dash"/>
+          </a:ln>
+        </p:spPr>
+        <p:style>
+          <a:lnRef idx="2">
+            <a:schemeClr val="accent1">
+              <a:shade val="50000"/>
+            </a:schemeClr>
+          </a:lnRef>
+          <a:fillRef idx="1">
+            <a:schemeClr val="accent1"/>
+          </a:fillRef>
+          <a:effectRef idx="0">
+            <a:schemeClr val="accent1"/>
+          </a:effectRef>
+          <a:fontRef idx="minor">
+            <a:schemeClr val="lt1"/>
+          </a:fontRef>
+        </p:style>
+        <p:txBody>
+          <a:bodyPr rtlCol="0" anchor="ctr"/>
+          <a:lstStyle/>
+          <a:p>
+            <a:pPr algn="ctr"/>
+            <a:endParaRPr lang="en-US"/>
+          </a:p>
+        </p:txBody>
+      </p:sp>
+      <p:sp>
+        <p:nvSpPr>
+          <p:cNvPr id="2" name="Title 1">
+            <a:extLst>
+              <a:ext uri="{FF2B5EF4-FFF2-40B4-BE49-F238E27FC236}">
+                <a16:creationId xmlns:a16="http://schemas.microsoft.com/office/drawing/2014/main" id="{76966D12-A105-4527-83E8-64F0055CAF93}"/>
+              </a:ext>
+            </a:extLst>
+          </p:cNvPr>
+          <p:cNvSpPr>
+            <a:spLocks noGrp="1"/>
+          </p:cNvSpPr>
+          <p:nvPr>
+            <p:ph type="title"/>
+          </p:nvPr>
+        </p:nvSpPr>
+        <p:spPr/>
+        <p:txBody>
+          <a:bodyPr/>
+          <a:lstStyle/>
+          <a:p>
+            <a:r>
+              <a:rPr lang="en-US" dirty="0"/>
+              <a:t>Experiment</a:t>
+            </a:r>
+          </a:p>
+        </p:txBody>
+      </p:sp>
+      <p:pic>
+        <p:nvPicPr>
+          <p:cNvPr id="5" name="Picture 4" descr="A picture containing map&#10;&#10;Description automatically generated">
+            <a:extLst>
+              <a:ext uri="{FF2B5EF4-FFF2-40B4-BE49-F238E27FC236}">
+                <a16:creationId xmlns:a16="http://schemas.microsoft.com/office/drawing/2014/main" id="{83469872-DE07-4C1D-955B-3374A66DD81E}"/>
+              </a:ext>
+            </a:extLst>
+          </p:cNvPr>
+          <p:cNvPicPr>
+            <a:picLocks noChangeAspect="1"/>
+          </p:cNvPicPr>
+          <p:nvPr/>
+        </p:nvPicPr>
+        <p:blipFill rotWithShape="1">
+          <a:blip r:embed="rId2">
+            <a:extLst>
+              <a:ext uri="{28A0092B-C50C-407E-A947-70E740481C1C}">
+                <a14:useLocalDpi xmlns:a14="http://schemas.microsoft.com/office/drawing/2010/main" val="0"/>
+              </a:ext>
+            </a:extLst>
+          </a:blip>
+          <a:srcRect t="12890" b="16722"/>
+          <a:stretch/>
+        </p:blipFill>
+        <p:spPr>
+          <a:xfrm>
+            <a:off x="4652145" y="1568595"/>
+            <a:ext cx="2355071" cy="3857854"/>
+          </a:xfrm>
+          <a:prstGeom prst="rect">
+            <a:avLst/>
+          </a:prstGeom>
+        </p:spPr>
+      </p:pic>
+      <p:cxnSp>
+        <p:nvCxnSpPr>
+          <p:cNvPr id="6" name="Connector: Curved 5">
+            <a:extLst>
+              <a:ext uri="{FF2B5EF4-FFF2-40B4-BE49-F238E27FC236}">
+                <a16:creationId xmlns:a16="http://schemas.microsoft.com/office/drawing/2014/main" id="{F3B82A6E-3854-4AF1-8C3F-190853E60483}"/>
+              </a:ext>
+            </a:extLst>
+          </p:cNvPr>
+          <p:cNvCxnSpPr>
+            <a:cxnSpLocks/>
+            <a:stCxn id="21" idx="0"/>
+          </p:cNvCxnSpPr>
+          <p:nvPr/>
+        </p:nvCxnSpPr>
+        <p:spPr>
+          <a:xfrm rot="5400000" flipH="1" flipV="1">
+            <a:off x="4116110" y="4335477"/>
+            <a:ext cx="646749" cy="1129884"/>
+          </a:xfrm>
+          <a:prstGeom prst="curvedConnector2">
+            <a:avLst/>
+          </a:prstGeom>
+          <a:ln>
+            <a:solidFill>
+              <a:schemeClr val="tx1"/>
+            </a:solidFill>
+            <a:tailEnd type="triangle"/>
+          </a:ln>
+        </p:spPr>
+        <p:style>
+          <a:lnRef idx="3">
+            <a:schemeClr val="accent6"/>
+          </a:lnRef>
+          <a:fillRef idx="0">
+            <a:schemeClr val="accent6"/>
+          </a:fillRef>
+          <a:effectRef idx="2">
+            <a:schemeClr val="accent6"/>
+          </a:effectRef>
+          <a:fontRef idx="minor">
+            <a:schemeClr val="tx1"/>
+          </a:fontRef>
+        </p:style>
+      </p:cxnSp>
+      <p:sp>
+        <p:nvSpPr>
+          <p:cNvPr id="7" name="TextBox 6">
+            <a:extLst>
+              <a:ext uri="{FF2B5EF4-FFF2-40B4-BE49-F238E27FC236}">
+                <a16:creationId xmlns:a16="http://schemas.microsoft.com/office/drawing/2014/main" id="{E7BCC743-562A-4D98-8F0B-F0C1F5548A0F}"/>
+              </a:ext>
+            </a:extLst>
+          </p:cNvPr>
+          <p:cNvSpPr txBox="1"/>
+          <p:nvPr/>
+        </p:nvSpPr>
+        <p:spPr>
+          <a:xfrm>
+            <a:off x="676265" y="6054651"/>
+            <a:ext cx="4538861" cy="646331"/>
+          </a:xfrm>
+          <a:prstGeom prst="rect">
+            <a:avLst/>
+          </a:prstGeom>
+          <a:noFill/>
+        </p:spPr>
+        <p:txBody>
+          <a:bodyPr wrap="square" rtlCol="0">
+            <a:spAutoFit/>
+          </a:bodyPr>
+          <a:lstStyle/>
+          <a:p>
+            <a:r>
+              <a:rPr lang="en-US" dirty="0">
+                <a:latin typeface="Arial" panose="020B0604020202020204" pitchFamily="34" charset="0"/>
+                <a:cs typeface="Arial" panose="020B0604020202020204" pitchFamily="34" charset="0"/>
+              </a:rPr>
+              <a:t>Population of neurons whose average firing rate we want to encode and transmit</a:t>
+            </a:r>
+          </a:p>
+        </p:txBody>
+      </p:sp>
+      <p:sp>
+        <p:nvSpPr>
+          <p:cNvPr id="8" name="Oval 7">
+            <a:extLst>
+              <a:ext uri="{FF2B5EF4-FFF2-40B4-BE49-F238E27FC236}">
+                <a16:creationId xmlns:a16="http://schemas.microsoft.com/office/drawing/2014/main" id="{5619D366-F32B-4044-9198-E43DF8592A5D}"/>
+              </a:ext>
+            </a:extLst>
+          </p:cNvPr>
+          <p:cNvSpPr/>
+          <p:nvPr/>
+        </p:nvSpPr>
+        <p:spPr>
+          <a:xfrm>
+            <a:off x="5069609" y="5928167"/>
+            <a:ext cx="197708" cy="205946"/>
+          </a:xfrm>
+          <a:prstGeom prst="ellipse">
+            <a:avLst/>
+          </a:prstGeom>
+        </p:spPr>
+        <p:style>
+          <a:lnRef idx="2">
+            <a:schemeClr val="accent1">
+              <a:shade val="50000"/>
+            </a:schemeClr>
+          </a:lnRef>
+          <a:fillRef idx="1">
+            <a:schemeClr val="accent1"/>
+          </a:fillRef>
+          <a:effectRef idx="0">
+            <a:schemeClr val="accent1"/>
+          </a:effectRef>
+          <a:fontRef idx="minor">
+            <a:schemeClr val="lt1"/>
+          </a:fontRef>
+        </p:style>
+        <p:txBody>
+          <a:bodyPr rtlCol="0" anchor="ctr"/>
+          <a:lstStyle/>
+          <a:p>
+            <a:pPr algn="ctr"/>
+            <a:endParaRPr lang="en-US"/>
+          </a:p>
+        </p:txBody>
+      </p:sp>
+      <p:sp>
+        <p:nvSpPr>
+          <p:cNvPr id="9" name="Oval 8">
+            <a:extLst>
+              <a:ext uri="{FF2B5EF4-FFF2-40B4-BE49-F238E27FC236}">
+                <a16:creationId xmlns:a16="http://schemas.microsoft.com/office/drawing/2014/main" id="{C94162A4-2C9F-42EE-A02D-318995C45E48}"/>
+              </a:ext>
+            </a:extLst>
+          </p:cNvPr>
+          <p:cNvSpPr/>
+          <p:nvPr/>
+        </p:nvSpPr>
+        <p:spPr>
+          <a:xfrm>
+            <a:off x="5858829" y="5958766"/>
+            <a:ext cx="197708" cy="205946"/>
+          </a:xfrm>
+          <a:prstGeom prst="ellipse">
+            <a:avLst/>
+          </a:prstGeom>
+        </p:spPr>
+        <p:style>
+          <a:lnRef idx="2">
+            <a:schemeClr val="accent1">
+              <a:shade val="50000"/>
+            </a:schemeClr>
+          </a:lnRef>
+          <a:fillRef idx="1">
+            <a:schemeClr val="accent1"/>
+          </a:fillRef>
+          <a:effectRef idx="0">
+            <a:schemeClr val="accent1"/>
+          </a:effectRef>
+          <a:fontRef idx="minor">
+            <a:schemeClr val="lt1"/>
+          </a:fontRef>
+        </p:style>
+        <p:txBody>
+          <a:bodyPr rtlCol="0" anchor="ctr"/>
+          <a:lstStyle/>
+          <a:p>
+            <a:pPr algn="ctr"/>
+            <a:endParaRPr lang="en-US"/>
+          </a:p>
+        </p:txBody>
+      </p:sp>
+      <p:sp>
+        <p:nvSpPr>
+          <p:cNvPr id="10" name="Oval 9">
+            <a:extLst>
+              <a:ext uri="{FF2B5EF4-FFF2-40B4-BE49-F238E27FC236}">
+                <a16:creationId xmlns:a16="http://schemas.microsoft.com/office/drawing/2014/main" id="{F1DAE79C-DCE5-4762-9064-3C79B0E43BB7}"/>
+              </a:ext>
+            </a:extLst>
+          </p:cNvPr>
+          <p:cNvSpPr/>
+          <p:nvPr/>
+        </p:nvSpPr>
+        <p:spPr>
+          <a:xfrm>
+            <a:off x="5420767" y="6255409"/>
+            <a:ext cx="197708" cy="205946"/>
+          </a:xfrm>
+          <a:prstGeom prst="ellipse">
+            <a:avLst/>
+          </a:prstGeom>
+        </p:spPr>
+        <p:style>
+          <a:lnRef idx="2">
+            <a:schemeClr val="accent1">
+              <a:shade val="50000"/>
+            </a:schemeClr>
+          </a:lnRef>
+          <a:fillRef idx="1">
+            <a:schemeClr val="accent1"/>
+          </a:fillRef>
+          <a:effectRef idx="0">
+            <a:schemeClr val="accent1"/>
+          </a:effectRef>
+          <a:fontRef idx="minor">
+            <a:schemeClr val="lt1"/>
+          </a:fontRef>
+        </p:style>
+        <p:txBody>
+          <a:bodyPr rtlCol="0" anchor="ctr"/>
+          <a:lstStyle/>
+          <a:p>
+            <a:pPr algn="ctr"/>
+            <a:endParaRPr lang="en-US"/>
+          </a:p>
+        </p:txBody>
+      </p:sp>
+      <p:sp>
+        <p:nvSpPr>
+          <p:cNvPr id="11" name="Oval 10">
+            <a:extLst>
+              <a:ext uri="{FF2B5EF4-FFF2-40B4-BE49-F238E27FC236}">
+                <a16:creationId xmlns:a16="http://schemas.microsoft.com/office/drawing/2014/main" id="{FC495984-5100-47C3-96B0-8BF29592A95D}"/>
+              </a:ext>
+            </a:extLst>
+          </p:cNvPr>
+          <p:cNvSpPr/>
+          <p:nvPr/>
+        </p:nvSpPr>
+        <p:spPr>
+          <a:xfrm>
+            <a:off x="6330579" y="6134113"/>
+            <a:ext cx="197708" cy="205946"/>
+          </a:xfrm>
+          <a:prstGeom prst="ellipse">
+            <a:avLst/>
+          </a:prstGeom>
+        </p:spPr>
+        <p:style>
+          <a:lnRef idx="2">
+            <a:schemeClr val="accent1">
+              <a:shade val="50000"/>
+            </a:schemeClr>
+          </a:lnRef>
+          <a:fillRef idx="1">
+            <a:schemeClr val="accent1"/>
+          </a:fillRef>
+          <a:effectRef idx="0">
+            <a:schemeClr val="accent1"/>
+          </a:effectRef>
+          <a:fontRef idx="minor">
+            <a:schemeClr val="lt1"/>
+          </a:fontRef>
+        </p:style>
+        <p:txBody>
+          <a:bodyPr rtlCol="0" anchor="ctr"/>
+          <a:lstStyle/>
+          <a:p>
+            <a:pPr algn="ctr"/>
+            <a:endParaRPr lang="en-US"/>
+          </a:p>
+        </p:txBody>
+      </p:sp>
+      <p:cxnSp>
+        <p:nvCxnSpPr>
+          <p:cNvPr id="12" name="Straight Arrow Connector 11">
+            <a:extLst>
+              <a:ext uri="{FF2B5EF4-FFF2-40B4-BE49-F238E27FC236}">
+                <a16:creationId xmlns:a16="http://schemas.microsoft.com/office/drawing/2014/main" id="{370678BA-4A76-491B-ADE2-74E2D158D768}"/>
+              </a:ext>
+            </a:extLst>
+          </p:cNvPr>
+          <p:cNvCxnSpPr>
+            <a:cxnSpLocks/>
+            <a:stCxn id="9" idx="0"/>
+          </p:cNvCxnSpPr>
+          <p:nvPr/>
+        </p:nvCxnSpPr>
+        <p:spPr>
+          <a:xfrm flipV="1">
+            <a:off x="5957683" y="4709220"/>
+            <a:ext cx="247394" cy="1249546"/>
+          </a:xfrm>
+          <a:prstGeom prst="straightConnector1">
+            <a:avLst/>
+          </a:prstGeom>
+          <a:ln>
+            <a:solidFill>
+              <a:schemeClr val="tx1"/>
+            </a:solidFill>
+            <a:tailEnd type="triangle"/>
+          </a:ln>
+        </p:spPr>
+        <p:style>
+          <a:lnRef idx="1">
+            <a:schemeClr val="accent1"/>
+          </a:lnRef>
+          <a:fillRef idx="0">
+            <a:schemeClr val="accent1"/>
+          </a:fillRef>
+          <a:effectRef idx="0">
+            <a:schemeClr val="accent1"/>
+          </a:effectRef>
+          <a:fontRef idx="minor">
+            <a:schemeClr val="tx1"/>
+          </a:fontRef>
+        </p:style>
+      </p:cxnSp>
+      <p:cxnSp>
+        <p:nvCxnSpPr>
+          <p:cNvPr id="13" name="Straight Arrow Connector 12">
+            <a:extLst>
+              <a:ext uri="{FF2B5EF4-FFF2-40B4-BE49-F238E27FC236}">
+                <a16:creationId xmlns:a16="http://schemas.microsoft.com/office/drawing/2014/main" id="{ED06CC8E-5CF1-47BB-A32D-5F0763F3A01A}"/>
+              </a:ext>
+            </a:extLst>
+          </p:cNvPr>
+          <p:cNvCxnSpPr>
+            <a:cxnSpLocks/>
+            <a:stCxn id="10" idx="0"/>
+          </p:cNvCxnSpPr>
+          <p:nvPr/>
+        </p:nvCxnSpPr>
+        <p:spPr>
+          <a:xfrm flipV="1">
+            <a:off x="5519621" y="4682411"/>
+            <a:ext cx="719039" cy="1572998"/>
+          </a:xfrm>
+          <a:prstGeom prst="straightConnector1">
+            <a:avLst/>
+          </a:prstGeom>
+          <a:ln>
+            <a:solidFill>
+              <a:schemeClr val="tx1"/>
+            </a:solidFill>
+            <a:tailEnd type="triangle"/>
+          </a:ln>
+        </p:spPr>
+        <p:style>
+          <a:lnRef idx="1">
+            <a:schemeClr val="accent1"/>
+          </a:lnRef>
+          <a:fillRef idx="0">
+            <a:schemeClr val="accent1"/>
+          </a:fillRef>
+          <a:effectRef idx="0">
+            <a:schemeClr val="accent1"/>
+          </a:effectRef>
+          <a:fontRef idx="minor">
+            <a:schemeClr val="tx1"/>
+          </a:fontRef>
+        </p:style>
+      </p:cxnSp>
+      <p:cxnSp>
+        <p:nvCxnSpPr>
+          <p:cNvPr id="14" name="Straight Arrow Connector 13">
+            <a:extLst>
+              <a:ext uri="{FF2B5EF4-FFF2-40B4-BE49-F238E27FC236}">
+                <a16:creationId xmlns:a16="http://schemas.microsoft.com/office/drawing/2014/main" id="{BE857334-4DEB-4C7D-A26B-CD79182666BD}"/>
+              </a:ext>
+            </a:extLst>
+          </p:cNvPr>
+          <p:cNvCxnSpPr>
+            <a:cxnSpLocks/>
+            <a:stCxn id="8" idx="0"/>
+          </p:cNvCxnSpPr>
+          <p:nvPr/>
+        </p:nvCxnSpPr>
+        <p:spPr>
+          <a:xfrm flipV="1">
+            <a:off x="5168463" y="4350015"/>
+            <a:ext cx="98854" cy="1578152"/>
+          </a:xfrm>
+          <a:prstGeom prst="straightConnector1">
+            <a:avLst/>
+          </a:prstGeom>
+          <a:ln>
+            <a:solidFill>
+              <a:schemeClr val="tx1"/>
+            </a:solidFill>
+            <a:tailEnd type="triangle"/>
+          </a:ln>
+        </p:spPr>
+        <p:style>
+          <a:lnRef idx="1">
+            <a:schemeClr val="accent1"/>
+          </a:lnRef>
+          <a:fillRef idx="0">
+            <a:schemeClr val="accent1"/>
+          </a:fillRef>
+          <a:effectRef idx="0">
+            <a:schemeClr val="accent1"/>
+          </a:effectRef>
+          <a:fontRef idx="minor">
+            <a:schemeClr val="tx1"/>
+          </a:fontRef>
+        </p:style>
+      </p:cxnSp>
+      <p:cxnSp>
+        <p:nvCxnSpPr>
+          <p:cNvPr id="15" name="Straight Arrow Connector 14">
+            <a:extLst>
+              <a:ext uri="{FF2B5EF4-FFF2-40B4-BE49-F238E27FC236}">
+                <a16:creationId xmlns:a16="http://schemas.microsoft.com/office/drawing/2014/main" id="{E267DCEF-6217-4E1C-9ECB-57595E0BE8F2}"/>
+              </a:ext>
+            </a:extLst>
+          </p:cNvPr>
+          <p:cNvCxnSpPr>
+            <a:cxnSpLocks/>
+            <a:stCxn id="11" idx="0"/>
+          </p:cNvCxnSpPr>
+          <p:nvPr/>
+        </p:nvCxnSpPr>
+        <p:spPr>
+          <a:xfrm flipH="1" flipV="1">
+            <a:off x="6194458" y="4682411"/>
+            <a:ext cx="234975" cy="1451702"/>
+          </a:xfrm>
+          <a:prstGeom prst="straightConnector1">
+            <a:avLst/>
+          </a:prstGeom>
+          <a:ln>
+            <a:solidFill>
+              <a:schemeClr val="tx1"/>
+            </a:solidFill>
+            <a:tailEnd type="triangle"/>
+          </a:ln>
+        </p:spPr>
+        <p:style>
+          <a:lnRef idx="1">
+            <a:schemeClr val="accent1"/>
+          </a:lnRef>
+          <a:fillRef idx="0">
+            <a:schemeClr val="accent1"/>
+          </a:fillRef>
+          <a:effectRef idx="0">
+            <a:schemeClr val="accent1"/>
+          </a:effectRef>
+          <a:fontRef idx="minor">
+            <a:schemeClr val="tx1"/>
+          </a:fontRef>
+        </p:style>
+      </p:cxnSp>
+      <p:cxnSp>
+        <p:nvCxnSpPr>
+          <p:cNvPr id="16" name="Straight Arrow Connector 15">
+            <a:extLst>
+              <a:ext uri="{FF2B5EF4-FFF2-40B4-BE49-F238E27FC236}">
+                <a16:creationId xmlns:a16="http://schemas.microsoft.com/office/drawing/2014/main" id="{FDE4F8BF-B450-41A4-9819-EE863C2B8B65}"/>
+              </a:ext>
+            </a:extLst>
+          </p:cNvPr>
+          <p:cNvCxnSpPr>
+            <a:cxnSpLocks/>
+            <a:stCxn id="10" idx="0"/>
+          </p:cNvCxnSpPr>
+          <p:nvPr/>
+        </p:nvCxnSpPr>
+        <p:spPr>
+          <a:xfrm flipV="1">
+            <a:off x="5519621" y="5078471"/>
+            <a:ext cx="164020" cy="1176938"/>
+          </a:xfrm>
+          <a:prstGeom prst="straightConnector1">
+            <a:avLst/>
+          </a:prstGeom>
+          <a:ln>
+            <a:solidFill>
+              <a:schemeClr val="tx1"/>
+            </a:solidFill>
+            <a:tailEnd type="triangle"/>
+          </a:ln>
+        </p:spPr>
+        <p:style>
+          <a:lnRef idx="1">
+            <a:schemeClr val="accent1"/>
+          </a:lnRef>
+          <a:fillRef idx="0">
+            <a:schemeClr val="accent1"/>
+          </a:fillRef>
+          <a:effectRef idx="0">
+            <a:schemeClr val="accent1"/>
+          </a:effectRef>
+          <a:fontRef idx="minor">
+            <a:schemeClr val="tx1"/>
+          </a:fontRef>
+        </p:style>
+      </p:cxnSp>
+      <p:cxnSp>
+        <p:nvCxnSpPr>
+          <p:cNvPr id="17" name="Straight Arrow Connector 16">
+            <a:extLst>
+              <a:ext uri="{FF2B5EF4-FFF2-40B4-BE49-F238E27FC236}">
+                <a16:creationId xmlns:a16="http://schemas.microsoft.com/office/drawing/2014/main" id="{81433BF7-D966-49D1-84B8-43BB7C281D71}"/>
+              </a:ext>
+            </a:extLst>
+          </p:cNvPr>
+          <p:cNvCxnSpPr>
+            <a:cxnSpLocks/>
+            <a:stCxn id="9" idx="0"/>
+          </p:cNvCxnSpPr>
+          <p:nvPr/>
+        </p:nvCxnSpPr>
+        <p:spPr>
+          <a:xfrm flipH="1" flipV="1">
+            <a:off x="5710289" y="5116134"/>
+            <a:ext cx="247394" cy="842632"/>
+          </a:xfrm>
+          <a:prstGeom prst="straightConnector1">
+            <a:avLst/>
+          </a:prstGeom>
+          <a:ln>
+            <a:solidFill>
+              <a:schemeClr val="tx1"/>
+            </a:solidFill>
+            <a:tailEnd type="triangle"/>
+          </a:ln>
+        </p:spPr>
+        <p:style>
+          <a:lnRef idx="1">
+            <a:schemeClr val="accent1"/>
+          </a:lnRef>
+          <a:fillRef idx="0">
+            <a:schemeClr val="accent1"/>
+          </a:fillRef>
+          <a:effectRef idx="0">
+            <a:schemeClr val="accent1"/>
+          </a:effectRef>
+          <a:fontRef idx="minor">
+            <a:schemeClr val="tx1"/>
+          </a:fontRef>
+        </p:style>
+      </p:cxnSp>
+      <p:cxnSp>
+        <p:nvCxnSpPr>
+          <p:cNvPr id="18" name="Straight Arrow Connector 17">
+            <a:extLst>
+              <a:ext uri="{FF2B5EF4-FFF2-40B4-BE49-F238E27FC236}">
+                <a16:creationId xmlns:a16="http://schemas.microsoft.com/office/drawing/2014/main" id="{72F79803-47CA-4697-977E-4CA25A46D866}"/>
+              </a:ext>
+            </a:extLst>
+          </p:cNvPr>
+          <p:cNvCxnSpPr>
+            <a:cxnSpLocks/>
+            <a:stCxn id="11" idx="0"/>
+          </p:cNvCxnSpPr>
+          <p:nvPr/>
+        </p:nvCxnSpPr>
+        <p:spPr>
+          <a:xfrm flipV="1">
+            <a:off x="6429433" y="4656990"/>
+            <a:ext cx="339208" cy="1477123"/>
+          </a:xfrm>
+          <a:prstGeom prst="straightConnector1">
+            <a:avLst/>
+          </a:prstGeom>
+          <a:ln>
+            <a:solidFill>
+              <a:schemeClr val="tx1"/>
+            </a:solidFill>
+            <a:tailEnd type="triangle"/>
+          </a:ln>
+        </p:spPr>
+        <p:style>
+          <a:lnRef idx="1">
+            <a:schemeClr val="accent1"/>
+          </a:lnRef>
+          <a:fillRef idx="0">
+            <a:schemeClr val="accent1"/>
+          </a:fillRef>
+          <a:effectRef idx="0">
+            <a:schemeClr val="accent1"/>
+          </a:effectRef>
+          <a:fontRef idx="minor">
+            <a:schemeClr val="tx1"/>
+          </a:fontRef>
+        </p:style>
+      </p:cxnSp>
+      <p:sp>
+        <p:nvSpPr>
+          <p:cNvPr id="19" name="Oval 18">
+            <a:extLst>
+              <a:ext uri="{FF2B5EF4-FFF2-40B4-BE49-F238E27FC236}">
+                <a16:creationId xmlns:a16="http://schemas.microsoft.com/office/drawing/2014/main" id="{2AA3CAF3-0EF3-4755-957D-40266EDD95CA}"/>
+              </a:ext>
+            </a:extLst>
+          </p:cNvPr>
+          <p:cNvSpPr/>
+          <p:nvPr/>
+        </p:nvSpPr>
+        <p:spPr>
+          <a:xfrm>
+            <a:off x="4876154" y="3022583"/>
+            <a:ext cx="1920861" cy="2161193"/>
+          </a:xfrm>
+          <a:prstGeom prst="ellipse">
+            <a:avLst/>
+          </a:prstGeom>
+          <a:solidFill>
+            <a:srgbClr val="00B050">
+              <a:alpha val="24000"/>
+            </a:srgbClr>
+          </a:solidFill>
+          <a:ln>
+            <a:noFill/>
+          </a:ln>
+        </p:spPr>
+        <p:style>
+          <a:lnRef idx="2">
+            <a:schemeClr val="accent1">
+              <a:shade val="50000"/>
+            </a:schemeClr>
+          </a:lnRef>
+          <a:fillRef idx="1">
+            <a:schemeClr val="accent1"/>
+          </a:fillRef>
+          <a:effectRef idx="0">
+            <a:schemeClr val="accent1"/>
+          </a:effectRef>
+          <a:fontRef idx="minor">
+            <a:schemeClr val="lt1"/>
+          </a:fontRef>
+        </p:style>
+        <p:txBody>
+          <a:bodyPr rtlCol="0" anchor="ctr"/>
+          <a:lstStyle/>
+          <a:p>
+            <a:pPr algn="ctr"/>
+            <a:endParaRPr lang="en-US"/>
+          </a:p>
+        </p:txBody>
+      </p:sp>
+      <p:sp>
+        <p:nvSpPr>
+          <p:cNvPr id="20" name="Oval 19">
+            <a:extLst>
+              <a:ext uri="{FF2B5EF4-FFF2-40B4-BE49-F238E27FC236}">
+                <a16:creationId xmlns:a16="http://schemas.microsoft.com/office/drawing/2014/main" id="{6C6A6F9A-8A23-48C6-90D5-3EB8E39BF97A}"/>
+              </a:ext>
+            </a:extLst>
+          </p:cNvPr>
+          <p:cNvSpPr/>
+          <p:nvPr/>
+        </p:nvSpPr>
+        <p:spPr>
+          <a:xfrm>
+            <a:off x="4876154" y="2054884"/>
+            <a:ext cx="1967869" cy="1777442"/>
+          </a:xfrm>
+          <a:prstGeom prst="ellipse">
+            <a:avLst/>
+          </a:prstGeom>
+          <a:solidFill>
+            <a:srgbClr val="FFFF00">
+              <a:alpha val="24000"/>
+            </a:srgbClr>
+          </a:solidFill>
+          <a:ln>
+            <a:noFill/>
+          </a:ln>
+        </p:spPr>
+        <p:style>
+          <a:lnRef idx="2">
+            <a:schemeClr val="accent1">
+              <a:shade val="50000"/>
+            </a:schemeClr>
+          </a:lnRef>
+          <a:fillRef idx="1">
+            <a:schemeClr val="accent1"/>
+          </a:fillRef>
+          <a:effectRef idx="0">
+            <a:schemeClr val="accent1"/>
+          </a:effectRef>
+          <a:fontRef idx="minor">
+            <a:schemeClr val="lt1"/>
+          </a:fontRef>
+        </p:style>
+        <p:txBody>
+          <a:bodyPr rtlCol="0" anchor="ctr"/>
+          <a:lstStyle/>
+          <a:p>
+            <a:pPr algn="ctr"/>
+            <a:endParaRPr lang="en-US"/>
+          </a:p>
+        </p:txBody>
+      </p:sp>
+      <p:sp>
+        <p:nvSpPr>
+          <p:cNvPr id="21" name="TextBox 20">
+            <a:extLst>
+              <a:ext uri="{FF2B5EF4-FFF2-40B4-BE49-F238E27FC236}">
+                <a16:creationId xmlns:a16="http://schemas.microsoft.com/office/drawing/2014/main" id="{DB3AA3CB-0234-4ACE-B928-4C8B42DD4559}"/>
+              </a:ext>
+            </a:extLst>
+          </p:cNvPr>
+          <p:cNvSpPr txBox="1"/>
+          <p:nvPr/>
+        </p:nvSpPr>
+        <p:spPr>
+          <a:xfrm>
+            <a:off x="3023593" y="5223793"/>
+            <a:ext cx="1701898" cy="461665"/>
+          </a:xfrm>
+          <a:prstGeom prst="rect">
+            <a:avLst/>
+          </a:prstGeom>
+          <a:noFill/>
+        </p:spPr>
+        <p:txBody>
+          <a:bodyPr wrap="square" rtlCol="0">
+            <a:spAutoFit/>
+          </a:bodyPr>
+          <a:lstStyle/>
+          <a:p>
+            <a:r>
+              <a:rPr lang="en-US" sz="1200" dirty="0">
+                <a:latin typeface="Arial" panose="020B0604020202020204" pitchFamily="34" charset="0"/>
+                <a:cs typeface="Arial" panose="020B0604020202020204" pitchFamily="34" charset="0"/>
+              </a:rPr>
+              <a:t>Input to base layer of SCE</a:t>
+            </a:r>
+          </a:p>
+        </p:txBody>
+      </p:sp>
+      <p:sp>
+        <p:nvSpPr>
+          <p:cNvPr id="22" name="TextBox 21">
+            <a:extLst>
+              <a:ext uri="{FF2B5EF4-FFF2-40B4-BE49-F238E27FC236}">
+                <a16:creationId xmlns:a16="http://schemas.microsoft.com/office/drawing/2014/main" id="{70C626B9-3D88-43A8-8752-783C2939249E}"/>
+              </a:ext>
+            </a:extLst>
+          </p:cNvPr>
+          <p:cNvSpPr txBox="1"/>
+          <p:nvPr/>
+        </p:nvSpPr>
+        <p:spPr>
+          <a:xfrm>
+            <a:off x="2446867" y="3542223"/>
+            <a:ext cx="1968503" cy="461665"/>
+          </a:xfrm>
+          <a:prstGeom prst="rect">
+            <a:avLst/>
+          </a:prstGeom>
+          <a:noFill/>
+        </p:spPr>
+        <p:txBody>
+          <a:bodyPr wrap="square" rtlCol="0">
+            <a:spAutoFit/>
+          </a:bodyPr>
+          <a:lstStyle/>
+          <a:p>
+            <a:r>
+              <a:rPr lang="en-US" sz="1200" dirty="0">
+                <a:latin typeface="Arial" panose="020B0604020202020204" pitchFamily="34" charset="0"/>
+                <a:cs typeface="Arial" panose="020B0604020202020204" pitchFamily="34" charset="0"/>
+              </a:rPr>
+              <a:t>SCE, various topologies possible</a:t>
+            </a:r>
+          </a:p>
+        </p:txBody>
+      </p:sp>
+      <p:cxnSp>
+        <p:nvCxnSpPr>
+          <p:cNvPr id="23" name="Connector: Curved 22">
+            <a:extLst>
+              <a:ext uri="{FF2B5EF4-FFF2-40B4-BE49-F238E27FC236}">
+                <a16:creationId xmlns:a16="http://schemas.microsoft.com/office/drawing/2014/main" id="{A4C40669-5A11-48FD-8C5A-6DFCA295FDAB}"/>
+              </a:ext>
+            </a:extLst>
+          </p:cNvPr>
+          <p:cNvCxnSpPr>
+            <a:cxnSpLocks/>
+            <a:stCxn id="22" idx="3"/>
+          </p:cNvCxnSpPr>
+          <p:nvPr/>
+        </p:nvCxnSpPr>
+        <p:spPr>
+          <a:xfrm>
+            <a:off x="4415370" y="3773056"/>
+            <a:ext cx="1005397" cy="266804"/>
+          </a:xfrm>
+          <a:prstGeom prst="curvedConnector3">
+            <a:avLst>
+              <a:gd name="adj1" fmla="val 50000"/>
+            </a:avLst>
+          </a:prstGeom>
+          <a:ln>
+            <a:solidFill>
+              <a:schemeClr val="tx1"/>
+            </a:solidFill>
+            <a:tailEnd type="triangle"/>
+          </a:ln>
+        </p:spPr>
+        <p:style>
+          <a:lnRef idx="3">
+            <a:schemeClr val="accent6"/>
+          </a:lnRef>
+          <a:fillRef idx="0">
+            <a:schemeClr val="accent6"/>
+          </a:fillRef>
+          <a:effectRef idx="2">
+            <a:schemeClr val="accent6"/>
+          </a:effectRef>
+          <a:fontRef idx="minor">
+            <a:schemeClr val="tx1"/>
+          </a:fontRef>
+        </p:style>
+      </p:cxnSp>
+      <p:sp>
+        <p:nvSpPr>
+          <p:cNvPr id="24" name="TextBox 23">
+            <a:extLst>
+              <a:ext uri="{FF2B5EF4-FFF2-40B4-BE49-F238E27FC236}">
+                <a16:creationId xmlns:a16="http://schemas.microsoft.com/office/drawing/2014/main" id="{55DA10A9-A49A-407C-B7AE-3E1E03268261}"/>
+              </a:ext>
+            </a:extLst>
+          </p:cNvPr>
+          <p:cNvSpPr txBox="1"/>
+          <p:nvPr/>
+        </p:nvSpPr>
+        <p:spPr>
+          <a:xfrm>
+            <a:off x="2461409" y="2527889"/>
+            <a:ext cx="1818467" cy="461665"/>
+          </a:xfrm>
+          <a:prstGeom prst="rect">
+            <a:avLst/>
+          </a:prstGeom>
+          <a:noFill/>
+        </p:spPr>
+        <p:txBody>
+          <a:bodyPr wrap="square" rtlCol="0">
+            <a:spAutoFit/>
+          </a:bodyPr>
+          <a:lstStyle/>
+          <a:p>
+            <a:r>
+              <a:rPr lang="en-US" sz="1200" dirty="0">
+                <a:latin typeface="Arial" panose="020B0604020202020204" pitchFamily="34" charset="0"/>
+                <a:cs typeface="Arial" panose="020B0604020202020204" pitchFamily="34" charset="0"/>
+              </a:rPr>
+              <a:t>Output from top layer of SCE</a:t>
+            </a:r>
+          </a:p>
+        </p:txBody>
+      </p:sp>
+      <p:cxnSp>
+        <p:nvCxnSpPr>
+          <p:cNvPr id="25" name="Connector: Curved 24">
+            <a:extLst>
+              <a:ext uri="{FF2B5EF4-FFF2-40B4-BE49-F238E27FC236}">
+                <a16:creationId xmlns:a16="http://schemas.microsoft.com/office/drawing/2014/main" id="{A45983D8-D165-45D5-A4A1-AAFAC4E3F7E5}"/>
+              </a:ext>
+            </a:extLst>
+          </p:cNvPr>
+          <p:cNvCxnSpPr>
+            <a:cxnSpLocks/>
+            <a:stCxn id="24" idx="3"/>
+            <a:endCxn id="20" idx="2"/>
+          </p:cNvCxnSpPr>
+          <p:nvPr/>
+        </p:nvCxnSpPr>
+        <p:spPr>
+          <a:xfrm>
+            <a:off x="4279876" y="2758722"/>
+            <a:ext cx="596278" cy="184883"/>
+          </a:xfrm>
+          <a:prstGeom prst="curvedConnector3">
+            <a:avLst>
+              <a:gd name="adj1" fmla="val 50000"/>
+            </a:avLst>
+          </a:prstGeom>
+          <a:ln>
+            <a:solidFill>
+              <a:schemeClr val="tx1"/>
+            </a:solidFill>
+            <a:tailEnd type="triangle"/>
+          </a:ln>
+        </p:spPr>
+        <p:style>
+          <a:lnRef idx="3">
+            <a:schemeClr val="accent6"/>
+          </a:lnRef>
+          <a:fillRef idx="0">
+            <a:schemeClr val="accent6"/>
+          </a:fillRef>
+          <a:effectRef idx="2">
+            <a:schemeClr val="accent6"/>
+          </a:effectRef>
+          <a:fontRef idx="minor">
+            <a:schemeClr val="tx1"/>
+          </a:fontRef>
+        </p:style>
+      </p:cxnSp>
+      <p:pic>
+        <p:nvPicPr>
+          <p:cNvPr id="34" name="Picture 33">
+            <a:extLst>
+              <a:ext uri="{FF2B5EF4-FFF2-40B4-BE49-F238E27FC236}">
+                <a16:creationId xmlns:a16="http://schemas.microsoft.com/office/drawing/2014/main" id="{320A0DCC-0E3F-4547-9EE8-257DFF0EF03B}"/>
+              </a:ext>
+            </a:extLst>
+          </p:cNvPr>
+          <p:cNvPicPr>
+            <a:picLocks noChangeAspect="1"/>
+          </p:cNvPicPr>
+          <p:nvPr/>
+        </p:nvPicPr>
+        <p:blipFill rotWithShape="1">
+          <a:blip r:embed="rId3">
+            <a:extLst>
+              <a:ext uri="{28A0092B-C50C-407E-A947-70E740481C1C}">
+                <a14:useLocalDpi xmlns:a14="http://schemas.microsoft.com/office/drawing/2010/main" val="0"/>
+              </a:ext>
+            </a:extLst>
+          </a:blip>
+          <a:srcRect t="33512" b="38457"/>
+          <a:stretch/>
+        </p:blipFill>
+        <p:spPr>
+          <a:xfrm>
+            <a:off x="8136467" y="4380666"/>
+            <a:ext cx="3419904" cy="1922323"/>
+          </a:xfrm>
+          <a:prstGeom prst="rect">
+            <a:avLst/>
+          </a:prstGeom>
+        </p:spPr>
+      </p:pic>
+      <p:cxnSp>
+        <p:nvCxnSpPr>
+          <p:cNvPr id="37" name="Straight Arrow Connector 36">
+            <a:extLst>
+              <a:ext uri="{FF2B5EF4-FFF2-40B4-BE49-F238E27FC236}">
+                <a16:creationId xmlns:a16="http://schemas.microsoft.com/office/drawing/2014/main" id="{771F6EDA-07A6-4E91-A633-FF6B48DEFA56}"/>
+              </a:ext>
+            </a:extLst>
+          </p:cNvPr>
+          <p:cNvCxnSpPr>
+            <a:cxnSpLocks/>
+            <a:stCxn id="30" idx="6"/>
+          </p:cNvCxnSpPr>
+          <p:nvPr/>
+        </p:nvCxnSpPr>
+        <p:spPr>
+          <a:xfrm flipV="1">
+            <a:off x="6844023" y="5464548"/>
+            <a:ext cx="1292444" cy="590103"/>
+          </a:xfrm>
+          <a:prstGeom prst="straightConnector1">
+            <a:avLst/>
+          </a:prstGeom>
+          <a:ln>
+            <a:tailEnd type="triangle"/>
+          </a:ln>
+        </p:spPr>
+        <p:style>
+          <a:lnRef idx="2">
+            <a:schemeClr val="dk1"/>
+          </a:lnRef>
+          <a:fillRef idx="0">
+            <a:schemeClr val="dk1"/>
+          </a:fillRef>
+          <a:effectRef idx="1">
+            <a:schemeClr val="dk1"/>
+          </a:effectRef>
+          <a:fontRef idx="minor">
+            <a:schemeClr val="tx1"/>
+          </a:fontRef>
+        </p:style>
+      </p:cxnSp>
+      <p:sp>
+        <p:nvSpPr>
+          <p:cNvPr id="45" name="TextBox 44">
+            <a:extLst>
+              <a:ext uri="{FF2B5EF4-FFF2-40B4-BE49-F238E27FC236}">
+                <a16:creationId xmlns:a16="http://schemas.microsoft.com/office/drawing/2014/main" id="{43BDF72F-4117-4702-867C-05D7A898754D}"/>
+              </a:ext>
+            </a:extLst>
+          </p:cNvPr>
+          <p:cNvSpPr txBox="1"/>
+          <p:nvPr/>
+        </p:nvSpPr>
+        <p:spPr>
+          <a:xfrm>
+            <a:off x="8136467" y="4033569"/>
+            <a:ext cx="3578176" cy="523220"/>
+          </a:xfrm>
+          <a:prstGeom prst="rect">
+            <a:avLst/>
+          </a:prstGeom>
+          <a:noFill/>
+        </p:spPr>
+        <p:txBody>
+          <a:bodyPr wrap="square" rtlCol="0">
+            <a:spAutoFit/>
+          </a:bodyPr>
+          <a:lstStyle/>
+          <a:p>
+            <a:r>
+              <a:rPr lang="en-US" sz="1400" dirty="0">
+                <a:latin typeface="Arial" panose="020B0604020202020204" pitchFamily="34" charset="0"/>
+                <a:cs typeface="Arial" panose="020B0604020202020204" pitchFamily="34" charset="0"/>
+              </a:rPr>
+              <a:t>Spike raster plot of a population of 50 neurons with a 10 Hz average firing rate.</a:t>
+            </a:r>
+          </a:p>
+        </p:txBody>
+      </p:sp>
+      <p:cxnSp>
+        <p:nvCxnSpPr>
+          <p:cNvPr id="41" name="Straight Arrow Connector 40">
+            <a:extLst>
+              <a:ext uri="{FF2B5EF4-FFF2-40B4-BE49-F238E27FC236}">
+                <a16:creationId xmlns:a16="http://schemas.microsoft.com/office/drawing/2014/main" id="{BD0BDD1A-F449-4E33-BF98-33898896CCB7}"/>
+              </a:ext>
+            </a:extLst>
+          </p:cNvPr>
+          <p:cNvCxnSpPr/>
+          <p:nvPr/>
+        </p:nvCxnSpPr>
+        <p:spPr>
+          <a:xfrm>
+            <a:off x="8779096" y="6284712"/>
+            <a:ext cx="2463800" cy="0"/>
+          </a:xfrm>
+          <a:prstGeom prst="straightConnector1">
+            <a:avLst/>
+          </a:prstGeom>
+          <a:ln>
+            <a:headEnd type="triangle"/>
+            <a:tailEnd type="triangle"/>
+          </a:ln>
+        </p:spPr>
+        <p:style>
+          <a:lnRef idx="1">
+            <a:schemeClr val="dk1"/>
+          </a:lnRef>
+          <a:fillRef idx="0">
+            <a:schemeClr val="dk1"/>
+          </a:fillRef>
+          <a:effectRef idx="0">
+            <a:schemeClr val="dk1"/>
+          </a:effectRef>
+          <a:fontRef idx="minor">
+            <a:schemeClr val="tx1"/>
+          </a:fontRef>
+        </p:style>
+      </p:cxnSp>
+      <p:sp>
+        <p:nvSpPr>
+          <p:cNvPr id="47" name="TextBox 46">
+            <a:extLst>
+              <a:ext uri="{FF2B5EF4-FFF2-40B4-BE49-F238E27FC236}">
+                <a16:creationId xmlns:a16="http://schemas.microsoft.com/office/drawing/2014/main" id="{CBD8AA63-FC3E-482D-B9C4-A900BFD1276D}"/>
+              </a:ext>
+            </a:extLst>
+          </p:cNvPr>
+          <p:cNvSpPr txBox="1"/>
+          <p:nvPr/>
+        </p:nvSpPr>
+        <p:spPr>
+          <a:xfrm>
+            <a:off x="9517704" y="6261944"/>
+            <a:ext cx="1254620" cy="307777"/>
+          </a:xfrm>
+          <a:prstGeom prst="rect">
+            <a:avLst/>
+          </a:prstGeom>
+          <a:noFill/>
+        </p:spPr>
+        <p:txBody>
+          <a:bodyPr wrap="square" rtlCol="0">
+            <a:spAutoFit/>
+          </a:bodyPr>
+          <a:lstStyle/>
+          <a:p>
+            <a:r>
+              <a:rPr lang="en-US" sz="1400" dirty="0">
+                <a:latin typeface="Arial" panose="020B0604020202020204" pitchFamily="34" charset="0"/>
+                <a:cs typeface="Arial" panose="020B0604020202020204" pitchFamily="34" charset="0"/>
+              </a:rPr>
+              <a:t>2 seconds</a:t>
+            </a:r>
+          </a:p>
+        </p:txBody>
+      </p:sp>
+    </p:spTree>
+    <p:extLst>
+      <p:ext uri="{BB962C8B-B14F-4D97-AF65-F5344CB8AC3E}">
+        <p14:creationId xmlns:p14="http://schemas.microsoft.com/office/powerpoint/2010/main" val="1947425932"/>
+      </p:ext>
+    </p:extLst>
+  </p:cSld>
+  <p:clrMapOvr>
+    <a:masterClrMapping/>
+  </p:clrMapOvr>
+</p:sld>
+</file>
+
+<file path=ppt/slides/slide13.xml><?xml version="1.0" encoding="utf-8"?>
+<p:sld xmlns:a="http://schemas.openxmlformats.org/drawingml/2006/main" xmlns:r="http://schemas.openxmlformats.org/officeDocument/2006/relationships" xmlns:p="http://schemas.openxmlformats.org/presentationml/2006/main">
+  <p:cSld>
+    <p:spTree>
+      <p:nvGrpSpPr>
+        <p:cNvPr id="1" name=""/>
+        <p:cNvGrpSpPr/>
+        <p:nvPr/>
+      </p:nvGrpSpPr>
+      <p:grpSpPr>
+        <a:xfrm>
+          <a:off x="0" y="0"/>
+          <a:ext cx="0" cy="0"/>
+          <a:chOff x="0" y="0"/>
+          <a:chExt cx="0" cy="0"/>
+        </a:xfrm>
+      </p:grpSpPr>
+      <p:sp>
+        <p:nvSpPr>
+          <p:cNvPr id="2" name="Title 1">
+            <a:extLst>
+              <a:ext uri="{FF2B5EF4-FFF2-40B4-BE49-F238E27FC236}">
+                <a16:creationId xmlns:a16="http://schemas.microsoft.com/office/drawing/2014/main" id="{145C7521-8C47-48F0-A9DD-952E59F368B4}"/>
+              </a:ext>
+            </a:extLst>
+          </p:cNvPr>
+          <p:cNvSpPr>
+            <a:spLocks noGrp="1"/>
+          </p:cNvSpPr>
+          <p:nvPr>
+            <p:ph type="title"/>
+          </p:nvPr>
+        </p:nvSpPr>
+        <p:spPr/>
+        <p:txBody>
+          <a:bodyPr/>
+          <a:lstStyle/>
+          <a:p>
+            <a:r>
+              <a:rPr lang="en-US" dirty="0"/>
+              <a:t>Two SCEs studied</a:t>
+            </a:r>
+          </a:p>
+        </p:txBody>
+      </p:sp>
+      <p:pic>
+        <p:nvPicPr>
+          <p:cNvPr id="4" name="Picture 3">
+            <a:extLst>
+              <a:ext uri="{FF2B5EF4-FFF2-40B4-BE49-F238E27FC236}">
+                <a16:creationId xmlns:a16="http://schemas.microsoft.com/office/drawing/2014/main" id="{B03554D5-D736-40A7-B727-B4ABA8B40ECE}"/>
+              </a:ext>
+            </a:extLst>
+          </p:cNvPr>
+          <p:cNvPicPr>
+            <a:picLocks noChangeAspect="1"/>
+          </p:cNvPicPr>
+          <p:nvPr/>
+        </p:nvPicPr>
+        <p:blipFill>
+          <a:blip r:embed="rId2">
+            <a:extLst>
+              <a:ext uri="{28A0092B-C50C-407E-A947-70E740481C1C}">
+                <a14:useLocalDpi xmlns:a14="http://schemas.microsoft.com/office/drawing/2010/main" val="0"/>
+              </a:ext>
+            </a:extLst>
+          </a:blip>
+          <a:stretch>
+            <a:fillRect/>
+          </a:stretch>
+        </p:blipFill>
+        <p:spPr>
+          <a:xfrm>
+            <a:off x="2692399" y="1539875"/>
+            <a:ext cx="3714750" cy="4953000"/>
+          </a:xfrm>
+          <a:prstGeom prst="rect">
+            <a:avLst/>
+          </a:prstGeom>
+        </p:spPr>
+      </p:pic>
+      <p:pic>
+        <p:nvPicPr>
+          <p:cNvPr id="6" name="Picture 5">
+            <a:extLst>
+              <a:ext uri="{FF2B5EF4-FFF2-40B4-BE49-F238E27FC236}">
+                <a16:creationId xmlns:a16="http://schemas.microsoft.com/office/drawing/2014/main" id="{EA713653-DAC0-4D34-A08D-A90D88A90714}"/>
+              </a:ext>
+            </a:extLst>
+          </p:cNvPr>
+          <p:cNvPicPr>
+            <a:picLocks noChangeAspect="1"/>
+          </p:cNvPicPr>
+          <p:nvPr/>
+        </p:nvPicPr>
+        <p:blipFill>
+          <a:blip r:embed="rId3">
+            <a:extLst>
+              <a:ext uri="{28A0092B-C50C-407E-A947-70E740481C1C}">
+                <a14:useLocalDpi xmlns:a14="http://schemas.microsoft.com/office/drawing/2010/main" val="0"/>
+              </a:ext>
+            </a:extLst>
+          </a:blip>
+          <a:stretch>
+            <a:fillRect/>
+          </a:stretch>
+        </p:blipFill>
+        <p:spPr>
+          <a:xfrm>
+            <a:off x="5765743" y="1598349"/>
+            <a:ext cx="3714750" cy="4953000"/>
+          </a:xfrm>
+          <a:prstGeom prst="rect">
+            <a:avLst/>
+          </a:prstGeom>
+        </p:spPr>
+      </p:pic>
+      <p:sp>
+        <p:nvSpPr>
+          <p:cNvPr id="7" name="TextBox 6">
+            <a:extLst>
+              <a:ext uri="{FF2B5EF4-FFF2-40B4-BE49-F238E27FC236}">
+                <a16:creationId xmlns:a16="http://schemas.microsoft.com/office/drawing/2014/main" id="{BA0E82F1-B9E6-4B02-8AA0-0AB88D1552BE}"/>
+              </a:ext>
+            </a:extLst>
+          </p:cNvPr>
+          <p:cNvSpPr txBox="1"/>
+          <p:nvPr/>
+        </p:nvSpPr>
+        <p:spPr>
+          <a:xfrm>
+            <a:off x="2301666" y="3429000"/>
+            <a:ext cx="912429" cy="369332"/>
+          </a:xfrm>
+          <a:prstGeom prst="rect">
+            <a:avLst/>
+          </a:prstGeom>
+          <a:noFill/>
+        </p:spPr>
+        <p:txBody>
+          <a:bodyPr wrap="none" rtlCol="0">
+            <a:spAutoFit/>
+          </a:bodyPr>
+          <a:lstStyle/>
+          <a:p>
+            <a:r>
+              <a:rPr lang="en-US" dirty="0"/>
+              <a:t>4x4 SCE</a:t>
+            </a:r>
+          </a:p>
+        </p:txBody>
+      </p:sp>
+      <p:sp>
+        <p:nvSpPr>
+          <p:cNvPr id="8" name="TextBox 7">
+            <a:extLst>
+              <a:ext uri="{FF2B5EF4-FFF2-40B4-BE49-F238E27FC236}">
+                <a16:creationId xmlns:a16="http://schemas.microsoft.com/office/drawing/2014/main" id="{70FE62B0-27BE-43DF-9520-6F0FA2DB0B8C}"/>
+              </a:ext>
+            </a:extLst>
+          </p:cNvPr>
+          <p:cNvSpPr txBox="1"/>
+          <p:nvPr/>
+        </p:nvSpPr>
+        <p:spPr>
+          <a:xfrm>
+            <a:off x="9082616" y="3429000"/>
+            <a:ext cx="2949525" cy="369332"/>
+          </a:xfrm>
+          <a:prstGeom prst="rect">
+            <a:avLst/>
+          </a:prstGeom>
+          <a:noFill/>
+        </p:spPr>
+        <p:txBody>
+          <a:bodyPr wrap="none" rtlCol="0">
+            <a:spAutoFit/>
+          </a:bodyPr>
+          <a:lstStyle/>
+          <a:p>
+            <a:r>
+              <a:rPr lang="en-US" dirty="0"/>
+              <a:t>SCE with 4 columns, each 2x2</a:t>
+            </a:r>
+          </a:p>
+        </p:txBody>
+      </p:sp>
+    </p:spTree>
+    <p:extLst>
+      <p:ext uri="{BB962C8B-B14F-4D97-AF65-F5344CB8AC3E}">
+        <p14:creationId xmlns:p14="http://schemas.microsoft.com/office/powerpoint/2010/main" val="1579680342"/>
+      </p:ext>
+    </p:extLst>
+  </p:cSld>
+  <p:clrMapOvr>
+    <a:masterClrMapping/>
+  </p:clrMapOvr>
+</p:sld>
+</file>
+
+<file path=ppt/slides/slide14.xml><?xml version="1.0" encoding="utf-8"?>
+<p:sld xmlns:a="http://schemas.openxmlformats.org/drawingml/2006/main" xmlns:r="http://schemas.openxmlformats.org/officeDocument/2006/relationships" xmlns:p="http://schemas.openxmlformats.org/presentationml/2006/main">
+  <p:cSld>
+    <p:spTree>
+      <p:nvGrpSpPr>
+        <p:cNvPr id="1" name=""/>
+        <p:cNvGrpSpPr/>
+        <p:nvPr/>
+      </p:nvGrpSpPr>
+      <p:grpSpPr>
+        <a:xfrm>
+          <a:off x="0" y="0"/>
+          <a:ext cx="0" cy="0"/>
+          <a:chOff x="0" y="0"/>
+          <a:chExt cx="0" cy="0"/>
+        </a:xfrm>
+      </p:grpSpPr>
+      <p:sp>
+        <p:nvSpPr>
+          <p:cNvPr id="2" name="Title 1">
+            <a:extLst>
+              <a:ext uri="{FF2B5EF4-FFF2-40B4-BE49-F238E27FC236}">
+                <a16:creationId xmlns:a16="http://schemas.microsoft.com/office/drawing/2014/main" id="{CA17E180-5948-4F3D-83B6-1559C7E111DB}"/>
+              </a:ext>
+            </a:extLst>
+          </p:cNvPr>
+          <p:cNvSpPr>
+            <a:spLocks noGrp="1"/>
+          </p:cNvSpPr>
+          <p:nvPr>
+            <p:ph type="title"/>
+          </p:nvPr>
+        </p:nvSpPr>
+        <p:spPr/>
+        <p:txBody>
+          <a:bodyPr/>
+          <a:lstStyle/>
+          <a:p>
+            <a:r>
+              <a:rPr lang="en-US" dirty="0"/>
+              <a:t>Firing Rate converted to Wave Rate</a:t>
+            </a:r>
+          </a:p>
+        </p:txBody>
+      </p:sp>
+      <p:pic>
+        <p:nvPicPr>
+          <p:cNvPr id="3" name="Picture 2">
+            <a:extLst>
+              <a:ext uri="{FF2B5EF4-FFF2-40B4-BE49-F238E27FC236}">
+                <a16:creationId xmlns:a16="http://schemas.microsoft.com/office/drawing/2014/main" id="{7FC0347F-E3BA-443D-9061-E8C956FFCBF8}"/>
+              </a:ext>
+            </a:extLst>
+          </p:cNvPr>
+          <p:cNvPicPr>
+            <a:picLocks noChangeAspect="1"/>
+          </p:cNvPicPr>
+          <p:nvPr/>
+        </p:nvPicPr>
+        <p:blipFill rotWithShape="1">
+          <a:blip r:embed="rId2">
+            <a:extLst>
+              <a:ext uri="{28A0092B-C50C-407E-A947-70E740481C1C}">
+                <a14:useLocalDpi xmlns:a14="http://schemas.microsoft.com/office/drawing/2010/main" val="0"/>
+              </a:ext>
+            </a:extLst>
+          </a:blip>
+          <a:srcRect l="9483" r="8354"/>
+          <a:stretch/>
+        </p:blipFill>
+        <p:spPr>
+          <a:xfrm>
+            <a:off x="2286001" y="2561728"/>
+            <a:ext cx="9389534" cy="2852362"/>
+          </a:xfrm>
+          <a:prstGeom prst="rect">
+            <a:avLst/>
+          </a:prstGeom>
+        </p:spPr>
+      </p:pic>
+      <p:sp>
+        <p:nvSpPr>
+          <p:cNvPr id="4" name="TextBox 3">
+            <a:extLst>
+              <a:ext uri="{FF2B5EF4-FFF2-40B4-BE49-F238E27FC236}">
+                <a16:creationId xmlns:a16="http://schemas.microsoft.com/office/drawing/2014/main" id="{0225E9DC-045D-40FE-BD6D-992AB387647B}"/>
+              </a:ext>
+            </a:extLst>
+          </p:cNvPr>
+          <p:cNvSpPr txBox="1"/>
+          <p:nvPr/>
+        </p:nvSpPr>
+        <p:spPr>
+          <a:xfrm>
+            <a:off x="516465" y="2962100"/>
+            <a:ext cx="1118667" cy="369332"/>
+          </a:xfrm>
+          <a:prstGeom prst="rect">
+            <a:avLst/>
+          </a:prstGeom>
+          <a:noFill/>
+        </p:spPr>
+        <p:txBody>
+          <a:bodyPr wrap="square" rtlCol="0">
+            <a:spAutoFit/>
+          </a:bodyPr>
+          <a:lstStyle/>
+          <a:p>
+            <a:r>
+              <a:rPr lang="en-US" dirty="0">
+                <a:latin typeface="Arial" panose="020B0604020202020204" pitchFamily="34" charset="0"/>
+                <a:cs typeface="Arial" panose="020B0604020202020204" pitchFamily="34" charset="0"/>
+              </a:rPr>
+              <a:t>4x4 SCE</a:t>
+            </a:r>
+          </a:p>
+        </p:txBody>
+      </p:sp>
+      <p:cxnSp>
+        <p:nvCxnSpPr>
+          <p:cNvPr id="5" name="Straight Arrow Connector 4">
+            <a:extLst>
+              <a:ext uri="{FF2B5EF4-FFF2-40B4-BE49-F238E27FC236}">
+                <a16:creationId xmlns:a16="http://schemas.microsoft.com/office/drawing/2014/main" id="{2E874146-D498-449A-B982-229BCBA9C59D}"/>
+              </a:ext>
+            </a:extLst>
+          </p:cNvPr>
+          <p:cNvCxnSpPr>
+            <a:cxnSpLocks/>
+            <a:stCxn id="4" idx="3"/>
+          </p:cNvCxnSpPr>
+          <p:nvPr/>
+        </p:nvCxnSpPr>
+        <p:spPr>
+          <a:xfrm>
+            <a:off x="1635132" y="3146766"/>
+            <a:ext cx="762000" cy="0"/>
+          </a:xfrm>
+          <a:prstGeom prst="straightConnector1">
+            <a:avLst/>
+          </a:prstGeom>
+          <a:ln>
+            <a:tailEnd type="triangle"/>
+          </a:ln>
+        </p:spPr>
+        <p:style>
+          <a:lnRef idx="2">
+            <a:schemeClr val="dk1"/>
+          </a:lnRef>
+          <a:fillRef idx="0">
+            <a:schemeClr val="dk1"/>
+          </a:fillRef>
+          <a:effectRef idx="1">
+            <a:schemeClr val="dk1"/>
+          </a:effectRef>
+          <a:fontRef idx="minor">
+            <a:schemeClr val="tx1"/>
+          </a:fontRef>
+        </p:style>
+      </p:cxnSp>
+      <p:sp>
+        <p:nvSpPr>
+          <p:cNvPr id="9" name="TextBox 8">
+            <a:extLst>
+              <a:ext uri="{FF2B5EF4-FFF2-40B4-BE49-F238E27FC236}">
+                <a16:creationId xmlns:a16="http://schemas.microsoft.com/office/drawing/2014/main" id="{BDDE0629-CF36-4C5A-8BC2-E43E6816B903}"/>
+              </a:ext>
+            </a:extLst>
+          </p:cNvPr>
+          <p:cNvSpPr txBox="1"/>
+          <p:nvPr/>
+        </p:nvSpPr>
+        <p:spPr>
+          <a:xfrm>
+            <a:off x="274101" y="4301047"/>
+            <a:ext cx="1359968" cy="646331"/>
+          </a:xfrm>
+          <a:prstGeom prst="rect">
+            <a:avLst/>
+          </a:prstGeom>
+          <a:noFill/>
+        </p:spPr>
+        <p:txBody>
+          <a:bodyPr wrap="square" rtlCol="0">
+            <a:spAutoFit/>
+          </a:bodyPr>
+          <a:lstStyle/>
+          <a:p>
+            <a:r>
+              <a:rPr lang="en-US" dirty="0">
+                <a:latin typeface="Arial" panose="020B0604020202020204" pitchFamily="34" charset="0"/>
+                <a:cs typeface="Arial" panose="020B0604020202020204" pitchFamily="34" charset="0"/>
+              </a:rPr>
+              <a:t>4 columns, each 2x2</a:t>
+            </a:r>
+          </a:p>
+        </p:txBody>
+      </p:sp>
+      <p:cxnSp>
+        <p:nvCxnSpPr>
+          <p:cNvPr id="10" name="Straight Arrow Connector 9">
+            <a:extLst>
+              <a:ext uri="{FF2B5EF4-FFF2-40B4-BE49-F238E27FC236}">
+                <a16:creationId xmlns:a16="http://schemas.microsoft.com/office/drawing/2014/main" id="{F533294F-CC15-492A-A976-7C7817F9A120}"/>
+              </a:ext>
+            </a:extLst>
+          </p:cNvPr>
+          <p:cNvCxnSpPr>
+            <a:cxnSpLocks/>
+            <a:stCxn id="9" idx="3"/>
+          </p:cNvCxnSpPr>
+          <p:nvPr/>
+        </p:nvCxnSpPr>
+        <p:spPr>
+          <a:xfrm flipV="1">
+            <a:off x="1634069" y="4624212"/>
+            <a:ext cx="761999" cy="1"/>
+          </a:xfrm>
+          <a:prstGeom prst="straightConnector1">
+            <a:avLst/>
+          </a:prstGeom>
+          <a:ln>
+            <a:tailEnd type="triangle"/>
+          </a:ln>
+        </p:spPr>
+        <p:style>
+          <a:lnRef idx="2">
+            <a:schemeClr val="dk1"/>
+          </a:lnRef>
+          <a:fillRef idx="0">
+            <a:schemeClr val="dk1"/>
+          </a:fillRef>
+          <a:effectRef idx="1">
+            <a:schemeClr val="dk1"/>
+          </a:effectRef>
+          <a:fontRef idx="minor">
+            <a:schemeClr val="tx1"/>
+          </a:fontRef>
+        </p:style>
+      </p:cxnSp>
+      <p:sp>
+        <p:nvSpPr>
+          <p:cNvPr id="14" name="TextBox 13">
+            <a:extLst>
+              <a:ext uri="{FF2B5EF4-FFF2-40B4-BE49-F238E27FC236}">
+                <a16:creationId xmlns:a16="http://schemas.microsoft.com/office/drawing/2014/main" id="{37741339-67D2-498D-8A7B-743AF1065C0F}"/>
+              </a:ext>
+            </a:extLst>
+          </p:cNvPr>
+          <p:cNvSpPr txBox="1"/>
+          <p:nvPr/>
+        </p:nvSpPr>
+        <p:spPr>
+          <a:xfrm>
+            <a:off x="1566333" y="5778493"/>
+            <a:ext cx="9567340" cy="923330"/>
+          </a:xfrm>
+          <a:prstGeom prst="rect">
+            <a:avLst/>
+          </a:prstGeom>
+          <a:noFill/>
+        </p:spPr>
+        <p:txBody>
+          <a:bodyPr wrap="square">
+            <a:spAutoFit/>
+          </a:bodyPr>
+          <a:lstStyle/>
+          <a:p>
+            <a:pPr marL="0" indent="0">
+              <a:buNone/>
+            </a:pPr>
+            <a:r>
+              <a:rPr lang="en-US" sz="1800" b="1" dirty="0"/>
+              <a:t>A higher firing rate in the input population results in a higher rate of traveling waves propagating through the SCE. There is a maximum “traveling wave rate”, such that increasing the firing rate of the input population does not result in more frequent traveling waves.</a:t>
+            </a:r>
+          </a:p>
+        </p:txBody>
+      </p:sp>
+      <p:sp>
+        <p:nvSpPr>
+          <p:cNvPr id="15" name="TextBox 14">
+            <a:extLst>
+              <a:ext uri="{FF2B5EF4-FFF2-40B4-BE49-F238E27FC236}">
+                <a16:creationId xmlns:a16="http://schemas.microsoft.com/office/drawing/2014/main" id="{98490D20-9D0E-40F1-87DA-3F071048154B}"/>
+              </a:ext>
+            </a:extLst>
+          </p:cNvPr>
+          <p:cNvSpPr txBox="1"/>
+          <p:nvPr/>
+        </p:nvSpPr>
+        <p:spPr>
+          <a:xfrm>
+            <a:off x="2396068" y="1943227"/>
+            <a:ext cx="1498602" cy="523220"/>
+          </a:xfrm>
+          <a:prstGeom prst="rect">
+            <a:avLst/>
+          </a:prstGeom>
+          <a:noFill/>
+        </p:spPr>
+        <p:txBody>
+          <a:bodyPr wrap="square" rtlCol="0">
+            <a:spAutoFit/>
+          </a:bodyPr>
+          <a:lstStyle/>
+          <a:p>
+            <a:r>
+              <a:rPr lang="en-US" sz="1400" dirty="0">
+                <a:latin typeface="Arial" panose="020B0604020202020204" pitchFamily="34" charset="0"/>
+                <a:cs typeface="Arial" panose="020B0604020202020204" pitchFamily="34" charset="0"/>
+              </a:rPr>
+              <a:t>Input population firing rate 1 Hz</a:t>
+            </a:r>
+          </a:p>
+        </p:txBody>
+      </p:sp>
+      <p:sp>
+        <p:nvSpPr>
+          <p:cNvPr id="17" name="TextBox 16">
+            <a:extLst>
+              <a:ext uri="{FF2B5EF4-FFF2-40B4-BE49-F238E27FC236}">
+                <a16:creationId xmlns:a16="http://schemas.microsoft.com/office/drawing/2014/main" id="{6FA91BC4-4752-47CF-9EA3-7752DF872882}"/>
+              </a:ext>
+            </a:extLst>
+          </p:cNvPr>
+          <p:cNvSpPr txBox="1"/>
+          <p:nvPr/>
+        </p:nvSpPr>
+        <p:spPr>
+          <a:xfrm>
+            <a:off x="10109202" y="1943227"/>
+            <a:ext cx="1498602" cy="523220"/>
+          </a:xfrm>
+          <a:prstGeom prst="rect">
+            <a:avLst/>
+          </a:prstGeom>
+          <a:noFill/>
+        </p:spPr>
+        <p:txBody>
+          <a:bodyPr wrap="square" rtlCol="0">
+            <a:spAutoFit/>
+          </a:bodyPr>
+          <a:lstStyle/>
+          <a:p>
+            <a:r>
+              <a:rPr lang="en-US" sz="1400" dirty="0">
+                <a:latin typeface="Arial" panose="020B0604020202020204" pitchFamily="34" charset="0"/>
+                <a:cs typeface="Arial" panose="020B0604020202020204" pitchFamily="34" charset="0"/>
+              </a:rPr>
+              <a:t>Input population firing rate 21 Hz</a:t>
+            </a:r>
+          </a:p>
+        </p:txBody>
+      </p:sp>
+    </p:spTree>
+    <p:extLst>
+      <p:ext uri="{BB962C8B-B14F-4D97-AF65-F5344CB8AC3E}">
+        <p14:creationId xmlns:p14="http://schemas.microsoft.com/office/powerpoint/2010/main" val="2266459938"/>
+      </p:ext>
+    </p:extLst>
+  </p:cSld>
+  <p:clrMapOvr>
+    <a:masterClrMapping/>
+  </p:clrMapOvr>
+</p:sld>
+</file>
+
+<file path=ppt/slides/slide15.xml><?xml version="1.0" encoding="utf-8"?>
+<p:sld xmlns:a="http://schemas.openxmlformats.org/drawingml/2006/main" xmlns:r="http://schemas.openxmlformats.org/officeDocument/2006/relationships" xmlns:p="http://schemas.openxmlformats.org/presentationml/2006/main">
+  <p:cSld>
+    <p:spTree>
+      <p:nvGrpSpPr>
+        <p:cNvPr id="1" name=""/>
+        <p:cNvGrpSpPr/>
+        <p:nvPr/>
+      </p:nvGrpSpPr>
+      <p:grpSpPr>
+        <a:xfrm>
+          <a:off x="0" y="0"/>
+          <a:ext cx="0" cy="0"/>
+          <a:chOff x="0" y="0"/>
+          <a:chExt cx="0" cy="0"/>
+        </a:xfrm>
+      </p:grpSpPr>
+      <p:sp>
+        <p:nvSpPr>
+          <p:cNvPr id="2" name="Title 1">
+            <a:extLst>
+              <a:ext uri="{FF2B5EF4-FFF2-40B4-BE49-F238E27FC236}">
+                <a16:creationId xmlns:a16="http://schemas.microsoft.com/office/drawing/2014/main" id="{4978A05F-7A7F-4026-9E52-C56CF002DE46}"/>
+              </a:ext>
+            </a:extLst>
+          </p:cNvPr>
+          <p:cNvSpPr>
+            <a:spLocks noGrp="1"/>
+          </p:cNvSpPr>
+          <p:nvPr>
+            <p:ph type="title"/>
+          </p:nvPr>
+        </p:nvSpPr>
+        <p:spPr/>
+        <p:txBody>
+          <a:bodyPr/>
+          <a:lstStyle/>
+          <a:p>
+            <a:r>
+              <a:rPr lang="en-US" dirty="0"/>
+              <a:t>Representation of input firing rate</a:t>
+            </a:r>
+          </a:p>
+        </p:txBody>
+      </p:sp>
+      <p:pic>
+        <p:nvPicPr>
+          <p:cNvPr id="5" name="Picture 4">
+            <a:extLst>
+              <a:ext uri="{FF2B5EF4-FFF2-40B4-BE49-F238E27FC236}">
+                <a16:creationId xmlns:a16="http://schemas.microsoft.com/office/drawing/2014/main" id="{2D784170-4FB7-4E50-B819-53B7BBAC8883}"/>
+              </a:ext>
+            </a:extLst>
+          </p:cNvPr>
+          <p:cNvPicPr>
+            <a:picLocks noChangeAspect="1"/>
+          </p:cNvPicPr>
+          <p:nvPr/>
+        </p:nvPicPr>
+        <p:blipFill>
+          <a:blip r:embed="rId2">
+            <a:extLst>
+              <a:ext uri="{28A0092B-C50C-407E-A947-70E740481C1C}">
+                <a14:useLocalDpi xmlns:a14="http://schemas.microsoft.com/office/drawing/2010/main" val="0"/>
+              </a:ext>
+            </a:extLst>
+          </a:blip>
+          <a:stretch>
+            <a:fillRect/>
+          </a:stretch>
+        </p:blipFill>
+        <p:spPr>
+          <a:xfrm>
+            <a:off x="2457443" y="1551977"/>
+            <a:ext cx="6373291" cy="3879395"/>
+          </a:xfrm>
+          <a:prstGeom prst="rect">
+            <a:avLst/>
+          </a:prstGeom>
+        </p:spPr>
+      </p:pic>
+      <p:sp>
+        <p:nvSpPr>
+          <p:cNvPr id="6" name="TextBox 5">
+            <a:extLst>
+              <a:ext uri="{FF2B5EF4-FFF2-40B4-BE49-F238E27FC236}">
+                <a16:creationId xmlns:a16="http://schemas.microsoft.com/office/drawing/2014/main" id="{85E261B1-2A6F-4215-9980-66C7397BCD9E}"/>
+              </a:ext>
+            </a:extLst>
+          </p:cNvPr>
+          <p:cNvSpPr txBox="1"/>
+          <p:nvPr/>
+        </p:nvSpPr>
+        <p:spPr>
+          <a:xfrm>
+            <a:off x="8398934" y="2912533"/>
+            <a:ext cx="3056734" cy="369332"/>
+          </a:xfrm>
+          <a:prstGeom prst="rect">
+            <a:avLst/>
+          </a:prstGeom>
+          <a:noFill/>
+        </p:spPr>
+        <p:txBody>
+          <a:bodyPr wrap="none" rtlCol="0">
+            <a:spAutoFit/>
+          </a:bodyPr>
+          <a:lstStyle/>
+          <a:p>
+            <a:r>
+              <a:rPr lang="en-US" dirty="0"/>
+              <a:t>Error bars 1 std, 10 trials/point</a:t>
+            </a:r>
+          </a:p>
+        </p:txBody>
+      </p:sp>
+      <p:sp>
+        <p:nvSpPr>
+          <p:cNvPr id="7" name="TextBox 6">
+            <a:extLst>
+              <a:ext uri="{FF2B5EF4-FFF2-40B4-BE49-F238E27FC236}">
+                <a16:creationId xmlns:a16="http://schemas.microsoft.com/office/drawing/2014/main" id="{093A04D6-8ED9-454A-99EF-BC14BAF97886}"/>
+              </a:ext>
+            </a:extLst>
+          </p:cNvPr>
+          <p:cNvSpPr txBox="1"/>
+          <p:nvPr/>
+        </p:nvSpPr>
+        <p:spPr>
+          <a:xfrm>
+            <a:off x="711201" y="5602561"/>
+            <a:ext cx="11023600" cy="1015663"/>
+          </a:xfrm>
+          <a:prstGeom prst="rect">
+            <a:avLst/>
+          </a:prstGeom>
+          <a:noFill/>
+        </p:spPr>
+        <p:txBody>
+          <a:bodyPr wrap="square" rtlCol="0">
+            <a:spAutoFit/>
+          </a:bodyPr>
+          <a:lstStyle/>
+          <a:p>
+            <a:r>
+              <a:rPr lang="en-US" sz="2000" dirty="0"/>
+              <a:t>The # of traveling waves/second encodes the input population firing rate. The one large column shows an activation function similar to the population activation function in </a:t>
+            </a:r>
+            <a:r>
+              <a:rPr lang="en-US" sz="2000" dirty="0" err="1"/>
+              <a:t>Trappenberg</a:t>
+            </a:r>
+            <a:r>
+              <a:rPr lang="en-US" sz="2000" dirty="0"/>
+              <a:t> section 3.4. The 4-column SCE shows a more linear activation function, but with more variation.</a:t>
+            </a:r>
+          </a:p>
+        </p:txBody>
+      </p:sp>
+    </p:spTree>
+    <p:extLst>
+      <p:ext uri="{BB962C8B-B14F-4D97-AF65-F5344CB8AC3E}">
+        <p14:creationId xmlns:p14="http://schemas.microsoft.com/office/powerpoint/2010/main" val="2457268577"/>
+      </p:ext>
+    </p:extLst>
+  </p:cSld>
+  <p:clrMapOvr>
+    <a:masterClrMapping/>
+  </p:clrMapOvr>
+</p:sld>
+</file>
+
 <file path=ppt/slides/slide2.xml><?xml version="1.0" encoding="utf-8"?>
 <p:sld xmlns:a="http://schemas.openxmlformats.org/drawingml/2006/main" xmlns:r="http://schemas.openxmlformats.org/officeDocument/2006/relationships" xmlns:p="http://schemas.openxmlformats.org/presentationml/2006/main">
   <p:cSld>
@@ -4992,63 +7223,10 @@
       </p:grpSpPr>
       <p:sp>
         <p:nvSpPr>
-          <p:cNvPr id="30" name="Oval 29">
-            <a:extLst>
-              <a:ext uri="{FF2B5EF4-FFF2-40B4-BE49-F238E27FC236}">
-                <a16:creationId xmlns:a16="http://schemas.microsoft.com/office/drawing/2014/main" id="{D8C1E074-19B0-4BA4-83E5-3E77DC29EAF8}"/>
-              </a:ext>
-            </a:extLst>
-          </p:cNvPr>
-          <p:cNvSpPr/>
-          <p:nvPr/>
-        </p:nvSpPr>
-        <p:spPr>
-          <a:xfrm>
-            <a:off x="4876154" y="5509934"/>
-            <a:ext cx="1967869" cy="1089433"/>
-          </a:xfrm>
-          <a:prstGeom prst="ellipse">
-            <a:avLst/>
-          </a:prstGeom>
-          <a:noFill/>
-          <a:ln>
-            <a:solidFill>
-              <a:schemeClr val="tx1"/>
-            </a:solidFill>
-            <a:prstDash val="dash"/>
-          </a:ln>
-        </p:spPr>
-        <p:style>
-          <a:lnRef idx="2">
-            <a:schemeClr val="accent1">
-              <a:shade val="50000"/>
-            </a:schemeClr>
-          </a:lnRef>
-          <a:fillRef idx="1">
-            <a:schemeClr val="accent1"/>
-          </a:fillRef>
-          <a:effectRef idx="0">
-            <a:schemeClr val="accent1"/>
-          </a:effectRef>
-          <a:fontRef idx="minor">
-            <a:schemeClr val="lt1"/>
-          </a:fontRef>
-        </p:style>
-        <p:txBody>
-          <a:bodyPr rtlCol="0" anchor="ctr"/>
-          <a:lstStyle/>
-          <a:p>
-            <a:pPr algn="ctr"/>
-            <a:endParaRPr lang="en-US"/>
-          </a:p>
-        </p:txBody>
-      </p:sp>
-      <p:sp>
-        <p:nvSpPr>
           <p:cNvPr id="2" name="Title 1">
             <a:extLst>
               <a:ext uri="{FF2B5EF4-FFF2-40B4-BE49-F238E27FC236}">
-                <a16:creationId xmlns:a16="http://schemas.microsoft.com/office/drawing/2014/main" id="{76966D12-A105-4527-83E8-64F0055CAF93}"/>
+                <a16:creationId xmlns:a16="http://schemas.microsoft.com/office/drawing/2014/main" id="{4E236FAD-38C7-41BB-8E2B-40B2AFCE5AA7}"/>
               </a:ext>
             </a:extLst>
           </p:cNvPr>
@@ -5066,1134 +7244,63 @@
           <a:p>
             <a:r>
               <a:rPr lang="en-US" dirty="0"/>
-              <a:t>Experiment</a:t>
-            </a:r>
-          </a:p>
-        </p:txBody>
-      </p:sp>
-      <p:pic>
-        <p:nvPicPr>
-          <p:cNvPr id="5" name="Picture 4" descr="A picture containing map&#10;&#10;Description automatically generated">
-            <a:extLst>
-              <a:ext uri="{FF2B5EF4-FFF2-40B4-BE49-F238E27FC236}">
-                <a16:creationId xmlns:a16="http://schemas.microsoft.com/office/drawing/2014/main" id="{83469872-DE07-4C1D-955B-3374A66DD81E}"/>
-              </a:ext>
-            </a:extLst>
-          </p:cNvPr>
-          <p:cNvPicPr>
-            <a:picLocks noChangeAspect="1"/>
-          </p:cNvPicPr>
-          <p:nvPr/>
-        </p:nvPicPr>
-        <p:blipFill rotWithShape="1">
-          <a:blip r:embed="rId2">
-            <a:extLst>
-              <a:ext uri="{28A0092B-C50C-407E-A947-70E740481C1C}">
-                <a14:useLocalDpi xmlns:a14="http://schemas.microsoft.com/office/drawing/2010/main" val="0"/>
-              </a:ext>
-            </a:extLst>
-          </a:blip>
-          <a:srcRect t="12890" b="16722"/>
-          <a:stretch/>
-        </p:blipFill>
-        <p:spPr>
-          <a:xfrm>
-            <a:off x="4652145" y="1568595"/>
-            <a:ext cx="2355071" cy="3857854"/>
-          </a:xfrm>
-          <a:prstGeom prst="rect">
-            <a:avLst/>
-          </a:prstGeom>
-        </p:spPr>
-      </p:pic>
-      <p:cxnSp>
-        <p:nvCxnSpPr>
-          <p:cNvPr id="6" name="Connector: Curved 5">
-            <a:extLst>
-              <a:ext uri="{FF2B5EF4-FFF2-40B4-BE49-F238E27FC236}">
-                <a16:creationId xmlns:a16="http://schemas.microsoft.com/office/drawing/2014/main" id="{F3B82A6E-3854-4AF1-8C3F-190853E60483}"/>
-              </a:ext>
-            </a:extLst>
-          </p:cNvPr>
-          <p:cNvCxnSpPr>
-            <a:cxnSpLocks/>
-            <a:stCxn id="21" idx="0"/>
-          </p:cNvCxnSpPr>
-          <p:nvPr/>
-        </p:nvCxnSpPr>
-        <p:spPr>
-          <a:xfrm rot="5400000" flipH="1" flipV="1">
-            <a:off x="4116110" y="4335477"/>
-            <a:ext cx="646749" cy="1129884"/>
-          </a:xfrm>
-          <a:prstGeom prst="curvedConnector2">
-            <a:avLst/>
-          </a:prstGeom>
-          <a:ln>
-            <a:solidFill>
-              <a:schemeClr val="tx1"/>
-            </a:solidFill>
-            <a:tailEnd type="triangle"/>
-          </a:ln>
-        </p:spPr>
-        <p:style>
-          <a:lnRef idx="3">
-            <a:schemeClr val="accent6"/>
-          </a:lnRef>
-          <a:fillRef idx="0">
-            <a:schemeClr val="accent6"/>
-          </a:fillRef>
-          <a:effectRef idx="2">
-            <a:schemeClr val="accent6"/>
-          </a:effectRef>
-          <a:fontRef idx="minor">
-            <a:schemeClr val="tx1"/>
-          </a:fontRef>
-        </p:style>
-      </p:cxnSp>
-      <p:sp>
-        <p:nvSpPr>
-          <p:cNvPr id="7" name="TextBox 6">
-            <a:extLst>
-              <a:ext uri="{FF2B5EF4-FFF2-40B4-BE49-F238E27FC236}">
-                <a16:creationId xmlns:a16="http://schemas.microsoft.com/office/drawing/2014/main" id="{E7BCC743-562A-4D98-8F0B-F0C1F5548A0F}"/>
-              </a:ext>
-            </a:extLst>
-          </p:cNvPr>
-          <p:cNvSpPr txBox="1"/>
-          <p:nvPr/>
-        </p:nvSpPr>
-        <p:spPr>
-          <a:xfrm>
-            <a:off x="676265" y="6054651"/>
-            <a:ext cx="4538861" cy="646331"/>
-          </a:xfrm>
-          <a:prstGeom prst="rect">
-            <a:avLst/>
-          </a:prstGeom>
-          <a:noFill/>
-        </p:spPr>
-        <p:txBody>
-          <a:bodyPr wrap="square" rtlCol="0">
-            <a:spAutoFit/>
-          </a:bodyPr>
-          <a:lstStyle/>
-          <a:p>
-            <a:r>
-              <a:rPr lang="en-US" dirty="0">
-                <a:latin typeface="Arial" panose="020B0604020202020204" pitchFamily="34" charset="0"/>
-                <a:cs typeface="Arial" panose="020B0604020202020204" pitchFamily="34" charset="0"/>
-              </a:rPr>
-              <a:t>Population of neurons whose average firing rate we want to encode and transmit</a:t>
-            </a:r>
-          </a:p>
-        </p:txBody>
-      </p:sp>
-      <p:sp>
-        <p:nvSpPr>
-          <p:cNvPr id="8" name="Oval 7">
-            <a:extLst>
-              <a:ext uri="{FF2B5EF4-FFF2-40B4-BE49-F238E27FC236}">
-                <a16:creationId xmlns:a16="http://schemas.microsoft.com/office/drawing/2014/main" id="{5619D366-F32B-4044-9198-E43DF8592A5D}"/>
-              </a:ext>
-            </a:extLst>
-          </p:cNvPr>
-          <p:cNvSpPr/>
-          <p:nvPr/>
-        </p:nvSpPr>
-        <p:spPr>
-          <a:xfrm>
-            <a:off x="5069609" y="5928167"/>
-            <a:ext cx="197708" cy="205946"/>
-          </a:xfrm>
-          <a:prstGeom prst="ellipse">
-            <a:avLst/>
-          </a:prstGeom>
-        </p:spPr>
-        <p:style>
-          <a:lnRef idx="2">
-            <a:schemeClr val="accent1">
-              <a:shade val="50000"/>
-            </a:schemeClr>
-          </a:lnRef>
-          <a:fillRef idx="1">
-            <a:schemeClr val="accent1"/>
-          </a:fillRef>
-          <a:effectRef idx="0">
-            <a:schemeClr val="accent1"/>
-          </a:effectRef>
-          <a:fontRef idx="minor">
-            <a:schemeClr val="lt1"/>
-          </a:fontRef>
-        </p:style>
-        <p:txBody>
-          <a:bodyPr rtlCol="0" anchor="ctr"/>
-          <a:lstStyle/>
-          <a:p>
-            <a:pPr algn="ctr"/>
-            <a:endParaRPr lang="en-US"/>
-          </a:p>
-        </p:txBody>
-      </p:sp>
-      <p:sp>
-        <p:nvSpPr>
-          <p:cNvPr id="9" name="Oval 8">
-            <a:extLst>
-              <a:ext uri="{FF2B5EF4-FFF2-40B4-BE49-F238E27FC236}">
-                <a16:creationId xmlns:a16="http://schemas.microsoft.com/office/drawing/2014/main" id="{C94162A4-2C9F-42EE-A02D-318995C45E48}"/>
-              </a:ext>
-            </a:extLst>
-          </p:cNvPr>
-          <p:cNvSpPr/>
-          <p:nvPr/>
-        </p:nvSpPr>
-        <p:spPr>
-          <a:xfrm>
-            <a:off x="5858829" y="5958766"/>
-            <a:ext cx="197708" cy="205946"/>
-          </a:xfrm>
-          <a:prstGeom prst="ellipse">
-            <a:avLst/>
-          </a:prstGeom>
-        </p:spPr>
-        <p:style>
-          <a:lnRef idx="2">
-            <a:schemeClr val="accent1">
-              <a:shade val="50000"/>
-            </a:schemeClr>
-          </a:lnRef>
-          <a:fillRef idx="1">
-            <a:schemeClr val="accent1"/>
-          </a:fillRef>
-          <a:effectRef idx="0">
-            <a:schemeClr val="accent1"/>
-          </a:effectRef>
-          <a:fontRef idx="minor">
-            <a:schemeClr val="lt1"/>
-          </a:fontRef>
-        </p:style>
-        <p:txBody>
-          <a:bodyPr rtlCol="0" anchor="ctr"/>
-          <a:lstStyle/>
-          <a:p>
-            <a:pPr algn="ctr"/>
-            <a:endParaRPr lang="en-US"/>
-          </a:p>
-        </p:txBody>
-      </p:sp>
-      <p:sp>
-        <p:nvSpPr>
-          <p:cNvPr id="10" name="Oval 9">
-            <a:extLst>
-              <a:ext uri="{FF2B5EF4-FFF2-40B4-BE49-F238E27FC236}">
-                <a16:creationId xmlns:a16="http://schemas.microsoft.com/office/drawing/2014/main" id="{F1DAE79C-DCE5-4762-9064-3C79B0E43BB7}"/>
-              </a:ext>
-            </a:extLst>
-          </p:cNvPr>
-          <p:cNvSpPr/>
-          <p:nvPr/>
-        </p:nvSpPr>
-        <p:spPr>
-          <a:xfrm>
-            <a:off x="5420767" y="6255409"/>
-            <a:ext cx="197708" cy="205946"/>
-          </a:xfrm>
-          <a:prstGeom prst="ellipse">
-            <a:avLst/>
-          </a:prstGeom>
-        </p:spPr>
-        <p:style>
-          <a:lnRef idx="2">
-            <a:schemeClr val="accent1">
-              <a:shade val="50000"/>
-            </a:schemeClr>
-          </a:lnRef>
-          <a:fillRef idx="1">
-            <a:schemeClr val="accent1"/>
-          </a:fillRef>
-          <a:effectRef idx="0">
-            <a:schemeClr val="accent1"/>
-          </a:effectRef>
-          <a:fontRef idx="minor">
-            <a:schemeClr val="lt1"/>
-          </a:fontRef>
-        </p:style>
-        <p:txBody>
-          <a:bodyPr rtlCol="0" anchor="ctr"/>
-          <a:lstStyle/>
-          <a:p>
-            <a:pPr algn="ctr"/>
-            <a:endParaRPr lang="en-US"/>
-          </a:p>
-        </p:txBody>
-      </p:sp>
-      <p:sp>
-        <p:nvSpPr>
-          <p:cNvPr id="11" name="Oval 10">
-            <a:extLst>
-              <a:ext uri="{FF2B5EF4-FFF2-40B4-BE49-F238E27FC236}">
-                <a16:creationId xmlns:a16="http://schemas.microsoft.com/office/drawing/2014/main" id="{FC495984-5100-47C3-96B0-8BF29592A95D}"/>
-              </a:ext>
-            </a:extLst>
-          </p:cNvPr>
-          <p:cNvSpPr/>
-          <p:nvPr/>
-        </p:nvSpPr>
-        <p:spPr>
-          <a:xfrm>
-            <a:off x="6330579" y="6134113"/>
-            <a:ext cx="197708" cy="205946"/>
-          </a:xfrm>
-          <a:prstGeom prst="ellipse">
-            <a:avLst/>
-          </a:prstGeom>
-        </p:spPr>
-        <p:style>
-          <a:lnRef idx="2">
-            <a:schemeClr val="accent1">
-              <a:shade val="50000"/>
-            </a:schemeClr>
-          </a:lnRef>
-          <a:fillRef idx="1">
-            <a:schemeClr val="accent1"/>
-          </a:fillRef>
-          <a:effectRef idx="0">
-            <a:schemeClr val="accent1"/>
-          </a:effectRef>
-          <a:fontRef idx="minor">
-            <a:schemeClr val="lt1"/>
-          </a:fontRef>
-        </p:style>
-        <p:txBody>
-          <a:bodyPr rtlCol="0" anchor="ctr"/>
-          <a:lstStyle/>
-          <a:p>
-            <a:pPr algn="ctr"/>
-            <a:endParaRPr lang="en-US"/>
-          </a:p>
-        </p:txBody>
-      </p:sp>
-      <p:cxnSp>
-        <p:nvCxnSpPr>
-          <p:cNvPr id="12" name="Straight Arrow Connector 11">
-            <a:extLst>
-              <a:ext uri="{FF2B5EF4-FFF2-40B4-BE49-F238E27FC236}">
-                <a16:creationId xmlns:a16="http://schemas.microsoft.com/office/drawing/2014/main" id="{370678BA-4A76-491B-ADE2-74E2D158D768}"/>
-              </a:ext>
-            </a:extLst>
-          </p:cNvPr>
-          <p:cNvCxnSpPr>
-            <a:cxnSpLocks/>
-            <a:stCxn id="9" idx="0"/>
-          </p:cNvCxnSpPr>
-          <p:nvPr/>
-        </p:nvCxnSpPr>
-        <p:spPr>
-          <a:xfrm flipV="1">
-            <a:off x="5957683" y="4709220"/>
-            <a:ext cx="247394" cy="1249546"/>
-          </a:xfrm>
-          <a:prstGeom prst="straightConnector1">
-            <a:avLst/>
-          </a:prstGeom>
-          <a:ln>
-            <a:solidFill>
-              <a:schemeClr val="tx1"/>
-            </a:solidFill>
-            <a:tailEnd type="triangle"/>
-          </a:ln>
-        </p:spPr>
-        <p:style>
-          <a:lnRef idx="1">
-            <a:schemeClr val="accent1"/>
-          </a:lnRef>
-          <a:fillRef idx="0">
-            <a:schemeClr val="accent1"/>
-          </a:fillRef>
-          <a:effectRef idx="0">
-            <a:schemeClr val="accent1"/>
-          </a:effectRef>
-          <a:fontRef idx="minor">
-            <a:schemeClr val="tx1"/>
-          </a:fontRef>
-        </p:style>
-      </p:cxnSp>
-      <p:cxnSp>
-        <p:nvCxnSpPr>
-          <p:cNvPr id="13" name="Straight Arrow Connector 12">
-            <a:extLst>
-              <a:ext uri="{FF2B5EF4-FFF2-40B4-BE49-F238E27FC236}">
-                <a16:creationId xmlns:a16="http://schemas.microsoft.com/office/drawing/2014/main" id="{ED06CC8E-5CF1-47BB-A32D-5F0763F3A01A}"/>
-              </a:ext>
-            </a:extLst>
-          </p:cNvPr>
-          <p:cNvCxnSpPr>
-            <a:cxnSpLocks/>
-            <a:stCxn id="10" idx="0"/>
-          </p:cNvCxnSpPr>
-          <p:nvPr/>
-        </p:nvCxnSpPr>
-        <p:spPr>
-          <a:xfrm flipV="1">
-            <a:off x="5519621" y="4682411"/>
-            <a:ext cx="719039" cy="1572998"/>
-          </a:xfrm>
-          <a:prstGeom prst="straightConnector1">
-            <a:avLst/>
-          </a:prstGeom>
-          <a:ln>
-            <a:solidFill>
-              <a:schemeClr val="tx1"/>
-            </a:solidFill>
-            <a:tailEnd type="triangle"/>
-          </a:ln>
-        </p:spPr>
-        <p:style>
-          <a:lnRef idx="1">
-            <a:schemeClr val="accent1"/>
-          </a:lnRef>
-          <a:fillRef idx="0">
-            <a:schemeClr val="accent1"/>
-          </a:fillRef>
-          <a:effectRef idx="0">
-            <a:schemeClr val="accent1"/>
-          </a:effectRef>
-          <a:fontRef idx="minor">
-            <a:schemeClr val="tx1"/>
-          </a:fontRef>
-        </p:style>
-      </p:cxnSp>
-      <p:cxnSp>
-        <p:nvCxnSpPr>
-          <p:cNvPr id="14" name="Straight Arrow Connector 13">
-            <a:extLst>
-              <a:ext uri="{FF2B5EF4-FFF2-40B4-BE49-F238E27FC236}">
-                <a16:creationId xmlns:a16="http://schemas.microsoft.com/office/drawing/2014/main" id="{BE857334-4DEB-4C7D-A26B-CD79182666BD}"/>
-              </a:ext>
-            </a:extLst>
-          </p:cNvPr>
-          <p:cNvCxnSpPr>
-            <a:cxnSpLocks/>
-            <a:stCxn id="8" idx="0"/>
-          </p:cNvCxnSpPr>
-          <p:nvPr/>
-        </p:nvCxnSpPr>
-        <p:spPr>
-          <a:xfrm flipV="1">
-            <a:off x="5168463" y="4350015"/>
-            <a:ext cx="98854" cy="1578152"/>
-          </a:xfrm>
-          <a:prstGeom prst="straightConnector1">
-            <a:avLst/>
-          </a:prstGeom>
-          <a:ln>
-            <a:solidFill>
-              <a:schemeClr val="tx1"/>
-            </a:solidFill>
-            <a:tailEnd type="triangle"/>
-          </a:ln>
-        </p:spPr>
-        <p:style>
-          <a:lnRef idx="1">
-            <a:schemeClr val="accent1"/>
-          </a:lnRef>
-          <a:fillRef idx="0">
-            <a:schemeClr val="accent1"/>
-          </a:fillRef>
-          <a:effectRef idx="0">
-            <a:schemeClr val="accent1"/>
-          </a:effectRef>
-          <a:fontRef idx="minor">
-            <a:schemeClr val="tx1"/>
-          </a:fontRef>
-        </p:style>
-      </p:cxnSp>
-      <p:cxnSp>
-        <p:nvCxnSpPr>
-          <p:cNvPr id="15" name="Straight Arrow Connector 14">
-            <a:extLst>
-              <a:ext uri="{FF2B5EF4-FFF2-40B4-BE49-F238E27FC236}">
-                <a16:creationId xmlns:a16="http://schemas.microsoft.com/office/drawing/2014/main" id="{E267DCEF-6217-4E1C-9ECB-57595E0BE8F2}"/>
-              </a:ext>
-            </a:extLst>
-          </p:cNvPr>
-          <p:cNvCxnSpPr>
-            <a:cxnSpLocks/>
-            <a:stCxn id="11" idx="0"/>
-          </p:cNvCxnSpPr>
-          <p:nvPr/>
-        </p:nvCxnSpPr>
-        <p:spPr>
-          <a:xfrm flipH="1" flipV="1">
-            <a:off x="6194458" y="4682411"/>
-            <a:ext cx="234975" cy="1451702"/>
-          </a:xfrm>
-          <a:prstGeom prst="straightConnector1">
-            <a:avLst/>
-          </a:prstGeom>
-          <a:ln>
-            <a:solidFill>
-              <a:schemeClr val="tx1"/>
-            </a:solidFill>
-            <a:tailEnd type="triangle"/>
-          </a:ln>
-        </p:spPr>
-        <p:style>
-          <a:lnRef idx="1">
-            <a:schemeClr val="accent1"/>
-          </a:lnRef>
-          <a:fillRef idx="0">
-            <a:schemeClr val="accent1"/>
-          </a:fillRef>
-          <a:effectRef idx="0">
-            <a:schemeClr val="accent1"/>
-          </a:effectRef>
-          <a:fontRef idx="minor">
-            <a:schemeClr val="tx1"/>
-          </a:fontRef>
-        </p:style>
-      </p:cxnSp>
-      <p:cxnSp>
-        <p:nvCxnSpPr>
-          <p:cNvPr id="16" name="Straight Arrow Connector 15">
-            <a:extLst>
-              <a:ext uri="{FF2B5EF4-FFF2-40B4-BE49-F238E27FC236}">
-                <a16:creationId xmlns:a16="http://schemas.microsoft.com/office/drawing/2014/main" id="{FDE4F8BF-B450-41A4-9819-EE863C2B8B65}"/>
-              </a:ext>
-            </a:extLst>
-          </p:cNvPr>
-          <p:cNvCxnSpPr>
-            <a:cxnSpLocks/>
-            <a:stCxn id="10" idx="0"/>
-          </p:cNvCxnSpPr>
-          <p:nvPr/>
-        </p:nvCxnSpPr>
-        <p:spPr>
-          <a:xfrm flipV="1">
-            <a:off x="5519621" y="5078471"/>
-            <a:ext cx="164020" cy="1176938"/>
-          </a:xfrm>
-          <a:prstGeom prst="straightConnector1">
-            <a:avLst/>
-          </a:prstGeom>
-          <a:ln>
-            <a:solidFill>
-              <a:schemeClr val="tx1"/>
-            </a:solidFill>
-            <a:tailEnd type="triangle"/>
-          </a:ln>
-        </p:spPr>
-        <p:style>
-          <a:lnRef idx="1">
-            <a:schemeClr val="accent1"/>
-          </a:lnRef>
-          <a:fillRef idx="0">
-            <a:schemeClr val="accent1"/>
-          </a:fillRef>
-          <a:effectRef idx="0">
-            <a:schemeClr val="accent1"/>
-          </a:effectRef>
-          <a:fontRef idx="minor">
-            <a:schemeClr val="tx1"/>
-          </a:fontRef>
-        </p:style>
-      </p:cxnSp>
-      <p:cxnSp>
-        <p:nvCxnSpPr>
-          <p:cNvPr id="17" name="Straight Arrow Connector 16">
-            <a:extLst>
-              <a:ext uri="{FF2B5EF4-FFF2-40B4-BE49-F238E27FC236}">
-                <a16:creationId xmlns:a16="http://schemas.microsoft.com/office/drawing/2014/main" id="{81433BF7-D966-49D1-84B8-43BB7C281D71}"/>
-              </a:ext>
-            </a:extLst>
-          </p:cNvPr>
-          <p:cNvCxnSpPr>
-            <a:cxnSpLocks/>
-            <a:stCxn id="9" idx="0"/>
-          </p:cNvCxnSpPr>
-          <p:nvPr/>
-        </p:nvCxnSpPr>
-        <p:spPr>
-          <a:xfrm flipH="1" flipV="1">
-            <a:off x="5710289" y="5116134"/>
-            <a:ext cx="247394" cy="842632"/>
-          </a:xfrm>
-          <a:prstGeom prst="straightConnector1">
-            <a:avLst/>
-          </a:prstGeom>
-          <a:ln>
-            <a:solidFill>
-              <a:schemeClr val="tx1"/>
-            </a:solidFill>
-            <a:tailEnd type="triangle"/>
-          </a:ln>
-        </p:spPr>
-        <p:style>
-          <a:lnRef idx="1">
-            <a:schemeClr val="accent1"/>
-          </a:lnRef>
-          <a:fillRef idx="0">
-            <a:schemeClr val="accent1"/>
-          </a:fillRef>
-          <a:effectRef idx="0">
-            <a:schemeClr val="accent1"/>
-          </a:effectRef>
-          <a:fontRef idx="minor">
-            <a:schemeClr val="tx1"/>
-          </a:fontRef>
-        </p:style>
-      </p:cxnSp>
-      <p:cxnSp>
-        <p:nvCxnSpPr>
-          <p:cNvPr id="18" name="Straight Arrow Connector 17">
-            <a:extLst>
-              <a:ext uri="{FF2B5EF4-FFF2-40B4-BE49-F238E27FC236}">
-                <a16:creationId xmlns:a16="http://schemas.microsoft.com/office/drawing/2014/main" id="{72F79803-47CA-4697-977E-4CA25A46D866}"/>
-              </a:ext>
-            </a:extLst>
-          </p:cNvPr>
-          <p:cNvCxnSpPr>
-            <a:cxnSpLocks/>
-            <a:stCxn id="11" idx="0"/>
-          </p:cNvCxnSpPr>
-          <p:nvPr/>
-        </p:nvCxnSpPr>
-        <p:spPr>
-          <a:xfrm flipV="1">
-            <a:off x="6429433" y="4656990"/>
-            <a:ext cx="339208" cy="1477123"/>
-          </a:xfrm>
-          <a:prstGeom prst="straightConnector1">
-            <a:avLst/>
-          </a:prstGeom>
-          <a:ln>
-            <a:solidFill>
-              <a:schemeClr val="tx1"/>
-            </a:solidFill>
-            <a:tailEnd type="triangle"/>
-          </a:ln>
-        </p:spPr>
-        <p:style>
-          <a:lnRef idx="1">
-            <a:schemeClr val="accent1"/>
-          </a:lnRef>
-          <a:fillRef idx="0">
-            <a:schemeClr val="accent1"/>
-          </a:fillRef>
-          <a:effectRef idx="0">
-            <a:schemeClr val="accent1"/>
-          </a:effectRef>
-          <a:fontRef idx="minor">
-            <a:schemeClr val="tx1"/>
-          </a:fontRef>
-        </p:style>
-      </p:cxnSp>
-      <p:sp>
-        <p:nvSpPr>
-          <p:cNvPr id="19" name="Oval 18">
-            <a:extLst>
-              <a:ext uri="{FF2B5EF4-FFF2-40B4-BE49-F238E27FC236}">
-                <a16:creationId xmlns:a16="http://schemas.microsoft.com/office/drawing/2014/main" id="{2AA3CAF3-0EF3-4755-957D-40266EDD95CA}"/>
-              </a:ext>
-            </a:extLst>
-          </p:cNvPr>
-          <p:cNvSpPr/>
-          <p:nvPr/>
-        </p:nvSpPr>
-        <p:spPr>
-          <a:xfrm>
-            <a:off x="4876154" y="3022583"/>
-            <a:ext cx="1920861" cy="2161193"/>
-          </a:xfrm>
-          <a:prstGeom prst="ellipse">
-            <a:avLst/>
-          </a:prstGeom>
-          <a:solidFill>
-            <a:srgbClr val="00B050">
-              <a:alpha val="24000"/>
-            </a:srgbClr>
-          </a:solidFill>
-          <a:ln>
-            <a:noFill/>
-          </a:ln>
-        </p:spPr>
-        <p:style>
-          <a:lnRef idx="2">
-            <a:schemeClr val="accent1">
-              <a:shade val="50000"/>
-            </a:schemeClr>
-          </a:lnRef>
-          <a:fillRef idx="1">
-            <a:schemeClr val="accent1"/>
-          </a:fillRef>
-          <a:effectRef idx="0">
-            <a:schemeClr val="accent1"/>
-          </a:effectRef>
-          <a:fontRef idx="minor">
-            <a:schemeClr val="lt1"/>
-          </a:fontRef>
-        </p:style>
-        <p:txBody>
-          <a:bodyPr rtlCol="0" anchor="ctr"/>
-          <a:lstStyle/>
-          <a:p>
-            <a:pPr algn="ctr"/>
-            <a:endParaRPr lang="en-US"/>
-          </a:p>
-        </p:txBody>
-      </p:sp>
-      <p:sp>
-        <p:nvSpPr>
-          <p:cNvPr id="20" name="Oval 19">
-            <a:extLst>
-              <a:ext uri="{FF2B5EF4-FFF2-40B4-BE49-F238E27FC236}">
-                <a16:creationId xmlns:a16="http://schemas.microsoft.com/office/drawing/2014/main" id="{6C6A6F9A-8A23-48C6-90D5-3EB8E39BF97A}"/>
-              </a:ext>
-            </a:extLst>
-          </p:cNvPr>
-          <p:cNvSpPr/>
-          <p:nvPr/>
-        </p:nvSpPr>
-        <p:spPr>
-          <a:xfrm>
-            <a:off x="4876154" y="2054884"/>
-            <a:ext cx="1967869" cy="1777442"/>
-          </a:xfrm>
-          <a:prstGeom prst="ellipse">
-            <a:avLst/>
-          </a:prstGeom>
-          <a:solidFill>
-            <a:srgbClr val="FFFF00">
-              <a:alpha val="24000"/>
-            </a:srgbClr>
-          </a:solidFill>
-          <a:ln>
-            <a:noFill/>
-          </a:ln>
-        </p:spPr>
-        <p:style>
-          <a:lnRef idx="2">
-            <a:schemeClr val="accent1">
-              <a:shade val="50000"/>
-            </a:schemeClr>
-          </a:lnRef>
-          <a:fillRef idx="1">
-            <a:schemeClr val="accent1"/>
-          </a:fillRef>
-          <a:effectRef idx="0">
-            <a:schemeClr val="accent1"/>
-          </a:effectRef>
-          <a:fontRef idx="minor">
-            <a:schemeClr val="lt1"/>
-          </a:fontRef>
-        </p:style>
-        <p:txBody>
-          <a:bodyPr rtlCol="0" anchor="ctr"/>
-          <a:lstStyle/>
-          <a:p>
-            <a:pPr algn="ctr"/>
-            <a:endParaRPr lang="en-US"/>
-          </a:p>
-        </p:txBody>
-      </p:sp>
-      <p:sp>
-        <p:nvSpPr>
-          <p:cNvPr id="21" name="TextBox 20">
-            <a:extLst>
-              <a:ext uri="{FF2B5EF4-FFF2-40B4-BE49-F238E27FC236}">
-                <a16:creationId xmlns:a16="http://schemas.microsoft.com/office/drawing/2014/main" id="{DB3AA3CB-0234-4ACE-B928-4C8B42DD4559}"/>
-              </a:ext>
-            </a:extLst>
-          </p:cNvPr>
-          <p:cNvSpPr txBox="1"/>
-          <p:nvPr/>
-        </p:nvSpPr>
-        <p:spPr>
-          <a:xfrm>
-            <a:off x="3023593" y="5223793"/>
-            <a:ext cx="1701898" cy="461665"/>
-          </a:xfrm>
-          <a:prstGeom prst="rect">
-            <a:avLst/>
-          </a:prstGeom>
-          <a:noFill/>
-        </p:spPr>
-        <p:txBody>
-          <a:bodyPr wrap="square" rtlCol="0">
-            <a:spAutoFit/>
-          </a:bodyPr>
-          <a:lstStyle/>
-          <a:p>
-            <a:r>
-              <a:rPr lang="en-US" sz="1200" dirty="0">
-                <a:latin typeface="Arial" panose="020B0604020202020204" pitchFamily="34" charset="0"/>
-                <a:cs typeface="Arial" panose="020B0604020202020204" pitchFamily="34" charset="0"/>
-              </a:rPr>
-              <a:t>Input to base layer of SCE</a:t>
-            </a:r>
-          </a:p>
-        </p:txBody>
-      </p:sp>
-      <p:sp>
-        <p:nvSpPr>
-          <p:cNvPr id="22" name="TextBox 21">
-            <a:extLst>
-              <a:ext uri="{FF2B5EF4-FFF2-40B4-BE49-F238E27FC236}">
-                <a16:creationId xmlns:a16="http://schemas.microsoft.com/office/drawing/2014/main" id="{70C626B9-3D88-43A8-8752-783C2939249E}"/>
-              </a:ext>
-            </a:extLst>
-          </p:cNvPr>
-          <p:cNvSpPr txBox="1"/>
-          <p:nvPr/>
-        </p:nvSpPr>
-        <p:spPr>
-          <a:xfrm>
-            <a:off x="2446867" y="3542223"/>
-            <a:ext cx="1968503" cy="461665"/>
-          </a:xfrm>
-          <a:prstGeom prst="rect">
-            <a:avLst/>
-          </a:prstGeom>
-          <a:noFill/>
-        </p:spPr>
-        <p:txBody>
-          <a:bodyPr wrap="square" rtlCol="0">
-            <a:spAutoFit/>
-          </a:bodyPr>
-          <a:lstStyle/>
-          <a:p>
-            <a:r>
-              <a:rPr lang="en-US" sz="1200" dirty="0">
-                <a:latin typeface="Arial" panose="020B0604020202020204" pitchFamily="34" charset="0"/>
-                <a:cs typeface="Arial" panose="020B0604020202020204" pitchFamily="34" charset="0"/>
-              </a:rPr>
-              <a:t>SCE, various topologies possible</a:t>
-            </a:r>
-          </a:p>
-        </p:txBody>
-      </p:sp>
-      <p:cxnSp>
-        <p:nvCxnSpPr>
-          <p:cNvPr id="23" name="Connector: Curved 22">
-            <a:extLst>
-              <a:ext uri="{FF2B5EF4-FFF2-40B4-BE49-F238E27FC236}">
-                <a16:creationId xmlns:a16="http://schemas.microsoft.com/office/drawing/2014/main" id="{A4C40669-5A11-48FD-8C5A-6DFCA295FDAB}"/>
-              </a:ext>
-            </a:extLst>
-          </p:cNvPr>
-          <p:cNvCxnSpPr>
-            <a:cxnSpLocks/>
-            <a:stCxn id="22" idx="3"/>
-          </p:cNvCxnSpPr>
-          <p:nvPr/>
-        </p:nvCxnSpPr>
-        <p:spPr>
-          <a:xfrm>
-            <a:off x="4415370" y="3773056"/>
-            <a:ext cx="1005397" cy="266804"/>
-          </a:xfrm>
-          <a:prstGeom prst="curvedConnector3">
-            <a:avLst>
-              <a:gd name="adj1" fmla="val 50000"/>
-            </a:avLst>
-          </a:prstGeom>
-          <a:ln>
-            <a:solidFill>
-              <a:schemeClr val="tx1"/>
-            </a:solidFill>
-            <a:tailEnd type="triangle"/>
-          </a:ln>
-        </p:spPr>
-        <p:style>
-          <a:lnRef idx="3">
-            <a:schemeClr val="accent6"/>
-          </a:lnRef>
-          <a:fillRef idx="0">
-            <a:schemeClr val="accent6"/>
-          </a:fillRef>
-          <a:effectRef idx="2">
-            <a:schemeClr val="accent6"/>
-          </a:effectRef>
-          <a:fontRef idx="minor">
-            <a:schemeClr val="tx1"/>
-          </a:fontRef>
-        </p:style>
-      </p:cxnSp>
-      <p:sp>
-        <p:nvSpPr>
-          <p:cNvPr id="24" name="TextBox 23">
-            <a:extLst>
-              <a:ext uri="{FF2B5EF4-FFF2-40B4-BE49-F238E27FC236}">
-                <a16:creationId xmlns:a16="http://schemas.microsoft.com/office/drawing/2014/main" id="{55DA10A9-A49A-407C-B7AE-3E1E03268261}"/>
-              </a:ext>
-            </a:extLst>
-          </p:cNvPr>
-          <p:cNvSpPr txBox="1"/>
-          <p:nvPr/>
-        </p:nvSpPr>
-        <p:spPr>
-          <a:xfrm>
-            <a:off x="2461409" y="2527889"/>
-            <a:ext cx="1818467" cy="461665"/>
-          </a:xfrm>
-          <a:prstGeom prst="rect">
-            <a:avLst/>
-          </a:prstGeom>
-          <a:noFill/>
-        </p:spPr>
-        <p:txBody>
-          <a:bodyPr wrap="square" rtlCol="0">
-            <a:spAutoFit/>
-          </a:bodyPr>
-          <a:lstStyle/>
-          <a:p>
-            <a:r>
-              <a:rPr lang="en-US" sz="1200" dirty="0">
-                <a:latin typeface="Arial" panose="020B0604020202020204" pitchFamily="34" charset="0"/>
-                <a:cs typeface="Arial" panose="020B0604020202020204" pitchFamily="34" charset="0"/>
-              </a:rPr>
-              <a:t>Output from top layer of SCE</a:t>
-            </a:r>
-          </a:p>
-        </p:txBody>
-      </p:sp>
-      <p:cxnSp>
-        <p:nvCxnSpPr>
-          <p:cNvPr id="25" name="Connector: Curved 24">
-            <a:extLst>
-              <a:ext uri="{FF2B5EF4-FFF2-40B4-BE49-F238E27FC236}">
-                <a16:creationId xmlns:a16="http://schemas.microsoft.com/office/drawing/2014/main" id="{A45983D8-D165-45D5-A4A1-AAFAC4E3F7E5}"/>
-              </a:ext>
-            </a:extLst>
-          </p:cNvPr>
-          <p:cNvCxnSpPr>
-            <a:cxnSpLocks/>
-            <a:stCxn id="24" idx="3"/>
-            <a:endCxn id="20" idx="2"/>
-          </p:cNvCxnSpPr>
-          <p:nvPr/>
-        </p:nvCxnSpPr>
-        <p:spPr>
-          <a:xfrm>
-            <a:off x="4279876" y="2758722"/>
-            <a:ext cx="596278" cy="184883"/>
-          </a:xfrm>
-          <a:prstGeom prst="curvedConnector3">
-            <a:avLst>
-              <a:gd name="adj1" fmla="val 50000"/>
-            </a:avLst>
-          </a:prstGeom>
-          <a:ln>
-            <a:solidFill>
-              <a:schemeClr val="tx1"/>
-            </a:solidFill>
-            <a:tailEnd type="triangle"/>
-          </a:ln>
-        </p:spPr>
-        <p:style>
-          <a:lnRef idx="3">
-            <a:schemeClr val="accent6"/>
-          </a:lnRef>
-          <a:fillRef idx="0">
-            <a:schemeClr val="accent6"/>
-          </a:fillRef>
-          <a:effectRef idx="2">
-            <a:schemeClr val="accent6"/>
-          </a:effectRef>
-          <a:fontRef idx="minor">
-            <a:schemeClr val="tx1"/>
-          </a:fontRef>
-        </p:style>
-      </p:cxnSp>
-      <p:pic>
-        <p:nvPicPr>
-          <p:cNvPr id="34" name="Picture 33">
-            <a:extLst>
-              <a:ext uri="{FF2B5EF4-FFF2-40B4-BE49-F238E27FC236}">
-                <a16:creationId xmlns:a16="http://schemas.microsoft.com/office/drawing/2014/main" id="{320A0DCC-0E3F-4547-9EE8-257DFF0EF03B}"/>
-              </a:ext>
-            </a:extLst>
-          </p:cNvPr>
-          <p:cNvPicPr>
-            <a:picLocks noChangeAspect="1"/>
-          </p:cNvPicPr>
-          <p:nvPr/>
-        </p:nvPicPr>
-        <p:blipFill rotWithShape="1">
-          <a:blip r:embed="rId3">
-            <a:extLst>
-              <a:ext uri="{28A0092B-C50C-407E-A947-70E740481C1C}">
-                <a14:useLocalDpi xmlns:a14="http://schemas.microsoft.com/office/drawing/2010/main" val="0"/>
-              </a:ext>
-            </a:extLst>
-          </a:blip>
-          <a:srcRect t="33512" b="38457"/>
-          <a:stretch/>
-        </p:blipFill>
-        <p:spPr>
-          <a:xfrm>
-            <a:off x="8136467" y="4380666"/>
-            <a:ext cx="3419904" cy="1922323"/>
-          </a:xfrm>
-          <a:prstGeom prst="rect">
-            <a:avLst/>
-          </a:prstGeom>
-        </p:spPr>
-      </p:pic>
-      <p:cxnSp>
-        <p:nvCxnSpPr>
-          <p:cNvPr id="37" name="Straight Arrow Connector 36">
-            <a:extLst>
-              <a:ext uri="{FF2B5EF4-FFF2-40B4-BE49-F238E27FC236}">
-                <a16:creationId xmlns:a16="http://schemas.microsoft.com/office/drawing/2014/main" id="{771F6EDA-07A6-4E91-A633-FF6B48DEFA56}"/>
-              </a:ext>
-            </a:extLst>
-          </p:cNvPr>
-          <p:cNvCxnSpPr>
-            <a:cxnSpLocks/>
-            <a:stCxn id="30" idx="6"/>
-          </p:cNvCxnSpPr>
-          <p:nvPr/>
-        </p:nvCxnSpPr>
-        <p:spPr>
-          <a:xfrm flipV="1">
-            <a:off x="6844023" y="5464548"/>
-            <a:ext cx="1292444" cy="590103"/>
-          </a:xfrm>
-          <a:prstGeom prst="straightConnector1">
-            <a:avLst/>
-          </a:prstGeom>
-          <a:ln>
-            <a:tailEnd type="triangle"/>
-          </a:ln>
-        </p:spPr>
-        <p:style>
-          <a:lnRef idx="2">
-            <a:schemeClr val="dk1"/>
-          </a:lnRef>
-          <a:fillRef idx="0">
-            <a:schemeClr val="dk1"/>
-          </a:fillRef>
-          <a:effectRef idx="1">
-            <a:schemeClr val="dk1"/>
-          </a:effectRef>
-          <a:fontRef idx="minor">
-            <a:schemeClr val="tx1"/>
-          </a:fontRef>
-        </p:style>
-      </p:cxnSp>
-      <p:sp>
-        <p:nvSpPr>
-          <p:cNvPr id="45" name="TextBox 44">
-            <a:extLst>
-              <a:ext uri="{FF2B5EF4-FFF2-40B4-BE49-F238E27FC236}">
-                <a16:creationId xmlns:a16="http://schemas.microsoft.com/office/drawing/2014/main" id="{43BDF72F-4117-4702-867C-05D7A898754D}"/>
-              </a:ext>
-            </a:extLst>
-          </p:cNvPr>
-          <p:cNvSpPr txBox="1"/>
-          <p:nvPr/>
-        </p:nvSpPr>
-        <p:spPr>
-          <a:xfrm>
-            <a:off x="8136467" y="4033569"/>
-            <a:ext cx="3578176" cy="523220"/>
-          </a:xfrm>
-          <a:prstGeom prst="rect">
-            <a:avLst/>
-          </a:prstGeom>
-          <a:noFill/>
-        </p:spPr>
-        <p:txBody>
-          <a:bodyPr wrap="square" rtlCol="0">
-            <a:spAutoFit/>
-          </a:bodyPr>
-          <a:lstStyle/>
-          <a:p>
-            <a:r>
-              <a:rPr lang="en-US" sz="1400" dirty="0">
-                <a:latin typeface="Arial" panose="020B0604020202020204" pitchFamily="34" charset="0"/>
-                <a:cs typeface="Arial" panose="020B0604020202020204" pitchFamily="34" charset="0"/>
-              </a:rPr>
-              <a:t>Spike raster plot of a population of 50 neurons with a 10 Hz average firing rate.</a:t>
-            </a:r>
-          </a:p>
-        </p:txBody>
-      </p:sp>
-      <p:cxnSp>
-        <p:nvCxnSpPr>
-          <p:cNvPr id="41" name="Straight Arrow Connector 40">
-            <a:extLst>
-              <a:ext uri="{FF2B5EF4-FFF2-40B4-BE49-F238E27FC236}">
-                <a16:creationId xmlns:a16="http://schemas.microsoft.com/office/drawing/2014/main" id="{BD0BDD1A-F449-4E33-BF98-33898896CCB7}"/>
-              </a:ext>
-            </a:extLst>
-          </p:cNvPr>
-          <p:cNvCxnSpPr/>
-          <p:nvPr/>
-        </p:nvCxnSpPr>
-        <p:spPr>
-          <a:xfrm>
-            <a:off x="8779096" y="6284712"/>
-            <a:ext cx="2463800" cy="0"/>
-          </a:xfrm>
-          <a:prstGeom prst="straightConnector1">
-            <a:avLst/>
-          </a:prstGeom>
-          <a:ln>
-            <a:headEnd type="triangle"/>
-            <a:tailEnd type="triangle"/>
-          </a:ln>
-        </p:spPr>
-        <p:style>
-          <a:lnRef idx="1">
-            <a:schemeClr val="dk1"/>
-          </a:lnRef>
-          <a:fillRef idx="0">
-            <a:schemeClr val="dk1"/>
-          </a:fillRef>
-          <a:effectRef idx="0">
-            <a:schemeClr val="dk1"/>
-          </a:effectRef>
-          <a:fontRef idx="minor">
-            <a:schemeClr val="tx1"/>
-          </a:fontRef>
-        </p:style>
-      </p:cxnSp>
-      <p:sp>
-        <p:nvSpPr>
-          <p:cNvPr id="47" name="TextBox 46">
-            <a:extLst>
-              <a:ext uri="{FF2B5EF4-FFF2-40B4-BE49-F238E27FC236}">
-                <a16:creationId xmlns:a16="http://schemas.microsoft.com/office/drawing/2014/main" id="{CBD8AA63-FC3E-482D-B9C4-A900BFD1276D}"/>
-              </a:ext>
-            </a:extLst>
-          </p:cNvPr>
-          <p:cNvSpPr txBox="1"/>
-          <p:nvPr/>
-        </p:nvSpPr>
-        <p:spPr>
-          <a:xfrm>
-            <a:off x="9517704" y="6261944"/>
-            <a:ext cx="1254620" cy="307777"/>
-          </a:xfrm>
-          <a:prstGeom prst="rect">
-            <a:avLst/>
-          </a:prstGeom>
-          <a:noFill/>
-        </p:spPr>
-        <p:txBody>
-          <a:bodyPr wrap="square" rtlCol="0">
-            <a:spAutoFit/>
-          </a:bodyPr>
-          <a:lstStyle/>
-          <a:p>
-            <a:r>
-              <a:rPr lang="en-US" sz="1400" dirty="0">
-                <a:latin typeface="Arial" panose="020B0604020202020204" pitchFamily="34" charset="0"/>
-                <a:cs typeface="Arial" panose="020B0604020202020204" pitchFamily="34" charset="0"/>
-              </a:rPr>
-              <a:t>2 seconds</a:t>
+              <a:t>Reliable transport</a:t>
+            </a:r>
+          </a:p>
+        </p:txBody>
+      </p:sp>
+      <p:sp>
+        <p:nvSpPr>
+          <p:cNvPr id="3" name="Content Placeholder 2">
+            <a:extLst>
+              <a:ext uri="{FF2B5EF4-FFF2-40B4-BE49-F238E27FC236}">
+                <a16:creationId xmlns:a16="http://schemas.microsoft.com/office/drawing/2014/main" id="{1B85DC13-F965-402B-AB9F-ABD89E91CA7B}"/>
+              </a:ext>
+            </a:extLst>
+          </p:cNvPr>
+          <p:cNvSpPr>
+            <a:spLocks noGrp="1"/>
+          </p:cNvSpPr>
+          <p:nvPr>
+            <p:ph idx="1"/>
+          </p:nvPr>
+        </p:nvSpPr>
+        <p:spPr/>
+        <p:txBody>
+          <a:bodyPr/>
+          <a:lstStyle/>
+          <a:p>
+            <a:r>
+              <a:rPr lang="en-US" dirty="0"/>
+              <a:t>Single neurons are not reliable, therefore information cannot be encoded in the firing of a single neuron alone</a:t>
+            </a:r>
+          </a:p>
+          <a:p>
+            <a:pPr marL="0" indent="0">
+              <a:buNone/>
+            </a:pPr>
+            <a:endParaRPr lang="en-US" dirty="0"/>
+          </a:p>
+          <a:p>
+            <a:r>
+              <a:rPr lang="en-US" dirty="0"/>
+              <a:t>Similarly, a single SCE may be susceptible to neuron or connection damage, implying that a “population” of SCE may be required for reliable coding and transport of information</a:t>
+            </a:r>
+          </a:p>
+          <a:p>
+            <a:pPr marL="0" indent="0">
+              <a:buNone/>
+            </a:pPr>
+            <a:endParaRPr lang="en-US" dirty="0"/>
+          </a:p>
+          <a:p>
+            <a:r>
+              <a:rPr lang="en-US" dirty="0"/>
+              <a:t>We test the reliability of a single SCE by removing some neurons at random to simulate neuronal damage and find that </a:t>
+            </a:r>
+            <a:r>
+              <a:rPr lang="en-US" u="sng" dirty="0"/>
+              <a:t>removing 5% of the neurons can destroy the activation function</a:t>
             </a:r>
           </a:p>
         </p:txBody>
@@ -6201,7 +7308,7 @@
     </p:spTree>
     <p:extLst>
       <p:ext uri="{BB962C8B-B14F-4D97-AF65-F5344CB8AC3E}">
-        <p14:creationId xmlns:p14="http://schemas.microsoft.com/office/powerpoint/2010/main" val="1947425932"/>
+        <p14:creationId xmlns:p14="http://schemas.microsoft.com/office/powerpoint/2010/main" val="1170629376"/>
       </p:ext>
     </p:extLst>
   </p:cSld>
@@ -6233,7 +7340,7 @@
           <p:cNvPr id="2" name="Title 1">
             <a:extLst>
               <a:ext uri="{FF2B5EF4-FFF2-40B4-BE49-F238E27FC236}">
-                <a16:creationId xmlns:a16="http://schemas.microsoft.com/office/drawing/2014/main" id="{145C7521-8C47-48F0-A9DD-952E59F368B4}"/>
+                <a16:creationId xmlns:a16="http://schemas.microsoft.com/office/drawing/2014/main" id="{D47AAC3D-4A9F-4889-85D6-B14653576145}"/>
               </a:ext>
             </a:extLst>
           </p:cNvPr>
@@ -6251,17 +7358,17 @@
           <a:p>
             <a:r>
               <a:rPr lang="en-US" dirty="0"/>
-              <a:t>Two SCEs studied</a:t>
+              <a:t>Damage experiment – one SCE</a:t>
             </a:r>
           </a:p>
         </p:txBody>
       </p:sp>
       <p:pic>
         <p:nvPicPr>
-          <p:cNvPr id="4" name="Picture 3">
-            <a:extLst>
-              <a:ext uri="{FF2B5EF4-FFF2-40B4-BE49-F238E27FC236}">
-                <a16:creationId xmlns:a16="http://schemas.microsoft.com/office/drawing/2014/main" id="{B03554D5-D736-40A7-B727-B4ABA8B40ECE}"/>
+          <p:cNvPr id="4" name="Picture 3" descr="A picture containing text, scale&#10;&#10;Description automatically generated">
+            <a:extLst>
+              <a:ext uri="{FF2B5EF4-FFF2-40B4-BE49-F238E27FC236}">
+                <a16:creationId xmlns:a16="http://schemas.microsoft.com/office/drawing/2014/main" id="{BCBE6202-6105-4503-AE9B-49FCA1D45FFE}"/>
               </a:ext>
             </a:extLst>
           </p:cNvPr>
@@ -6284,56 +7391,20 @@
         </p:blipFill>
         <p:spPr>
           <a:xfrm>
-            <a:off x="2692399" y="1539875"/>
-            <a:ext cx="3714750" cy="4953000"/>
+            <a:off x="4677123" y="2228324"/>
+            <a:ext cx="6825267" cy="4070876"/>
           </a:xfrm>
           <a:prstGeom prst="rect">
             <a:avLst/>
           </a:prstGeom>
         </p:spPr>
       </p:pic>
-      <p:pic>
-        <p:nvPicPr>
-          <p:cNvPr id="6" name="Picture 5">
-            <a:extLst>
-              <a:ext uri="{FF2B5EF4-FFF2-40B4-BE49-F238E27FC236}">
-                <a16:creationId xmlns:a16="http://schemas.microsoft.com/office/drawing/2014/main" id="{EA713653-DAC0-4D34-A08D-A90D88A90714}"/>
-              </a:ext>
-            </a:extLst>
-          </p:cNvPr>
-          <p:cNvPicPr>
-            <a:picLocks noChangeAspect="1"/>
-          </p:cNvPicPr>
-          <p:nvPr/>
-        </p:nvPicPr>
-        <p:blipFill>
-          <a:blip r:embed="rId3">
-            <a:extLst>
-              <a:ext uri="{28A0092B-C50C-407E-A947-70E740481C1C}">
-                <a14:useLocalDpi xmlns:a14="http://schemas.microsoft.com/office/drawing/2010/main" val="0"/>
-              </a:ext>
-            </a:extLst>
-          </a:blip>
-          <a:stretch>
-            <a:fillRect/>
-          </a:stretch>
-        </p:blipFill>
-        <p:spPr>
-          <a:xfrm>
-            <a:off x="5765743" y="1598349"/>
-            <a:ext cx="3714750" cy="4953000"/>
-          </a:xfrm>
-          <a:prstGeom prst="rect">
-            <a:avLst/>
-          </a:prstGeom>
-        </p:spPr>
-      </p:pic>
-      <p:sp>
-        <p:nvSpPr>
-          <p:cNvPr id="7" name="TextBox 6">
-            <a:extLst>
-              <a:ext uri="{FF2B5EF4-FFF2-40B4-BE49-F238E27FC236}">
-                <a16:creationId xmlns:a16="http://schemas.microsoft.com/office/drawing/2014/main" id="{BA0E82F1-B9E6-4B02-8AA0-0AB88D1552BE}"/>
+      <p:sp>
+        <p:nvSpPr>
+          <p:cNvPr id="5" name="TextBox 4">
+            <a:extLst>
+              <a:ext uri="{FF2B5EF4-FFF2-40B4-BE49-F238E27FC236}">
+                <a16:creationId xmlns:a16="http://schemas.microsoft.com/office/drawing/2014/main" id="{349617EB-2A56-4A55-B3C4-952D0F43E8C9}"/>
               </a:ext>
             </a:extLst>
           </p:cNvPr>
@@ -6342,8 +7413,8 @@
         </p:nvSpPr>
         <p:spPr>
           <a:xfrm>
-            <a:off x="2301666" y="3429000"/>
-            <a:ext cx="912429" cy="369332"/>
+            <a:off x="372978" y="2512290"/>
+            <a:ext cx="4304145" cy="3693319"/>
           </a:xfrm>
           <a:prstGeom prst="rect">
             <a:avLst/>
@@ -6351,49 +7422,32 @@
           <a:noFill/>
         </p:spPr>
         <p:txBody>
-          <a:bodyPr wrap="none" rtlCol="0">
+          <a:bodyPr wrap="square" rtlCol="0">
             <a:spAutoFit/>
           </a:bodyPr>
           <a:lstStyle/>
           <a:p>
             <a:r>
               <a:rPr lang="en-US" dirty="0"/>
-              <a:t>4x4 SCE</a:t>
-            </a:r>
-          </a:p>
-        </p:txBody>
-      </p:sp>
-      <p:sp>
-        <p:nvSpPr>
-          <p:cNvPr id="8" name="TextBox 7">
-            <a:extLst>
-              <a:ext uri="{FF2B5EF4-FFF2-40B4-BE49-F238E27FC236}">
-                <a16:creationId xmlns:a16="http://schemas.microsoft.com/office/drawing/2014/main" id="{70FE62B0-27BE-43DF-9520-6F0FA2DB0B8C}"/>
-              </a:ext>
-            </a:extLst>
-          </p:cNvPr>
-          <p:cNvSpPr txBox="1"/>
-          <p:nvPr/>
-        </p:nvSpPr>
-        <p:spPr>
-          <a:xfrm>
-            <a:off x="9082616" y="3429000"/>
-            <a:ext cx="2949525" cy="369332"/>
-          </a:xfrm>
-          <a:prstGeom prst="rect">
-            <a:avLst/>
-          </a:prstGeom>
-          <a:noFill/>
-        </p:spPr>
-        <p:txBody>
-          <a:bodyPr wrap="none" rtlCol="0">
-            <a:spAutoFit/>
-          </a:bodyPr>
-          <a:lstStyle/>
+              <a:t>20 trials using the same starting SCE (2x2x10, 40 neurons total) and the same stimulus. Connection strength is 24, stimulus firing rate fixed at 21. </a:t>
+            </a:r>
+          </a:p>
+          <a:p>
+            <a:endParaRPr lang="en-US" dirty="0"/>
+          </a:p>
           <a:p>
             <a:r>
               <a:rPr lang="en-US" dirty="0"/>
-              <a:t>SCE with 4 columns, each 2x2</a:t>
+              <a:t>Randomly pick neurons to remove for each trial (5% = removed two neurons, 10% = removed 4 neurons). The “0% damage” SCE is the same for all trials.</a:t>
+            </a:r>
+          </a:p>
+          <a:p>
+            <a:endParaRPr lang="en-US" dirty="0"/>
+          </a:p>
+          <a:p>
+            <a:r>
+              <a:rPr lang="en-US" dirty="0"/>
+              <a:t>The SCE has some resilience, but even removing 2 neurons can cause the firing rate encoding to fail (trials 7 and 14)</a:t>
             </a:r>
           </a:p>
         </p:txBody>
@@ -6401,7 +7455,7 @@
     </p:spTree>
     <p:extLst>
       <p:ext uri="{BB962C8B-B14F-4D97-AF65-F5344CB8AC3E}">
-        <p14:creationId xmlns:p14="http://schemas.microsoft.com/office/powerpoint/2010/main" val="1579680342"/>
+        <p14:creationId xmlns:p14="http://schemas.microsoft.com/office/powerpoint/2010/main" val="4093713526"/>
       </p:ext>
     </p:extLst>
   </p:cSld>
@@ -6433,7 +7487,7 @@
           <p:cNvPr id="2" name="Title 1">
             <a:extLst>
               <a:ext uri="{FF2B5EF4-FFF2-40B4-BE49-F238E27FC236}">
-                <a16:creationId xmlns:a16="http://schemas.microsoft.com/office/drawing/2014/main" id="{CA17E180-5948-4F3D-83B6-1559C7E111DB}"/>
+                <a16:creationId xmlns:a16="http://schemas.microsoft.com/office/drawing/2014/main" id="{B2ED46A1-F823-4E48-9259-9203F0ACA912}"/>
               </a:ext>
             </a:extLst>
           </p:cNvPr>
@@ -6451,324 +7505,93 @@
           <a:p>
             <a:r>
               <a:rPr lang="en-US" dirty="0"/>
-              <a:t>Firing Rate converted to Wave Rate</a:t>
-            </a:r>
-          </a:p>
-        </p:txBody>
-      </p:sp>
-      <p:pic>
-        <p:nvPicPr>
-          <p:cNvPr id="3" name="Picture 2">
-            <a:extLst>
-              <a:ext uri="{FF2B5EF4-FFF2-40B4-BE49-F238E27FC236}">
-                <a16:creationId xmlns:a16="http://schemas.microsoft.com/office/drawing/2014/main" id="{7FC0347F-E3BA-443D-9061-E8C956FFCBF8}"/>
-              </a:ext>
-            </a:extLst>
-          </p:cNvPr>
-          <p:cNvPicPr>
-            <a:picLocks noChangeAspect="1"/>
-          </p:cNvPicPr>
-          <p:nvPr/>
-        </p:nvPicPr>
-        <p:blipFill rotWithShape="1">
-          <a:blip r:embed="rId2">
-            <a:extLst>
-              <a:ext uri="{28A0092B-C50C-407E-A947-70E740481C1C}">
-                <a14:useLocalDpi xmlns:a14="http://schemas.microsoft.com/office/drawing/2010/main" val="0"/>
-              </a:ext>
-            </a:extLst>
-          </a:blip>
-          <a:srcRect l="9483" r="8354"/>
-          <a:stretch/>
-        </p:blipFill>
-        <p:spPr>
-          <a:xfrm>
-            <a:off x="2286001" y="2561728"/>
-            <a:ext cx="9389534" cy="2852362"/>
-          </a:xfrm>
-          <a:prstGeom prst="rect">
-            <a:avLst/>
-          </a:prstGeom>
-        </p:spPr>
-      </p:pic>
-      <p:sp>
-        <p:nvSpPr>
-          <p:cNvPr id="4" name="TextBox 3">
-            <a:extLst>
-              <a:ext uri="{FF2B5EF4-FFF2-40B4-BE49-F238E27FC236}">
-                <a16:creationId xmlns:a16="http://schemas.microsoft.com/office/drawing/2014/main" id="{0225E9DC-045D-40FE-BD6D-992AB387647B}"/>
-              </a:ext>
-            </a:extLst>
-          </p:cNvPr>
-          <p:cNvSpPr txBox="1"/>
-          <p:nvPr/>
-        </p:nvSpPr>
-        <p:spPr>
-          <a:xfrm>
-            <a:off x="516465" y="2962100"/>
-            <a:ext cx="1118667" cy="369332"/>
-          </a:xfrm>
-          <a:prstGeom prst="rect">
-            <a:avLst/>
-          </a:prstGeom>
-          <a:noFill/>
-        </p:spPr>
-        <p:txBody>
-          <a:bodyPr wrap="square" rtlCol="0">
-            <a:spAutoFit/>
-          </a:bodyPr>
-          <a:lstStyle/>
-          <a:p>
-            <a:r>
-              <a:rPr lang="en-US" dirty="0">
-                <a:latin typeface="Arial" panose="020B0604020202020204" pitchFamily="34" charset="0"/>
-                <a:cs typeface="Arial" panose="020B0604020202020204" pitchFamily="34" charset="0"/>
-              </a:rPr>
-              <a:t>4x4 SCE</a:t>
-            </a:r>
-          </a:p>
-        </p:txBody>
-      </p:sp>
-      <p:cxnSp>
-        <p:nvCxnSpPr>
-          <p:cNvPr id="5" name="Straight Arrow Connector 4">
-            <a:extLst>
-              <a:ext uri="{FF2B5EF4-FFF2-40B4-BE49-F238E27FC236}">
-                <a16:creationId xmlns:a16="http://schemas.microsoft.com/office/drawing/2014/main" id="{2E874146-D498-449A-B982-229BCBA9C59D}"/>
-              </a:ext>
-            </a:extLst>
-          </p:cNvPr>
-          <p:cNvCxnSpPr>
-            <a:cxnSpLocks/>
-            <a:stCxn id="4" idx="3"/>
-          </p:cNvCxnSpPr>
-          <p:nvPr/>
-        </p:nvCxnSpPr>
-        <p:spPr>
-          <a:xfrm>
-            <a:off x="1635132" y="3146766"/>
-            <a:ext cx="762000" cy="0"/>
-          </a:xfrm>
-          <a:prstGeom prst="straightConnector1">
-            <a:avLst/>
-          </a:prstGeom>
-          <a:ln>
-            <a:tailEnd type="triangle"/>
-          </a:ln>
-        </p:spPr>
-        <p:style>
-          <a:lnRef idx="2">
-            <a:schemeClr val="dk1"/>
-          </a:lnRef>
-          <a:fillRef idx="0">
-            <a:schemeClr val="dk1"/>
-          </a:fillRef>
-          <a:effectRef idx="1">
-            <a:schemeClr val="dk1"/>
-          </a:effectRef>
-          <a:fontRef idx="minor">
-            <a:schemeClr val="tx1"/>
-          </a:fontRef>
-        </p:style>
-      </p:cxnSp>
-      <p:sp>
-        <p:nvSpPr>
-          <p:cNvPr id="9" name="TextBox 8">
-            <a:extLst>
-              <a:ext uri="{FF2B5EF4-FFF2-40B4-BE49-F238E27FC236}">
-                <a16:creationId xmlns:a16="http://schemas.microsoft.com/office/drawing/2014/main" id="{BDDE0629-CF36-4C5A-8BC2-E43E6816B903}"/>
-              </a:ext>
-            </a:extLst>
-          </p:cNvPr>
-          <p:cNvSpPr txBox="1"/>
-          <p:nvPr/>
-        </p:nvSpPr>
-        <p:spPr>
-          <a:xfrm>
-            <a:off x="274101" y="4301047"/>
-            <a:ext cx="1359968" cy="646331"/>
-          </a:xfrm>
-          <a:prstGeom prst="rect">
-            <a:avLst/>
-          </a:prstGeom>
-          <a:noFill/>
-        </p:spPr>
-        <p:txBody>
-          <a:bodyPr wrap="square" rtlCol="0">
-            <a:spAutoFit/>
-          </a:bodyPr>
-          <a:lstStyle/>
-          <a:p>
-            <a:r>
-              <a:rPr lang="en-US" dirty="0">
-                <a:latin typeface="Arial" panose="020B0604020202020204" pitchFamily="34" charset="0"/>
-                <a:cs typeface="Arial" panose="020B0604020202020204" pitchFamily="34" charset="0"/>
-              </a:rPr>
-              <a:t>4 columns, each 2x2</a:t>
-            </a:r>
-          </a:p>
-        </p:txBody>
-      </p:sp>
-      <p:cxnSp>
-        <p:nvCxnSpPr>
-          <p:cNvPr id="10" name="Straight Arrow Connector 9">
-            <a:extLst>
-              <a:ext uri="{FF2B5EF4-FFF2-40B4-BE49-F238E27FC236}">
-                <a16:creationId xmlns:a16="http://schemas.microsoft.com/office/drawing/2014/main" id="{F533294F-CC15-492A-A976-7C7817F9A120}"/>
-              </a:ext>
-            </a:extLst>
-          </p:cNvPr>
-          <p:cNvCxnSpPr>
-            <a:cxnSpLocks/>
-            <a:stCxn id="9" idx="3"/>
-          </p:cNvCxnSpPr>
-          <p:nvPr/>
-        </p:nvCxnSpPr>
-        <p:spPr>
-          <a:xfrm flipV="1">
-            <a:off x="1634069" y="4624212"/>
-            <a:ext cx="761999" cy="1"/>
-          </a:xfrm>
-          <a:prstGeom prst="straightConnector1">
-            <a:avLst/>
-          </a:prstGeom>
-          <a:ln>
-            <a:tailEnd type="triangle"/>
-          </a:ln>
-        </p:spPr>
-        <p:style>
-          <a:lnRef idx="2">
-            <a:schemeClr val="dk1"/>
-          </a:lnRef>
-          <a:fillRef idx="0">
-            <a:schemeClr val="dk1"/>
-          </a:fillRef>
-          <a:effectRef idx="1">
-            <a:schemeClr val="dk1"/>
-          </a:effectRef>
-          <a:fontRef idx="minor">
-            <a:schemeClr val="tx1"/>
-          </a:fontRef>
-        </p:style>
-      </p:cxnSp>
-      <p:sp>
-        <p:nvSpPr>
-          <p:cNvPr id="14" name="TextBox 13">
-            <a:extLst>
-              <a:ext uri="{FF2B5EF4-FFF2-40B4-BE49-F238E27FC236}">
-                <a16:creationId xmlns:a16="http://schemas.microsoft.com/office/drawing/2014/main" id="{37741339-67D2-498D-8A7B-743AF1065C0F}"/>
-              </a:ext>
-            </a:extLst>
-          </p:cNvPr>
-          <p:cNvSpPr txBox="1"/>
-          <p:nvPr/>
-        </p:nvSpPr>
-        <p:spPr>
-          <a:xfrm>
-            <a:off x="1566333" y="5778493"/>
-            <a:ext cx="9567340" cy="923330"/>
-          </a:xfrm>
-          <a:prstGeom prst="rect">
-            <a:avLst/>
-          </a:prstGeom>
-          <a:noFill/>
-        </p:spPr>
-        <p:txBody>
-          <a:bodyPr wrap="square">
-            <a:spAutoFit/>
-          </a:bodyPr>
-          <a:lstStyle/>
-          <a:p>
-            <a:pPr marL="0" indent="0">
+              <a:t>SCE population morphology</a:t>
+            </a:r>
+          </a:p>
+        </p:txBody>
+      </p:sp>
+      <p:sp>
+        <p:nvSpPr>
+          <p:cNvPr id="3" name="Content Placeholder 2">
+            <a:extLst>
+              <a:ext uri="{FF2B5EF4-FFF2-40B4-BE49-F238E27FC236}">
+                <a16:creationId xmlns:a16="http://schemas.microsoft.com/office/drawing/2014/main" id="{0AAF908E-C78C-46C7-B934-8E51B9043C54}"/>
+              </a:ext>
+            </a:extLst>
+          </p:cNvPr>
+          <p:cNvSpPr>
+            <a:spLocks noGrp="1"/>
+          </p:cNvSpPr>
+          <p:nvPr>
+            <p:ph idx="1"/>
+          </p:nvPr>
+        </p:nvSpPr>
+        <p:spPr/>
+        <p:txBody>
+          <a:bodyPr/>
+          <a:lstStyle/>
+          <a:p>
+            <a:r>
+              <a:rPr lang="en-US" dirty="0"/>
+              <a:t>We imagine 3 types of SCE populations:</a:t>
+            </a:r>
+          </a:p>
+          <a:p>
+            <a:pPr lvl="1"/>
+            <a:r>
+              <a:rPr lang="en-US" dirty="0"/>
+              <a:t>A single “thickened” SCE with greater X and Y extents</a:t>
+            </a:r>
+          </a:p>
+          <a:p>
+            <a:pPr lvl="1"/>
+            <a:r>
+              <a:rPr lang="en-US" dirty="0"/>
+              <a:t>A population of independent SCE with no cross-connections</a:t>
+            </a:r>
+          </a:p>
+          <a:p>
+            <a:pPr lvl="1"/>
+            <a:r>
+              <a:rPr lang="en-US" dirty="0"/>
+              <a:t>A population of coupled SCE where the inter-SCE connections are less dense than the connections within each individual SCE</a:t>
+            </a:r>
+          </a:p>
+          <a:p>
+            <a:endParaRPr lang="en-US" dirty="0"/>
+          </a:p>
+          <a:p>
+            <a:r>
+              <a:rPr lang="en-US" dirty="0"/>
+              <a:t>We examine these population types to answer 2 questions:</a:t>
+            </a:r>
+          </a:p>
+          <a:p>
+            <a:pPr lvl="1"/>
+            <a:r>
+              <a:rPr lang="en-US" dirty="0"/>
+              <a:t>Which population types are most resilient to damage? Measured by comparing the activation function after damage to the activation function before damage</a:t>
+            </a:r>
+          </a:p>
+          <a:p>
+            <a:pPr lvl="1"/>
+            <a:r>
+              <a:rPr lang="en-US" dirty="0"/>
+              <a:t>Which population types are most efficient? Measured by comparing the total # of spikes required for the same activation function</a:t>
+            </a:r>
+          </a:p>
+          <a:p>
+            <a:pPr marL="457200" lvl="1" indent="0">
               <a:buNone/>
             </a:pPr>
-            <a:r>
-              <a:rPr lang="en-US" sz="1800" b="1" dirty="0"/>
-              <a:t>A higher firing rate in the input population results in a higher rate of traveling waves propagating through the SCE. There is a maximum “traveling wave rate”, such that increasing the firing rate of the input population does not result in more frequent traveling waves.</a:t>
-            </a:r>
-          </a:p>
-        </p:txBody>
-      </p:sp>
-      <p:sp>
-        <p:nvSpPr>
-          <p:cNvPr id="15" name="TextBox 14">
-            <a:extLst>
-              <a:ext uri="{FF2B5EF4-FFF2-40B4-BE49-F238E27FC236}">
-                <a16:creationId xmlns:a16="http://schemas.microsoft.com/office/drawing/2014/main" id="{98490D20-9D0E-40F1-87DA-3F071048154B}"/>
-              </a:ext>
-            </a:extLst>
-          </p:cNvPr>
-          <p:cNvSpPr txBox="1"/>
-          <p:nvPr/>
-        </p:nvSpPr>
-        <p:spPr>
-          <a:xfrm>
-            <a:off x="2396068" y="1943227"/>
-            <a:ext cx="1498602" cy="523220"/>
-          </a:xfrm>
-          <a:prstGeom prst="rect">
-            <a:avLst/>
-          </a:prstGeom>
-          <a:noFill/>
-        </p:spPr>
-        <p:txBody>
-          <a:bodyPr wrap="square" rtlCol="0">
-            <a:spAutoFit/>
-          </a:bodyPr>
-          <a:lstStyle/>
-          <a:p>
-            <a:r>
-              <a:rPr lang="en-US" sz="1400" dirty="0">
-                <a:latin typeface="Arial" panose="020B0604020202020204" pitchFamily="34" charset="0"/>
-                <a:cs typeface="Arial" panose="020B0604020202020204" pitchFamily="34" charset="0"/>
-              </a:rPr>
-              <a:t>Input population firing rate 1 Hz</a:t>
-            </a:r>
-          </a:p>
-        </p:txBody>
-      </p:sp>
-      <p:sp>
-        <p:nvSpPr>
-          <p:cNvPr id="17" name="TextBox 16">
-            <a:extLst>
-              <a:ext uri="{FF2B5EF4-FFF2-40B4-BE49-F238E27FC236}">
-                <a16:creationId xmlns:a16="http://schemas.microsoft.com/office/drawing/2014/main" id="{6FA91BC4-4752-47CF-9EA3-7752DF872882}"/>
-              </a:ext>
-            </a:extLst>
-          </p:cNvPr>
-          <p:cNvSpPr txBox="1"/>
-          <p:nvPr/>
-        </p:nvSpPr>
-        <p:spPr>
-          <a:xfrm>
-            <a:off x="10109202" y="1943227"/>
-            <a:ext cx="1498602" cy="523220"/>
-          </a:xfrm>
-          <a:prstGeom prst="rect">
-            <a:avLst/>
-          </a:prstGeom>
-          <a:noFill/>
-        </p:spPr>
-        <p:txBody>
-          <a:bodyPr wrap="square" rtlCol="0">
-            <a:spAutoFit/>
-          </a:bodyPr>
-          <a:lstStyle/>
-          <a:p>
-            <a:r>
-              <a:rPr lang="en-US" sz="1400" dirty="0">
-                <a:latin typeface="Arial" panose="020B0604020202020204" pitchFamily="34" charset="0"/>
-                <a:cs typeface="Arial" panose="020B0604020202020204" pitchFamily="34" charset="0"/>
-              </a:rPr>
-              <a:t>Input population firing rate 21 Hz</a:t>
-            </a:r>
+            <a:endParaRPr lang="en-US" dirty="0"/>
           </a:p>
         </p:txBody>
       </p:sp>
     </p:spTree>
     <p:extLst>
       <p:ext uri="{BB962C8B-B14F-4D97-AF65-F5344CB8AC3E}">
-        <p14:creationId xmlns:p14="http://schemas.microsoft.com/office/powerpoint/2010/main" val="2266459938"/>
+        <p14:creationId xmlns:p14="http://schemas.microsoft.com/office/powerpoint/2010/main" val="2969064534"/>
       </p:ext>
     </p:extLst>
   </p:cSld>
@@ -6800,7 +7623,7 @@
           <p:cNvPr id="2" name="Title 1">
             <a:extLst>
               <a:ext uri="{FF2B5EF4-FFF2-40B4-BE49-F238E27FC236}">
-                <a16:creationId xmlns:a16="http://schemas.microsoft.com/office/drawing/2014/main" id="{4978A05F-7A7F-4026-9E52-C56CF002DE46}"/>
+                <a16:creationId xmlns:a16="http://schemas.microsoft.com/office/drawing/2014/main" id="{FA562F1E-F46A-47A0-95A1-98F3EAC6095F}"/>
               </a:ext>
             </a:extLst>
           </p:cNvPr>
@@ -6818,17 +7641,50 @@
           <a:p>
             <a:r>
               <a:rPr lang="en-US" dirty="0"/>
-              <a:t>Representation of input firing rate</a:t>
+              <a:t>Morphology comparison</a:t>
+            </a:r>
+          </a:p>
+        </p:txBody>
+      </p:sp>
+      <p:sp>
+        <p:nvSpPr>
+          <p:cNvPr id="11" name="Content Placeholder 10">
+            <a:extLst>
+              <a:ext uri="{FF2B5EF4-FFF2-40B4-BE49-F238E27FC236}">
+                <a16:creationId xmlns:a16="http://schemas.microsoft.com/office/drawing/2014/main" id="{CB1A6BFB-34B3-4F89-A56D-C54C43DE68EA}"/>
+              </a:ext>
+            </a:extLst>
+          </p:cNvPr>
+          <p:cNvSpPr>
+            <a:spLocks noGrp="1"/>
+          </p:cNvSpPr>
+          <p:nvPr>
+            <p:ph idx="1"/>
+          </p:nvPr>
+        </p:nvSpPr>
+        <p:spPr>
+          <a:xfrm>
+            <a:off x="838200" y="1825625"/>
+            <a:ext cx="10515600" cy="483466"/>
+          </a:xfrm>
+        </p:spPr>
+        <p:txBody>
+          <a:bodyPr/>
+          <a:lstStyle/>
+          <a:p>
+            <a:r>
+              <a:rPr lang="en-US" dirty="0"/>
+              <a:t>Experiments on three different morphologies of a 4x4x10 population</a:t>
             </a:r>
           </a:p>
         </p:txBody>
       </p:sp>
       <p:pic>
         <p:nvPicPr>
-          <p:cNvPr id="5" name="Picture 4">
-            <a:extLst>
-              <a:ext uri="{FF2B5EF4-FFF2-40B4-BE49-F238E27FC236}">
-                <a16:creationId xmlns:a16="http://schemas.microsoft.com/office/drawing/2014/main" id="{2D784170-4FB7-4E50-B819-53B7BBAC8883}"/>
+          <p:cNvPr id="4" name="Picture 3" descr="Graphical user interface, chart, line chart&#10;&#10;Description automatically generated">
+            <a:extLst>
+              <a:ext uri="{FF2B5EF4-FFF2-40B4-BE49-F238E27FC236}">
+                <a16:creationId xmlns:a16="http://schemas.microsoft.com/office/drawing/2014/main" id="{EF8DA3DF-C148-454E-A17B-6D3DBBD4B08E}"/>
               </a:ext>
             </a:extLst>
           </p:cNvPr>
@@ -6851,20 +7707,55 @@
         </p:blipFill>
         <p:spPr>
           <a:xfrm>
-            <a:off x="2457443" y="1551977"/>
-            <a:ext cx="6373291" cy="3879395"/>
+            <a:off x="6611329" y="3328459"/>
+            <a:ext cx="5488307" cy="3294013"/>
           </a:xfrm>
           <a:prstGeom prst="rect">
             <a:avLst/>
           </a:prstGeom>
         </p:spPr>
       </p:pic>
-      <p:sp>
-        <p:nvSpPr>
-          <p:cNvPr id="6" name="TextBox 5">
-            <a:extLst>
-              <a:ext uri="{FF2B5EF4-FFF2-40B4-BE49-F238E27FC236}">
-                <a16:creationId xmlns:a16="http://schemas.microsoft.com/office/drawing/2014/main" id="{85E261B1-2A6F-4215-9980-66C7397BCD9E}"/>
+      <p:pic>
+        <p:nvPicPr>
+          <p:cNvPr id="6" name="Picture 5" descr="Chart&#10;&#10;Description automatically generated">
+            <a:extLst>
+              <a:ext uri="{FF2B5EF4-FFF2-40B4-BE49-F238E27FC236}">
+                <a16:creationId xmlns:a16="http://schemas.microsoft.com/office/drawing/2014/main" id="{4FCC4AD6-4C91-4698-85D3-54A7248B2606}"/>
+              </a:ext>
+            </a:extLst>
+          </p:cNvPr>
+          <p:cNvPicPr>
+            <a:picLocks noChangeAspect="1"/>
+          </p:cNvPicPr>
+          <p:nvPr/>
+        </p:nvPicPr>
+        <p:blipFill rotWithShape="1">
+          <a:blip r:embed="rId3">
+            <a:extLst>
+              <a:ext uri="{28A0092B-C50C-407E-A947-70E740481C1C}">
+                <a14:useLocalDpi xmlns:a14="http://schemas.microsoft.com/office/drawing/2010/main" val="0"/>
+              </a:ext>
+            </a:extLst>
+          </a:blip>
+          <a:srcRect l="6059" r="6848"/>
+          <a:stretch/>
+        </p:blipFill>
+        <p:spPr>
+          <a:xfrm>
+            <a:off x="175491" y="3402352"/>
+            <a:ext cx="5583410" cy="2827209"/>
+          </a:xfrm>
+          <a:prstGeom prst="rect">
+            <a:avLst/>
+          </a:prstGeom>
+        </p:spPr>
+      </p:pic>
+      <p:sp>
+        <p:nvSpPr>
+          <p:cNvPr id="9" name="TextBox 8">
+            <a:extLst>
+              <a:ext uri="{FF2B5EF4-FFF2-40B4-BE49-F238E27FC236}">
+                <a16:creationId xmlns:a16="http://schemas.microsoft.com/office/drawing/2014/main" id="{EA028A7D-E3FE-4519-9547-CDF2EB7E1D1D}"/>
               </a:ext>
             </a:extLst>
           </p:cNvPr>
@@ -6873,8 +7764,8 @@
         </p:nvSpPr>
         <p:spPr>
           <a:xfrm>
-            <a:off x="8398934" y="2912533"/>
-            <a:ext cx="3056734" cy="369332"/>
+            <a:off x="789644" y="3217686"/>
+            <a:ext cx="4717702" cy="369332"/>
           </a:xfrm>
           <a:prstGeom prst="rect">
             <a:avLst/>
@@ -6889,17 +7780,17 @@
           <a:p>
             <a:r>
               <a:rPr lang="en-US" dirty="0"/>
-              <a:t>Error bars 1 std, 10 trials/point</a:t>
-            </a:r>
-          </a:p>
-        </p:txBody>
-      </p:sp>
-      <p:sp>
-        <p:nvSpPr>
-          <p:cNvPr id="7" name="TextBox 6">
-            <a:extLst>
-              <a:ext uri="{FF2B5EF4-FFF2-40B4-BE49-F238E27FC236}">
-                <a16:creationId xmlns:a16="http://schemas.microsoft.com/office/drawing/2014/main" id="{093A04D6-8ED9-454A-99EF-BC14BAF97886}"/>
+              <a:t>One big 4x4x10 SCE – highly resistant to damage</a:t>
+            </a:r>
+          </a:p>
+        </p:txBody>
+      </p:sp>
+      <p:sp>
+        <p:nvSpPr>
+          <p:cNvPr id="10" name="TextBox 9">
+            <a:extLst>
+              <a:ext uri="{FF2B5EF4-FFF2-40B4-BE49-F238E27FC236}">
+                <a16:creationId xmlns:a16="http://schemas.microsoft.com/office/drawing/2014/main" id="{E96F3551-3B89-433E-9E4D-E952239662FF}"/>
               </a:ext>
             </a:extLst>
           </p:cNvPr>
@@ -6908,8 +7799,8 @@
         </p:nvSpPr>
         <p:spPr>
           <a:xfrm>
-            <a:off x="711201" y="5602561"/>
-            <a:ext cx="11023600" cy="1015663"/>
+            <a:off x="7093462" y="3143793"/>
+            <a:ext cx="4790927" cy="369332"/>
           </a:xfrm>
           <a:prstGeom prst="rect">
             <a:avLst/>
@@ -6917,22 +7808,14 @@
           <a:noFill/>
         </p:spPr>
         <p:txBody>
-          <a:bodyPr wrap="square" rtlCol="0">
+          <a:bodyPr wrap="none" rtlCol="0">
             <a:spAutoFit/>
           </a:bodyPr>
           <a:lstStyle/>
           <a:p>
             <a:r>
-              <a:rPr lang="en-US" sz="2000" dirty="0"/>
-              <a:t>The # of traveling waves/second encodes the input population firing rate. The one large column shows an activation function similar to the population activation function in </a:t>
-            </a:r>
-            <a:r>
-              <a:rPr lang="en-US" sz="2000" dirty="0" err="1"/>
-              <a:t>Trappenberg</a:t>
-            </a:r>
-            <a:r>
-              <a:rPr lang="en-US" sz="2000" dirty="0"/>
-              <a:t> section 3.4. The 4-column SCE shows a more linear activation function, but with more variation.</a:t>
+              <a:rPr lang="en-US" dirty="0"/>
+              <a:t>4 independent 2x2 SCE – not resistant to damage</a:t>
             </a:r>
           </a:p>
         </p:txBody>
@@ -6940,7 +7823,7 @@
     </p:spTree>
     <p:extLst>
       <p:ext uri="{BB962C8B-B14F-4D97-AF65-F5344CB8AC3E}">
-        <p14:creationId xmlns:p14="http://schemas.microsoft.com/office/powerpoint/2010/main" val="2457268577"/>
+        <p14:creationId xmlns:p14="http://schemas.microsoft.com/office/powerpoint/2010/main" val="1920711341"/>
       </p:ext>
     </p:extLst>
   </p:cSld>

</xml_diff>